<commit_message>
Updated splash screen PPTX
</commit_message>
<xml_diff>
--- a/icons/splash.pptx
+++ b/icons/splash.pptx
@@ -104,6 +104,11 @@
       </a:defRPr>
     </a:lvl9pPr>
   </p:defaultTextStyle>
+  <p:extLst>
+    <p:ext uri="{EFAFB233-063F-42B5-8137-9DF3F51BA10A}">
+      <p15:sldGuideLst xmlns:p15="http://schemas.microsoft.com/office/powerpoint/2012/main"/>
+    </p:ext>
+  </p:extLst>
 </p:presentation>
 </file>
 
@@ -256,7 +261,7 @@
           <a:p>
             <a:fld id="{89B6C282-A233-584A-95C2-0E83D78911AC}" type="datetimeFigureOut">
               <a:rPr lang="en-US" smtClean="0"/>
-              <a:t>1/5/20</a:t>
+              <a:t>6/23/20</a:t>
             </a:fld>
             <a:endParaRPr lang="en-US"/>
           </a:p>
@@ -456,7 +461,7 @@
           <a:p>
             <a:fld id="{89B6C282-A233-584A-95C2-0E83D78911AC}" type="datetimeFigureOut">
               <a:rPr lang="en-US" smtClean="0"/>
-              <a:t>1/5/20</a:t>
+              <a:t>6/23/20</a:t>
             </a:fld>
             <a:endParaRPr lang="en-US"/>
           </a:p>
@@ -666,7 +671,7 @@
           <a:p>
             <a:fld id="{89B6C282-A233-584A-95C2-0E83D78911AC}" type="datetimeFigureOut">
               <a:rPr lang="en-US" smtClean="0"/>
-              <a:t>1/5/20</a:t>
+              <a:t>6/23/20</a:t>
             </a:fld>
             <a:endParaRPr lang="en-US"/>
           </a:p>
@@ -866,7 +871,7 @@
           <a:p>
             <a:fld id="{89B6C282-A233-584A-95C2-0E83D78911AC}" type="datetimeFigureOut">
               <a:rPr lang="en-US" smtClean="0"/>
-              <a:t>1/5/20</a:t>
+              <a:t>6/23/20</a:t>
             </a:fld>
             <a:endParaRPr lang="en-US"/>
           </a:p>
@@ -1142,7 +1147,7 @@
           <a:p>
             <a:fld id="{89B6C282-A233-584A-95C2-0E83D78911AC}" type="datetimeFigureOut">
               <a:rPr lang="en-US" smtClean="0"/>
-              <a:t>1/5/20</a:t>
+              <a:t>6/23/20</a:t>
             </a:fld>
             <a:endParaRPr lang="en-US"/>
           </a:p>
@@ -1410,7 +1415,7 @@
           <a:p>
             <a:fld id="{89B6C282-A233-584A-95C2-0E83D78911AC}" type="datetimeFigureOut">
               <a:rPr lang="en-US" smtClean="0"/>
-              <a:t>1/5/20</a:t>
+              <a:t>6/23/20</a:t>
             </a:fld>
             <a:endParaRPr lang="en-US"/>
           </a:p>
@@ -1825,7 +1830,7 @@
           <a:p>
             <a:fld id="{89B6C282-A233-584A-95C2-0E83D78911AC}" type="datetimeFigureOut">
               <a:rPr lang="en-US" smtClean="0"/>
-              <a:t>1/5/20</a:t>
+              <a:t>6/23/20</a:t>
             </a:fld>
             <a:endParaRPr lang="en-US"/>
           </a:p>
@@ -1967,7 +1972,7 @@
           <a:p>
             <a:fld id="{89B6C282-A233-584A-95C2-0E83D78911AC}" type="datetimeFigureOut">
               <a:rPr lang="en-US" smtClean="0"/>
-              <a:t>1/5/20</a:t>
+              <a:t>6/23/20</a:t>
             </a:fld>
             <a:endParaRPr lang="en-US"/>
           </a:p>
@@ -2080,7 +2085,7 @@
           <a:p>
             <a:fld id="{89B6C282-A233-584A-95C2-0E83D78911AC}" type="datetimeFigureOut">
               <a:rPr lang="en-US" smtClean="0"/>
-              <a:t>1/5/20</a:t>
+              <a:t>6/23/20</a:t>
             </a:fld>
             <a:endParaRPr lang="en-US"/>
           </a:p>
@@ -2393,7 +2398,7 @@
           <a:p>
             <a:fld id="{89B6C282-A233-584A-95C2-0E83D78911AC}" type="datetimeFigureOut">
               <a:rPr lang="en-US" smtClean="0"/>
-              <a:t>1/5/20</a:t>
+              <a:t>6/23/20</a:t>
             </a:fld>
             <a:endParaRPr lang="en-US"/>
           </a:p>
@@ -2682,7 +2687,7 @@
           <a:p>
             <a:fld id="{89B6C282-A233-584A-95C2-0E83D78911AC}" type="datetimeFigureOut">
               <a:rPr lang="en-US" smtClean="0"/>
-              <a:t>1/5/20</a:t>
+              <a:t>6/23/20</a:t>
             </a:fld>
             <a:endParaRPr lang="en-US"/>
           </a:p>
@@ -2925,7 +2930,7 @@
           <a:p>
             <a:fld id="{89B6C282-A233-584A-95C2-0E83D78911AC}" type="datetimeFigureOut">
               <a:rPr lang="en-US" smtClean="0"/>
-              <a:t>1/5/20</a:t>
+              <a:t>6/23/20</a:t>
             </a:fld>
             <a:endParaRPr lang="en-US"/>
           </a:p>
@@ -3356,42 +3361,12 @@
         </p:nvGrpSpPr>
         <p:grpSpPr>
           <a:xfrm>
-            <a:off x="4593513" y="1407395"/>
-            <a:ext cx="2983509" cy="3336842"/>
-            <a:chOff x="5089220" y="1420274"/>
-            <a:chExt cx="2983509" cy="3336842"/>
+            <a:off x="4593513" y="3029754"/>
+            <a:ext cx="2983509" cy="1714483"/>
+            <a:chOff x="5089220" y="3042633"/>
+            <a:chExt cx="2983509" cy="1714483"/>
           </a:xfrm>
         </p:grpSpPr>
-        <p:pic>
-          <p:nvPicPr>
-            <p:cNvPr id="9" name="Picture 8">
-              <a:extLst>
-                <a:ext uri="{FF2B5EF4-FFF2-40B4-BE49-F238E27FC236}">
-                  <a16:creationId xmlns:a16="http://schemas.microsoft.com/office/drawing/2014/main" id="{85B82243-A5A7-F84C-9997-1C1C47F09A43}"/>
-                </a:ext>
-              </a:extLst>
-            </p:cNvPr>
-            <p:cNvPicPr>
-              <a:picLocks noChangeAspect="1"/>
-            </p:cNvPicPr>
-            <p:nvPr/>
-          </p:nvPicPr>
-          <p:blipFill>
-            <a:blip r:embed="rId2"/>
-            <a:stretch>
-              <a:fillRect/>
-            </a:stretch>
-          </p:blipFill>
-          <p:spPr>
-            <a:xfrm>
-              <a:off x="5584023" y="1420274"/>
-              <a:ext cx="1993900" cy="1612900"/>
-            </a:xfrm>
-            <a:prstGeom prst="rect">
-              <a:avLst/>
-            </a:prstGeom>
-          </p:spPr>
-        </p:pic>
         <p:sp>
           <p:nvSpPr>
             <p:cNvPr id="10" name="TextBox 9">
@@ -3421,11 +3396,18 @@
             <a:lstStyle/>
             <a:p>
               <a:r>
+                <a:rPr lang="en-US" sz="2000" b="1" dirty="0" err="1">
+                  <a:latin typeface="Arial" panose="020B0604020202020204" pitchFamily="34" charset="0"/>
+                  <a:cs typeface="Arial" panose="020B0604020202020204" pitchFamily="34" charset="0"/>
+                </a:rPr>
+                <a:t>pLisp</a:t>
+              </a:r>
+              <a:r>
                 <a:rPr lang="en-US" sz="2000" b="1" dirty="0">
                   <a:latin typeface="Arial" panose="020B0604020202020204" pitchFamily="34" charset="0"/>
                   <a:cs typeface="Arial" panose="020B0604020202020204" pitchFamily="34" charset="0"/>
                 </a:rPr>
-                <a:t>pLisp 0.1.28</a:t>
+                <a:t> 0.1.29</a:t>
               </a:r>
             </a:p>
           </p:txBody>
@@ -3567,6 +3549,36 @@
           </a:p>
         </p:txBody>
       </p:sp>
+      <p:pic>
+        <p:nvPicPr>
+          <p:cNvPr id="3" name="Picture 2">
+            <a:extLst>
+              <a:ext uri="{FF2B5EF4-FFF2-40B4-BE49-F238E27FC236}">
+                <a16:creationId xmlns:a16="http://schemas.microsoft.com/office/drawing/2014/main" id="{A5E9C441-B5F7-0C43-83FD-5DDC9B92818A}"/>
+              </a:ext>
+            </a:extLst>
+          </p:cNvPr>
+          <p:cNvPicPr>
+            <a:picLocks noChangeAspect="1"/>
+          </p:cNvPicPr>
+          <p:nvPr/>
+        </p:nvPicPr>
+        <p:blipFill>
+          <a:blip r:embed="rId2"/>
+          <a:stretch>
+            <a:fillRect/>
+          </a:stretch>
+        </p:blipFill>
+        <p:spPr>
+          <a:xfrm>
+            <a:off x="5222203" y="1221264"/>
+            <a:ext cx="1803400" cy="1752600"/>
+          </a:xfrm>
+          <a:prstGeom prst="rect">
+            <a:avLst/>
+          </a:prstGeom>
+        </p:spPr>
+      </p:pic>
     </p:spTree>
     <p:extLst>
       <p:ext uri="{BB962C8B-B14F-4D97-AF65-F5344CB8AC3E}">

</xml_diff>

<commit_message>
Updated splash screen for v0.1.30
</commit_message>
<xml_diff>
--- a/icons/splash.pptx
+++ b/icons/splash.pptx
@@ -261,7 +261,7 @@
           <a:p>
             <a:fld id="{89B6C282-A233-584A-95C2-0E83D78911AC}" type="datetimeFigureOut">
               <a:rPr lang="en-US" smtClean="0"/>
-              <a:t>6/23/20</a:t>
+              <a:t>12/29/20</a:t>
             </a:fld>
             <a:endParaRPr lang="en-US"/>
           </a:p>
@@ -461,7 +461,7 @@
           <a:p>
             <a:fld id="{89B6C282-A233-584A-95C2-0E83D78911AC}" type="datetimeFigureOut">
               <a:rPr lang="en-US" smtClean="0"/>
-              <a:t>6/23/20</a:t>
+              <a:t>12/29/20</a:t>
             </a:fld>
             <a:endParaRPr lang="en-US"/>
           </a:p>
@@ -671,7 +671,7 @@
           <a:p>
             <a:fld id="{89B6C282-A233-584A-95C2-0E83D78911AC}" type="datetimeFigureOut">
               <a:rPr lang="en-US" smtClean="0"/>
-              <a:t>6/23/20</a:t>
+              <a:t>12/29/20</a:t>
             </a:fld>
             <a:endParaRPr lang="en-US"/>
           </a:p>
@@ -871,7 +871,7 @@
           <a:p>
             <a:fld id="{89B6C282-A233-584A-95C2-0E83D78911AC}" type="datetimeFigureOut">
               <a:rPr lang="en-US" smtClean="0"/>
-              <a:t>6/23/20</a:t>
+              <a:t>12/29/20</a:t>
             </a:fld>
             <a:endParaRPr lang="en-US"/>
           </a:p>
@@ -1147,7 +1147,7 @@
           <a:p>
             <a:fld id="{89B6C282-A233-584A-95C2-0E83D78911AC}" type="datetimeFigureOut">
               <a:rPr lang="en-US" smtClean="0"/>
-              <a:t>6/23/20</a:t>
+              <a:t>12/29/20</a:t>
             </a:fld>
             <a:endParaRPr lang="en-US"/>
           </a:p>
@@ -1415,7 +1415,7 @@
           <a:p>
             <a:fld id="{89B6C282-A233-584A-95C2-0E83D78911AC}" type="datetimeFigureOut">
               <a:rPr lang="en-US" smtClean="0"/>
-              <a:t>6/23/20</a:t>
+              <a:t>12/29/20</a:t>
             </a:fld>
             <a:endParaRPr lang="en-US"/>
           </a:p>
@@ -1830,7 +1830,7 @@
           <a:p>
             <a:fld id="{89B6C282-A233-584A-95C2-0E83D78911AC}" type="datetimeFigureOut">
               <a:rPr lang="en-US" smtClean="0"/>
-              <a:t>6/23/20</a:t>
+              <a:t>12/29/20</a:t>
             </a:fld>
             <a:endParaRPr lang="en-US"/>
           </a:p>
@@ -1972,7 +1972,7 @@
           <a:p>
             <a:fld id="{89B6C282-A233-584A-95C2-0E83D78911AC}" type="datetimeFigureOut">
               <a:rPr lang="en-US" smtClean="0"/>
-              <a:t>6/23/20</a:t>
+              <a:t>12/29/20</a:t>
             </a:fld>
             <a:endParaRPr lang="en-US"/>
           </a:p>
@@ -2085,7 +2085,7 @@
           <a:p>
             <a:fld id="{89B6C282-A233-584A-95C2-0E83D78911AC}" type="datetimeFigureOut">
               <a:rPr lang="en-US" smtClean="0"/>
-              <a:t>6/23/20</a:t>
+              <a:t>12/29/20</a:t>
             </a:fld>
             <a:endParaRPr lang="en-US"/>
           </a:p>
@@ -2398,7 +2398,7 @@
           <a:p>
             <a:fld id="{89B6C282-A233-584A-95C2-0E83D78911AC}" type="datetimeFigureOut">
               <a:rPr lang="en-US" smtClean="0"/>
-              <a:t>6/23/20</a:t>
+              <a:t>12/29/20</a:t>
             </a:fld>
             <a:endParaRPr lang="en-US"/>
           </a:p>
@@ -2687,7 +2687,7 @@
           <a:p>
             <a:fld id="{89B6C282-A233-584A-95C2-0E83D78911AC}" type="datetimeFigureOut">
               <a:rPr lang="en-US" smtClean="0"/>
-              <a:t>6/23/20</a:t>
+              <a:t>12/29/20</a:t>
             </a:fld>
             <a:endParaRPr lang="en-US"/>
           </a:p>
@@ -2930,7 +2930,7 @@
           <a:p>
             <a:fld id="{89B6C282-A233-584A-95C2-0E83D78911AC}" type="datetimeFigureOut">
               <a:rPr lang="en-US" smtClean="0"/>
-              <a:t>6/23/20</a:t>
+              <a:t>12/29/20</a:t>
             </a:fld>
             <a:endParaRPr lang="en-US"/>
           </a:p>
@@ -3407,7 +3407,7 @@
                   <a:latin typeface="Arial" panose="020B0604020202020204" pitchFamily="34" charset="0"/>
                   <a:cs typeface="Arial" panose="020B0604020202020204" pitchFamily="34" charset="0"/>
                 </a:rPr>
-                <a:t> 0.1.29</a:t>
+                <a:t> 0.1.30</a:t>
               </a:r>
             </a:p>
           </p:txBody>

</xml_diff>

<commit_message>
Updated copyright year in splash screen
</commit_message>
<xml_diff>
--- a/icons/splash.pptx
+++ b/icons/splash.pptx
@@ -8,7 +8,7 @@
     <p:sldId id="256" r:id="rId3"/>
   </p:sldIdLst>
   <p:sldSz cx="12192000" cy="6858000"/>
-  <p:notesSz cx="7559675" cy="10691812"/>
+  <p:notesSz cx="7559675" cy="10691813"/>
 </p:presentation>
 </file>
 
@@ -53,7 +53,7 @@
       </p:grpSpPr>
       <p:sp>
         <p:nvSpPr>
-          <p:cNvPr id="26" name="PlaceHolder 1"/>
+          <p:cNvPr id="23" name="PlaceHolder 1"/>
           <p:cNvSpPr>
             <a:spLocks noGrp="1"/>
           </p:cNvSpPr>
@@ -64,34 +64,36 @@
         <p:spPr>
           <a:xfrm>
             <a:off x="1523880" y="1122480"/>
-            <a:ext cx="9143640" cy="2387160"/>
-          </a:xfrm>
-          <a:prstGeom prst="rect">
-            <a:avLst/>
-          </a:prstGeom>
+            <a:ext cx="9143280" cy="2386800"/>
+          </a:xfrm>
+          <a:prstGeom prst="rect">
+            <a:avLst/>
+          </a:prstGeom>
+          <a:noFill/>
+          <a:ln w="0">
+            <a:noFill/>
+          </a:ln>
         </p:spPr>
         <p:txBody>
           <a:bodyPr lIns="0" rIns="0" tIns="0" bIns="0" anchor="ctr">
             <a:noAutofit/>
           </a:bodyPr>
           <a:p>
-            <a:endParaRPr b="0" lang="en-US" sz="1800" spc="-1" strike="noStrike">
-              <a:solidFill>
-                <a:srgbClr val="000000"/>
-              </a:solidFill>
-              <a:latin typeface="Calibri"/>
-            </a:endParaRPr>
-          </a:p>
-        </p:txBody>
-      </p:sp>
-      <p:sp>
-        <p:nvSpPr>
-          <p:cNvPr id="27" name="PlaceHolder 2"/>
-          <p:cNvSpPr>
-            <a:spLocks noGrp="1"/>
-          </p:cNvSpPr>
-          <p:nvPr>
-            <p:ph type="body"/>
+            <a:pPr algn="ctr"/>
+            <a:endParaRPr b="0" lang="en-IN" sz="4400" spc="-1" strike="noStrike">
+              <a:latin typeface="Arial"/>
+            </a:endParaRPr>
+          </a:p>
+        </p:txBody>
+      </p:sp>
+      <p:sp>
+        <p:nvSpPr>
+          <p:cNvPr id="24" name="PlaceHolder 2"/>
+          <p:cNvSpPr>
+            <a:spLocks noGrp="1"/>
+          </p:cNvSpPr>
+          <p:nvPr>
+            <p:ph/>
           </p:nvPr>
         </p:nvSpPr>
         <p:spPr>
@@ -102,29 +104,30 @@
           <a:prstGeom prst="rect">
             <a:avLst/>
           </a:prstGeom>
-        </p:spPr>
-        <p:txBody>
-          <a:bodyPr lIns="0" rIns="0" tIns="0" bIns="0">
-            <a:normAutofit/>
-          </a:bodyPr>
-          <a:p>
-            <a:endParaRPr b="0" lang="en-US" sz="2800" spc="-1" strike="noStrike">
-              <a:solidFill>
-                <a:srgbClr val="000000"/>
-              </a:solidFill>
-              <a:latin typeface="Calibri"/>
-            </a:endParaRPr>
-          </a:p>
-        </p:txBody>
-      </p:sp>
-      <p:sp>
-        <p:nvSpPr>
-          <p:cNvPr id="28" name="PlaceHolder 3"/>
-          <p:cNvSpPr>
-            <a:spLocks noGrp="1"/>
-          </p:cNvSpPr>
-          <p:nvPr>
-            <p:ph type="body"/>
+          <a:noFill/>
+          <a:ln w="0">
+            <a:noFill/>
+          </a:ln>
+        </p:spPr>
+        <p:txBody>
+          <a:bodyPr lIns="0" rIns="0" tIns="0" bIns="0" anchor="t">
+            <a:normAutofit/>
+          </a:bodyPr>
+          <a:p>
+            <a:endParaRPr b="0" lang="en-IN" sz="3200" spc="-1" strike="noStrike">
+              <a:latin typeface="Arial"/>
+            </a:endParaRPr>
+          </a:p>
+        </p:txBody>
+      </p:sp>
+      <p:sp>
+        <p:nvSpPr>
+          <p:cNvPr id="25" name="PlaceHolder 3"/>
+          <p:cNvSpPr>
+            <a:spLocks noGrp="1"/>
+          </p:cNvSpPr>
+          <p:nvPr>
+            <p:ph/>
           </p:nvPr>
         </p:nvSpPr>
         <p:spPr>
@@ -135,17 +138,18 @@
           <a:prstGeom prst="rect">
             <a:avLst/>
           </a:prstGeom>
-        </p:spPr>
-        <p:txBody>
-          <a:bodyPr lIns="0" rIns="0" tIns="0" bIns="0">
-            <a:normAutofit/>
-          </a:bodyPr>
-          <a:p>
-            <a:endParaRPr b="0" lang="en-US" sz="2800" spc="-1" strike="noStrike">
-              <a:solidFill>
-                <a:srgbClr val="000000"/>
-              </a:solidFill>
-              <a:latin typeface="Calibri"/>
+          <a:noFill/>
+          <a:ln w="0">
+            <a:noFill/>
+          </a:ln>
+        </p:spPr>
+        <p:txBody>
+          <a:bodyPr lIns="0" rIns="0" tIns="0" bIns="0" anchor="t">
+            <a:normAutofit/>
+          </a:bodyPr>
+          <a:p>
+            <a:endParaRPr b="0" lang="en-IN" sz="3200" spc="-1" strike="noStrike">
+              <a:latin typeface="Arial"/>
             </a:endParaRPr>
           </a:p>
         </p:txBody>
@@ -174,7 +178,7 @@
       </p:grpSpPr>
       <p:sp>
         <p:nvSpPr>
-          <p:cNvPr id="29" name="PlaceHolder 1"/>
+          <p:cNvPr id="26" name="PlaceHolder 1"/>
           <p:cNvSpPr>
             <a:spLocks noGrp="1"/>
           </p:cNvSpPr>
@@ -185,34 +189,36 @@
         <p:spPr>
           <a:xfrm>
             <a:off x="1523880" y="1122480"/>
-            <a:ext cx="9143640" cy="2387160"/>
-          </a:xfrm>
-          <a:prstGeom prst="rect">
-            <a:avLst/>
-          </a:prstGeom>
+            <a:ext cx="9143280" cy="2386800"/>
+          </a:xfrm>
+          <a:prstGeom prst="rect">
+            <a:avLst/>
+          </a:prstGeom>
+          <a:noFill/>
+          <a:ln w="0">
+            <a:noFill/>
+          </a:ln>
         </p:spPr>
         <p:txBody>
           <a:bodyPr lIns="0" rIns="0" tIns="0" bIns="0" anchor="ctr">
             <a:noAutofit/>
           </a:bodyPr>
           <a:p>
-            <a:endParaRPr b="0" lang="en-US" sz="1800" spc="-1" strike="noStrike">
-              <a:solidFill>
-                <a:srgbClr val="000000"/>
-              </a:solidFill>
-              <a:latin typeface="Calibri"/>
-            </a:endParaRPr>
-          </a:p>
-        </p:txBody>
-      </p:sp>
-      <p:sp>
-        <p:nvSpPr>
-          <p:cNvPr id="30" name="PlaceHolder 2"/>
-          <p:cNvSpPr>
-            <a:spLocks noGrp="1"/>
-          </p:cNvSpPr>
-          <p:nvPr>
-            <p:ph type="body"/>
+            <a:pPr algn="ctr"/>
+            <a:endParaRPr b="0" lang="en-IN" sz="4400" spc="-1" strike="noStrike">
+              <a:latin typeface="Arial"/>
+            </a:endParaRPr>
+          </a:p>
+        </p:txBody>
+      </p:sp>
+      <p:sp>
+        <p:nvSpPr>
+          <p:cNvPr id="27" name="PlaceHolder 2"/>
+          <p:cNvSpPr>
+            <a:spLocks noGrp="1"/>
+          </p:cNvSpPr>
+          <p:nvPr>
+            <p:ph/>
           </p:nvPr>
         </p:nvSpPr>
         <p:spPr>
@@ -223,29 +229,30 @@
           <a:prstGeom prst="rect">
             <a:avLst/>
           </a:prstGeom>
-        </p:spPr>
-        <p:txBody>
-          <a:bodyPr lIns="0" rIns="0" tIns="0" bIns="0">
-            <a:normAutofit/>
-          </a:bodyPr>
-          <a:p>
-            <a:endParaRPr b="0" lang="en-US" sz="2800" spc="-1" strike="noStrike">
-              <a:solidFill>
-                <a:srgbClr val="000000"/>
-              </a:solidFill>
-              <a:latin typeface="Calibri"/>
-            </a:endParaRPr>
-          </a:p>
-        </p:txBody>
-      </p:sp>
-      <p:sp>
-        <p:nvSpPr>
-          <p:cNvPr id="31" name="PlaceHolder 3"/>
-          <p:cNvSpPr>
-            <a:spLocks noGrp="1"/>
-          </p:cNvSpPr>
-          <p:nvPr>
-            <p:ph type="body"/>
+          <a:noFill/>
+          <a:ln w="0">
+            <a:noFill/>
+          </a:ln>
+        </p:spPr>
+        <p:txBody>
+          <a:bodyPr lIns="0" rIns="0" tIns="0" bIns="0" anchor="t">
+            <a:normAutofit/>
+          </a:bodyPr>
+          <a:p>
+            <a:endParaRPr b="0" lang="en-IN" sz="3200" spc="-1" strike="noStrike">
+              <a:latin typeface="Arial"/>
+            </a:endParaRPr>
+          </a:p>
+        </p:txBody>
+      </p:sp>
+      <p:sp>
+        <p:nvSpPr>
+          <p:cNvPr id="28" name="PlaceHolder 3"/>
+          <p:cNvSpPr>
+            <a:spLocks noGrp="1"/>
+          </p:cNvSpPr>
+          <p:nvPr>
+            <p:ph/>
           </p:nvPr>
         </p:nvSpPr>
         <p:spPr>
@@ -256,29 +263,30 @@
           <a:prstGeom prst="rect">
             <a:avLst/>
           </a:prstGeom>
-        </p:spPr>
-        <p:txBody>
-          <a:bodyPr lIns="0" rIns="0" tIns="0" bIns="0">
-            <a:normAutofit/>
-          </a:bodyPr>
-          <a:p>
-            <a:endParaRPr b="0" lang="en-US" sz="2800" spc="-1" strike="noStrike">
-              <a:solidFill>
-                <a:srgbClr val="000000"/>
-              </a:solidFill>
-              <a:latin typeface="Calibri"/>
-            </a:endParaRPr>
-          </a:p>
-        </p:txBody>
-      </p:sp>
-      <p:sp>
-        <p:nvSpPr>
-          <p:cNvPr id="32" name="PlaceHolder 4"/>
-          <p:cNvSpPr>
-            <a:spLocks noGrp="1"/>
-          </p:cNvSpPr>
-          <p:nvPr>
-            <p:ph type="body"/>
+          <a:noFill/>
+          <a:ln w="0">
+            <a:noFill/>
+          </a:ln>
+        </p:spPr>
+        <p:txBody>
+          <a:bodyPr lIns="0" rIns="0" tIns="0" bIns="0" anchor="t">
+            <a:normAutofit/>
+          </a:bodyPr>
+          <a:p>
+            <a:endParaRPr b="0" lang="en-IN" sz="3200" spc="-1" strike="noStrike">
+              <a:latin typeface="Arial"/>
+            </a:endParaRPr>
+          </a:p>
+        </p:txBody>
+      </p:sp>
+      <p:sp>
+        <p:nvSpPr>
+          <p:cNvPr id="29" name="PlaceHolder 4"/>
+          <p:cNvSpPr>
+            <a:spLocks noGrp="1"/>
+          </p:cNvSpPr>
+          <p:nvPr>
+            <p:ph/>
           </p:nvPr>
         </p:nvSpPr>
         <p:spPr>
@@ -289,29 +297,30 @@
           <a:prstGeom prst="rect">
             <a:avLst/>
           </a:prstGeom>
-        </p:spPr>
-        <p:txBody>
-          <a:bodyPr lIns="0" rIns="0" tIns="0" bIns="0">
-            <a:normAutofit/>
-          </a:bodyPr>
-          <a:p>
-            <a:endParaRPr b="0" lang="en-US" sz="2800" spc="-1" strike="noStrike">
-              <a:solidFill>
-                <a:srgbClr val="000000"/>
-              </a:solidFill>
-              <a:latin typeface="Calibri"/>
-            </a:endParaRPr>
-          </a:p>
-        </p:txBody>
-      </p:sp>
-      <p:sp>
-        <p:nvSpPr>
-          <p:cNvPr id="33" name="PlaceHolder 5"/>
-          <p:cNvSpPr>
-            <a:spLocks noGrp="1"/>
-          </p:cNvSpPr>
-          <p:nvPr>
-            <p:ph type="body"/>
+          <a:noFill/>
+          <a:ln w="0">
+            <a:noFill/>
+          </a:ln>
+        </p:spPr>
+        <p:txBody>
+          <a:bodyPr lIns="0" rIns="0" tIns="0" bIns="0" anchor="t">
+            <a:normAutofit/>
+          </a:bodyPr>
+          <a:p>
+            <a:endParaRPr b="0" lang="en-IN" sz="3200" spc="-1" strike="noStrike">
+              <a:latin typeface="Arial"/>
+            </a:endParaRPr>
+          </a:p>
+        </p:txBody>
+      </p:sp>
+      <p:sp>
+        <p:nvSpPr>
+          <p:cNvPr id="30" name="PlaceHolder 5"/>
+          <p:cNvSpPr>
+            <a:spLocks noGrp="1"/>
+          </p:cNvSpPr>
+          <p:nvPr>
+            <p:ph/>
           </p:nvPr>
         </p:nvSpPr>
         <p:spPr>
@@ -322,17 +331,18 @@
           <a:prstGeom prst="rect">
             <a:avLst/>
           </a:prstGeom>
-        </p:spPr>
-        <p:txBody>
-          <a:bodyPr lIns="0" rIns="0" tIns="0" bIns="0">
-            <a:normAutofit/>
-          </a:bodyPr>
-          <a:p>
-            <a:endParaRPr b="0" lang="en-US" sz="2800" spc="-1" strike="noStrike">
-              <a:solidFill>
-                <a:srgbClr val="000000"/>
-              </a:solidFill>
-              <a:latin typeface="Calibri"/>
+          <a:noFill/>
+          <a:ln w="0">
+            <a:noFill/>
+          </a:ln>
+        </p:spPr>
+        <p:txBody>
+          <a:bodyPr lIns="0" rIns="0" tIns="0" bIns="0" anchor="t">
+            <a:normAutofit/>
+          </a:bodyPr>
+          <a:p>
+            <a:endParaRPr b="0" lang="en-IN" sz="3200" spc="-1" strike="noStrike">
+              <a:latin typeface="Arial"/>
             </a:endParaRPr>
           </a:p>
         </p:txBody>
@@ -361,7 +371,7 @@
       </p:grpSpPr>
       <p:sp>
         <p:nvSpPr>
-          <p:cNvPr id="34" name="PlaceHolder 1"/>
+          <p:cNvPr id="31" name="PlaceHolder 1"/>
           <p:cNvSpPr>
             <a:spLocks noGrp="1"/>
           </p:cNvSpPr>
@@ -372,34 +382,36 @@
         <p:spPr>
           <a:xfrm>
             <a:off x="1523880" y="1122480"/>
-            <a:ext cx="9143640" cy="2387160"/>
-          </a:xfrm>
-          <a:prstGeom prst="rect">
-            <a:avLst/>
-          </a:prstGeom>
+            <a:ext cx="9143280" cy="2386800"/>
+          </a:xfrm>
+          <a:prstGeom prst="rect">
+            <a:avLst/>
+          </a:prstGeom>
+          <a:noFill/>
+          <a:ln w="0">
+            <a:noFill/>
+          </a:ln>
         </p:spPr>
         <p:txBody>
           <a:bodyPr lIns="0" rIns="0" tIns="0" bIns="0" anchor="ctr">
             <a:noAutofit/>
           </a:bodyPr>
           <a:p>
-            <a:endParaRPr b="0" lang="en-US" sz="1800" spc="-1" strike="noStrike">
-              <a:solidFill>
-                <a:srgbClr val="000000"/>
-              </a:solidFill>
-              <a:latin typeface="Calibri"/>
-            </a:endParaRPr>
-          </a:p>
-        </p:txBody>
-      </p:sp>
-      <p:sp>
-        <p:nvSpPr>
-          <p:cNvPr id="35" name="PlaceHolder 2"/>
-          <p:cNvSpPr>
-            <a:spLocks noGrp="1"/>
-          </p:cNvSpPr>
-          <p:nvPr>
-            <p:ph type="body"/>
+            <a:pPr algn="ctr"/>
+            <a:endParaRPr b="0" lang="en-IN" sz="4400" spc="-1" strike="noStrike">
+              <a:latin typeface="Arial"/>
+            </a:endParaRPr>
+          </a:p>
+        </p:txBody>
+      </p:sp>
+      <p:sp>
+        <p:nvSpPr>
+          <p:cNvPr id="32" name="PlaceHolder 2"/>
+          <p:cNvSpPr>
+            <a:spLocks noGrp="1"/>
+          </p:cNvSpPr>
+          <p:nvPr>
+            <p:ph/>
           </p:nvPr>
         </p:nvSpPr>
         <p:spPr>
@@ -410,29 +422,30 @@
           <a:prstGeom prst="rect">
             <a:avLst/>
           </a:prstGeom>
-        </p:spPr>
-        <p:txBody>
-          <a:bodyPr lIns="0" rIns="0" tIns="0" bIns="0">
-            <a:normAutofit/>
-          </a:bodyPr>
-          <a:p>
-            <a:endParaRPr b="0" lang="en-US" sz="2800" spc="-1" strike="noStrike">
-              <a:solidFill>
-                <a:srgbClr val="000000"/>
-              </a:solidFill>
-              <a:latin typeface="Calibri"/>
-            </a:endParaRPr>
-          </a:p>
-        </p:txBody>
-      </p:sp>
-      <p:sp>
-        <p:nvSpPr>
-          <p:cNvPr id="36" name="PlaceHolder 3"/>
-          <p:cNvSpPr>
-            <a:spLocks noGrp="1"/>
-          </p:cNvSpPr>
-          <p:nvPr>
-            <p:ph type="body"/>
+          <a:noFill/>
+          <a:ln w="0">
+            <a:noFill/>
+          </a:ln>
+        </p:spPr>
+        <p:txBody>
+          <a:bodyPr lIns="0" rIns="0" tIns="0" bIns="0" anchor="t">
+            <a:normAutofit/>
+          </a:bodyPr>
+          <a:p>
+            <a:endParaRPr b="0" lang="en-IN" sz="3200" spc="-1" strike="noStrike">
+              <a:latin typeface="Arial"/>
+            </a:endParaRPr>
+          </a:p>
+        </p:txBody>
+      </p:sp>
+      <p:sp>
+        <p:nvSpPr>
+          <p:cNvPr id="33" name="PlaceHolder 3"/>
+          <p:cNvSpPr>
+            <a:spLocks noGrp="1"/>
+          </p:cNvSpPr>
+          <p:nvPr>
+            <p:ph/>
           </p:nvPr>
         </p:nvSpPr>
         <p:spPr>
@@ -443,29 +456,30 @@
           <a:prstGeom prst="rect">
             <a:avLst/>
           </a:prstGeom>
-        </p:spPr>
-        <p:txBody>
-          <a:bodyPr lIns="0" rIns="0" tIns="0" bIns="0">
-            <a:normAutofit/>
-          </a:bodyPr>
-          <a:p>
-            <a:endParaRPr b="0" lang="en-US" sz="2800" spc="-1" strike="noStrike">
-              <a:solidFill>
-                <a:srgbClr val="000000"/>
-              </a:solidFill>
-              <a:latin typeface="Calibri"/>
-            </a:endParaRPr>
-          </a:p>
-        </p:txBody>
-      </p:sp>
-      <p:sp>
-        <p:nvSpPr>
-          <p:cNvPr id="37" name="PlaceHolder 4"/>
-          <p:cNvSpPr>
-            <a:spLocks noGrp="1"/>
-          </p:cNvSpPr>
-          <p:nvPr>
-            <p:ph type="body"/>
+          <a:noFill/>
+          <a:ln w="0">
+            <a:noFill/>
+          </a:ln>
+        </p:spPr>
+        <p:txBody>
+          <a:bodyPr lIns="0" rIns="0" tIns="0" bIns="0" anchor="t">
+            <a:normAutofit/>
+          </a:bodyPr>
+          <a:p>
+            <a:endParaRPr b="0" lang="en-IN" sz="3200" spc="-1" strike="noStrike">
+              <a:latin typeface="Arial"/>
+            </a:endParaRPr>
+          </a:p>
+        </p:txBody>
+      </p:sp>
+      <p:sp>
+        <p:nvSpPr>
+          <p:cNvPr id="34" name="PlaceHolder 4"/>
+          <p:cNvSpPr>
+            <a:spLocks noGrp="1"/>
+          </p:cNvSpPr>
+          <p:nvPr>
+            <p:ph/>
           </p:nvPr>
         </p:nvSpPr>
         <p:spPr>
@@ -476,29 +490,30 @@
           <a:prstGeom prst="rect">
             <a:avLst/>
           </a:prstGeom>
-        </p:spPr>
-        <p:txBody>
-          <a:bodyPr lIns="0" rIns="0" tIns="0" bIns="0">
-            <a:normAutofit/>
-          </a:bodyPr>
-          <a:p>
-            <a:endParaRPr b="0" lang="en-US" sz="2800" spc="-1" strike="noStrike">
-              <a:solidFill>
-                <a:srgbClr val="000000"/>
-              </a:solidFill>
-              <a:latin typeface="Calibri"/>
-            </a:endParaRPr>
-          </a:p>
-        </p:txBody>
-      </p:sp>
-      <p:sp>
-        <p:nvSpPr>
-          <p:cNvPr id="38" name="PlaceHolder 5"/>
-          <p:cNvSpPr>
-            <a:spLocks noGrp="1"/>
-          </p:cNvSpPr>
-          <p:nvPr>
-            <p:ph type="body"/>
+          <a:noFill/>
+          <a:ln w="0">
+            <a:noFill/>
+          </a:ln>
+        </p:spPr>
+        <p:txBody>
+          <a:bodyPr lIns="0" rIns="0" tIns="0" bIns="0" anchor="t">
+            <a:normAutofit/>
+          </a:bodyPr>
+          <a:p>
+            <a:endParaRPr b="0" lang="en-IN" sz="3200" spc="-1" strike="noStrike">
+              <a:latin typeface="Arial"/>
+            </a:endParaRPr>
+          </a:p>
+        </p:txBody>
+      </p:sp>
+      <p:sp>
+        <p:nvSpPr>
+          <p:cNvPr id="35" name="PlaceHolder 5"/>
+          <p:cNvSpPr>
+            <a:spLocks noGrp="1"/>
+          </p:cNvSpPr>
+          <p:nvPr>
+            <p:ph/>
           </p:nvPr>
         </p:nvSpPr>
         <p:spPr>
@@ -509,29 +524,30 @@
           <a:prstGeom prst="rect">
             <a:avLst/>
           </a:prstGeom>
-        </p:spPr>
-        <p:txBody>
-          <a:bodyPr lIns="0" rIns="0" tIns="0" bIns="0">
-            <a:normAutofit/>
-          </a:bodyPr>
-          <a:p>
-            <a:endParaRPr b="0" lang="en-US" sz="2800" spc="-1" strike="noStrike">
-              <a:solidFill>
-                <a:srgbClr val="000000"/>
-              </a:solidFill>
-              <a:latin typeface="Calibri"/>
-            </a:endParaRPr>
-          </a:p>
-        </p:txBody>
-      </p:sp>
-      <p:sp>
-        <p:nvSpPr>
-          <p:cNvPr id="39" name="PlaceHolder 6"/>
-          <p:cNvSpPr>
-            <a:spLocks noGrp="1"/>
-          </p:cNvSpPr>
-          <p:nvPr>
-            <p:ph type="body"/>
+          <a:noFill/>
+          <a:ln w="0">
+            <a:noFill/>
+          </a:ln>
+        </p:spPr>
+        <p:txBody>
+          <a:bodyPr lIns="0" rIns="0" tIns="0" bIns="0" anchor="t">
+            <a:normAutofit/>
+          </a:bodyPr>
+          <a:p>
+            <a:endParaRPr b="0" lang="en-IN" sz="3200" spc="-1" strike="noStrike">
+              <a:latin typeface="Arial"/>
+            </a:endParaRPr>
+          </a:p>
+        </p:txBody>
+      </p:sp>
+      <p:sp>
+        <p:nvSpPr>
+          <p:cNvPr id="36" name="PlaceHolder 6"/>
+          <p:cNvSpPr>
+            <a:spLocks noGrp="1"/>
+          </p:cNvSpPr>
+          <p:nvPr>
+            <p:ph/>
           </p:nvPr>
         </p:nvSpPr>
         <p:spPr>
@@ -542,29 +558,30 @@
           <a:prstGeom prst="rect">
             <a:avLst/>
           </a:prstGeom>
-        </p:spPr>
-        <p:txBody>
-          <a:bodyPr lIns="0" rIns="0" tIns="0" bIns="0">
-            <a:normAutofit/>
-          </a:bodyPr>
-          <a:p>
-            <a:endParaRPr b="0" lang="en-US" sz="2800" spc="-1" strike="noStrike">
-              <a:solidFill>
-                <a:srgbClr val="000000"/>
-              </a:solidFill>
-              <a:latin typeface="Calibri"/>
-            </a:endParaRPr>
-          </a:p>
-        </p:txBody>
-      </p:sp>
-      <p:sp>
-        <p:nvSpPr>
-          <p:cNvPr id="40" name="PlaceHolder 7"/>
-          <p:cNvSpPr>
-            <a:spLocks noGrp="1"/>
-          </p:cNvSpPr>
-          <p:nvPr>
-            <p:ph type="body"/>
+          <a:noFill/>
+          <a:ln w="0">
+            <a:noFill/>
+          </a:ln>
+        </p:spPr>
+        <p:txBody>
+          <a:bodyPr lIns="0" rIns="0" tIns="0" bIns="0" anchor="t">
+            <a:normAutofit/>
+          </a:bodyPr>
+          <a:p>
+            <a:endParaRPr b="0" lang="en-IN" sz="3200" spc="-1" strike="noStrike">
+              <a:latin typeface="Arial"/>
+            </a:endParaRPr>
+          </a:p>
+        </p:txBody>
+      </p:sp>
+      <p:sp>
+        <p:nvSpPr>
+          <p:cNvPr id="37" name="PlaceHolder 7"/>
+          <p:cNvSpPr>
+            <a:spLocks noGrp="1"/>
+          </p:cNvSpPr>
+          <p:nvPr>
+            <p:ph/>
           </p:nvPr>
         </p:nvSpPr>
         <p:spPr>
@@ -575,17 +592,18 @@
           <a:prstGeom prst="rect">
             <a:avLst/>
           </a:prstGeom>
-        </p:spPr>
-        <p:txBody>
-          <a:bodyPr lIns="0" rIns="0" tIns="0" bIns="0">
-            <a:normAutofit/>
-          </a:bodyPr>
-          <a:p>
-            <a:endParaRPr b="0" lang="en-US" sz="2800" spc="-1" strike="noStrike">
-              <a:solidFill>
-                <a:srgbClr val="000000"/>
-              </a:solidFill>
-              <a:latin typeface="Calibri"/>
+          <a:noFill/>
+          <a:ln w="0">
+            <a:noFill/>
+          </a:ln>
+        </p:spPr>
+        <p:txBody>
+          <a:bodyPr lIns="0" rIns="0" tIns="0" bIns="0" anchor="t">
+            <a:normAutofit/>
+          </a:bodyPr>
+          <a:p>
+            <a:endParaRPr b="0" lang="en-IN" sz="3200" spc="-1" strike="noStrike">
+              <a:latin typeface="Arial"/>
             </a:endParaRPr>
           </a:p>
         </p:txBody>
@@ -614,7 +632,7 @@
       </p:grpSpPr>
       <p:sp>
         <p:nvSpPr>
-          <p:cNvPr id="5" name="PlaceHolder 1"/>
+          <p:cNvPr id="2" name="PlaceHolder 1"/>
           <p:cNvSpPr>
             <a:spLocks noGrp="1"/>
           </p:cNvSpPr>
@@ -625,29 +643,31 @@
         <p:spPr>
           <a:xfrm>
             <a:off x="1523880" y="1122480"/>
-            <a:ext cx="9143640" cy="2387160"/>
-          </a:xfrm>
-          <a:prstGeom prst="rect">
-            <a:avLst/>
-          </a:prstGeom>
+            <a:ext cx="9143280" cy="2386800"/>
+          </a:xfrm>
+          <a:prstGeom prst="rect">
+            <a:avLst/>
+          </a:prstGeom>
+          <a:noFill/>
+          <a:ln w="0">
+            <a:noFill/>
+          </a:ln>
         </p:spPr>
         <p:txBody>
           <a:bodyPr lIns="0" rIns="0" tIns="0" bIns="0" anchor="ctr">
             <a:noAutofit/>
           </a:bodyPr>
           <a:p>
-            <a:endParaRPr b="0" lang="en-US" sz="1800" spc="-1" strike="noStrike">
-              <a:solidFill>
-                <a:srgbClr val="000000"/>
-              </a:solidFill>
-              <a:latin typeface="Calibri"/>
-            </a:endParaRPr>
-          </a:p>
-        </p:txBody>
-      </p:sp>
-      <p:sp>
-        <p:nvSpPr>
-          <p:cNvPr id="6" name="PlaceHolder 2"/>
+            <a:pPr algn="ctr"/>
+            <a:endParaRPr b="0" lang="en-IN" sz="4400" spc="-1" strike="noStrike">
+              <a:latin typeface="Arial"/>
+            </a:endParaRPr>
+          </a:p>
+        </p:txBody>
+      </p:sp>
+      <p:sp>
+        <p:nvSpPr>
+          <p:cNvPr id="3" name="PlaceHolder 2"/>
           <p:cNvSpPr>
             <a:spLocks noGrp="1"/>
           </p:cNvSpPr>
@@ -663,6 +683,10 @@
           <a:prstGeom prst="rect">
             <a:avLst/>
           </a:prstGeom>
+          <a:noFill/>
+          <a:ln w="0">
+            <a:noFill/>
+          </a:ln>
         </p:spPr>
         <p:txBody>
           <a:bodyPr lIns="0" rIns="0" tIns="0" bIns="0" anchor="ctr">
@@ -700,7 +724,7 @@
       </p:grpSpPr>
       <p:sp>
         <p:nvSpPr>
-          <p:cNvPr id="7" name="PlaceHolder 1"/>
+          <p:cNvPr id="4" name="PlaceHolder 1"/>
           <p:cNvSpPr>
             <a:spLocks noGrp="1"/>
           </p:cNvSpPr>
@@ -711,34 +735,36 @@
         <p:spPr>
           <a:xfrm>
             <a:off x="1523880" y="1122480"/>
-            <a:ext cx="9143640" cy="2387160"/>
-          </a:xfrm>
-          <a:prstGeom prst="rect">
-            <a:avLst/>
-          </a:prstGeom>
+            <a:ext cx="9143280" cy="2386800"/>
+          </a:xfrm>
+          <a:prstGeom prst="rect">
+            <a:avLst/>
+          </a:prstGeom>
+          <a:noFill/>
+          <a:ln w="0">
+            <a:noFill/>
+          </a:ln>
         </p:spPr>
         <p:txBody>
           <a:bodyPr lIns="0" rIns="0" tIns="0" bIns="0" anchor="ctr">
             <a:noAutofit/>
           </a:bodyPr>
           <a:p>
-            <a:endParaRPr b="0" lang="en-US" sz="1800" spc="-1" strike="noStrike">
-              <a:solidFill>
-                <a:srgbClr val="000000"/>
-              </a:solidFill>
-              <a:latin typeface="Calibri"/>
-            </a:endParaRPr>
-          </a:p>
-        </p:txBody>
-      </p:sp>
-      <p:sp>
-        <p:nvSpPr>
-          <p:cNvPr id="8" name="PlaceHolder 2"/>
-          <p:cNvSpPr>
-            <a:spLocks noGrp="1"/>
-          </p:cNvSpPr>
-          <p:nvPr>
-            <p:ph type="body"/>
+            <a:pPr algn="ctr"/>
+            <a:endParaRPr b="0" lang="en-IN" sz="4400" spc="-1" strike="noStrike">
+              <a:latin typeface="Arial"/>
+            </a:endParaRPr>
+          </a:p>
+        </p:txBody>
+      </p:sp>
+      <p:sp>
+        <p:nvSpPr>
+          <p:cNvPr id="5" name="PlaceHolder 2"/>
+          <p:cNvSpPr>
+            <a:spLocks noGrp="1"/>
+          </p:cNvSpPr>
+          <p:nvPr>
+            <p:ph/>
           </p:nvPr>
         </p:nvSpPr>
         <p:spPr>
@@ -749,17 +775,18 @@
           <a:prstGeom prst="rect">
             <a:avLst/>
           </a:prstGeom>
-        </p:spPr>
-        <p:txBody>
-          <a:bodyPr lIns="0" rIns="0" tIns="0" bIns="0">
-            <a:normAutofit/>
-          </a:bodyPr>
-          <a:p>
-            <a:endParaRPr b="0" lang="en-US" sz="2800" spc="-1" strike="noStrike">
-              <a:solidFill>
-                <a:srgbClr val="000000"/>
-              </a:solidFill>
-              <a:latin typeface="Calibri"/>
+          <a:noFill/>
+          <a:ln w="0">
+            <a:noFill/>
+          </a:ln>
+        </p:spPr>
+        <p:txBody>
+          <a:bodyPr lIns="0" rIns="0" tIns="0" bIns="0" anchor="t">
+            <a:normAutofit/>
+          </a:bodyPr>
+          <a:p>
+            <a:endParaRPr b="0" lang="en-IN" sz="3200" spc="-1" strike="noStrike">
+              <a:latin typeface="Arial"/>
             </a:endParaRPr>
           </a:p>
         </p:txBody>
@@ -788,7 +815,7 @@
       </p:grpSpPr>
       <p:sp>
         <p:nvSpPr>
-          <p:cNvPr id="9" name="PlaceHolder 1"/>
+          <p:cNvPr id="6" name="PlaceHolder 1"/>
           <p:cNvSpPr>
             <a:spLocks noGrp="1"/>
           </p:cNvSpPr>
@@ -799,34 +826,36 @@
         <p:spPr>
           <a:xfrm>
             <a:off x="1523880" y="1122480"/>
-            <a:ext cx="9143640" cy="2387160"/>
-          </a:xfrm>
-          <a:prstGeom prst="rect">
-            <a:avLst/>
-          </a:prstGeom>
+            <a:ext cx="9143280" cy="2386800"/>
+          </a:xfrm>
+          <a:prstGeom prst="rect">
+            <a:avLst/>
+          </a:prstGeom>
+          <a:noFill/>
+          <a:ln w="0">
+            <a:noFill/>
+          </a:ln>
         </p:spPr>
         <p:txBody>
           <a:bodyPr lIns="0" rIns="0" tIns="0" bIns="0" anchor="ctr">
             <a:noAutofit/>
           </a:bodyPr>
           <a:p>
-            <a:endParaRPr b="0" lang="en-US" sz="1800" spc="-1" strike="noStrike">
-              <a:solidFill>
-                <a:srgbClr val="000000"/>
-              </a:solidFill>
-              <a:latin typeface="Calibri"/>
-            </a:endParaRPr>
-          </a:p>
-        </p:txBody>
-      </p:sp>
-      <p:sp>
-        <p:nvSpPr>
-          <p:cNvPr id="10" name="PlaceHolder 2"/>
-          <p:cNvSpPr>
-            <a:spLocks noGrp="1"/>
-          </p:cNvSpPr>
-          <p:nvPr>
-            <p:ph type="body"/>
+            <a:pPr algn="ctr"/>
+            <a:endParaRPr b="0" lang="en-IN" sz="4400" spc="-1" strike="noStrike">
+              <a:latin typeface="Arial"/>
+            </a:endParaRPr>
+          </a:p>
+        </p:txBody>
+      </p:sp>
+      <p:sp>
+        <p:nvSpPr>
+          <p:cNvPr id="7" name="PlaceHolder 2"/>
+          <p:cNvSpPr>
+            <a:spLocks noGrp="1"/>
+          </p:cNvSpPr>
+          <p:nvPr>
+            <p:ph/>
           </p:nvPr>
         </p:nvSpPr>
         <p:spPr>
@@ -837,29 +866,30 @@
           <a:prstGeom prst="rect">
             <a:avLst/>
           </a:prstGeom>
-        </p:spPr>
-        <p:txBody>
-          <a:bodyPr lIns="0" rIns="0" tIns="0" bIns="0">
-            <a:normAutofit/>
-          </a:bodyPr>
-          <a:p>
-            <a:endParaRPr b="0" lang="en-US" sz="2800" spc="-1" strike="noStrike">
-              <a:solidFill>
-                <a:srgbClr val="000000"/>
-              </a:solidFill>
-              <a:latin typeface="Calibri"/>
-            </a:endParaRPr>
-          </a:p>
-        </p:txBody>
-      </p:sp>
-      <p:sp>
-        <p:nvSpPr>
-          <p:cNvPr id="11" name="PlaceHolder 3"/>
-          <p:cNvSpPr>
-            <a:spLocks noGrp="1"/>
-          </p:cNvSpPr>
-          <p:nvPr>
-            <p:ph type="body"/>
+          <a:noFill/>
+          <a:ln w="0">
+            <a:noFill/>
+          </a:ln>
+        </p:spPr>
+        <p:txBody>
+          <a:bodyPr lIns="0" rIns="0" tIns="0" bIns="0" anchor="t">
+            <a:normAutofit/>
+          </a:bodyPr>
+          <a:p>
+            <a:endParaRPr b="0" lang="en-IN" sz="3200" spc="-1" strike="noStrike">
+              <a:latin typeface="Arial"/>
+            </a:endParaRPr>
+          </a:p>
+        </p:txBody>
+      </p:sp>
+      <p:sp>
+        <p:nvSpPr>
+          <p:cNvPr id="8" name="PlaceHolder 3"/>
+          <p:cNvSpPr>
+            <a:spLocks noGrp="1"/>
+          </p:cNvSpPr>
+          <p:nvPr>
+            <p:ph/>
           </p:nvPr>
         </p:nvSpPr>
         <p:spPr>
@@ -870,17 +900,18 @@
           <a:prstGeom prst="rect">
             <a:avLst/>
           </a:prstGeom>
-        </p:spPr>
-        <p:txBody>
-          <a:bodyPr lIns="0" rIns="0" tIns="0" bIns="0">
-            <a:normAutofit/>
-          </a:bodyPr>
-          <a:p>
-            <a:endParaRPr b="0" lang="en-US" sz="2800" spc="-1" strike="noStrike">
-              <a:solidFill>
-                <a:srgbClr val="000000"/>
-              </a:solidFill>
-              <a:latin typeface="Calibri"/>
+          <a:noFill/>
+          <a:ln w="0">
+            <a:noFill/>
+          </a:ln>
+        </p:spPr>
+        <p:txBody>
+          <a:bodyPr lIns="0" rIns="0" tIns="0" bIns="0" anchor="t">
+            <a:normAutofit/>
+          </a:bodyPr>
+          <a:p>
+            <a:endParaRPr b="0" lang="en-IN" sz="3200" spc="-1" strike="noStrike">
+              <a:latin typeface="Arial"/>
             </a:endParaRPr>
           </a:p>
         </p:txBody>
@@ -909,7 +940,7 @@
       </p:grpSpPr>
       <p:sp>
         <p:nvSpPr>
-          <p:cNvPr id="12" name="PlaceHolder 1"/>
+          <p:cNvPr id="9" name="PlaceHolder 1"/>
           <p:cNvSpPr>
             <a:spLocks noGrp="1"/>
           </p:cNvSpPr>
@@ -920,22 +951,24 @@
         <p:spPr>
           <a:xfrm>
             <a:off x="1523880" y="1122480"/>
-            <a:ext cx="9143640" cy="2387160"/>
-          </a:xfrm>
-          <a:prstGeom prst="rect">
-            <a:avLst/>
-          </a:prstGeom>
+            <a:ext cx="9143280" cy="2386800"/>
+          </a:xfrm>
+          <a:prstGeom prst="rect">
+            <a:avLst/>
+          </a:prstGeom>
+          <a:noFill/>
+          <a:ln w="0">
+            <a:noFill/>
+          </a:ln>
         </p:spPr>
         <p:txBody>
           <a:bodyPr lIns="0" rIns="0" tIns="0" bIns="0" anchor="ctr">
             <a:noAutofit/>
           </a:bodyPr>
           <a:p>
-            <a:endParaRPr b="0" lang="en-US" sz="1800" spc="-1" strike="noStrike">
-              <a:solidFill>
-                <a:srgbClr val="000000"/>
-              </a:solidFill>
-              <a:latin typeface="Calibri"/>
+            <a:pPr algn="ctr"/>
+            <a:endParaRPr b="0" lang="en-IN" sz="4400" spc="-1" strike="noStrike">
+              <a:latin typeface="Arial"/>
             </a:endParaRPr>
           </a:p>
         </p:txBody>
@@ -964,7 +997,7 @@
       </p:grpSpPr>
       <p:sp>
         <p:nvSpPr>
-          <p:cNvPr id="13" name="PlaceHolder 1"/>
+          <p:cNvPr id="10" name="PlaceHolder 1"/>
           <p:cNvSpPr>
             <a:spLocks noGrp="1"/>
           </p:cNvSpPr>
@@ -975,11 +1008,15 @@
         <p:spPr>
           <a:xfrm>
             <a:off x="1523880" y="1122480"/>
-            <a:ext cx="9143640" cy="11066760"/>
-          </a:xfrm>
-          <a:prstGeom prst="rect">
-            <a:avLst/>
-          </a:prstGeom>
+            <a:ext cx="9143280" cy="11064960"/>
+          </a:xfrm>
+          <a:prstGeom prst="rect">
+            <a:avLst/>
+          </a:prstGeom>
+          <a:noFill/>
+          <a:ln w="0">
+            <a:noFill/>
+          </a:ln>
         </p:spPr>
         <p:txBody>
           <a:bodyPr lIns="0" rIns="0" tIns="0" bIns="0" anchor="ctr">
@@ -1017,7 +1054,7 @@
       </p:grpSpPr>
       <p:sp>
         <p:nvSpPr>
-          <p:cNvPr id="14" name="PlaceHolder 1"/>
+          <p:cNvPr id="11" name="PlaceHolder 1"/>
           <p:cNvSpPr>
             <a:spLocks noGrp="1"/>
           </p:cNvSpPr>
@@ -1028,34 +1065,36 @@
         <p:spPr>
           <a:xfrm>
             <a:off x="1523880" y="1122480"/>
-            <a:ext cx="9143640" cy="2387160"/>
-          </a:xfrm>
-          <a:prstGeom prst="rect">
-            <a:avLst/>
-          </a:prstGeom>
+            <a:ext cx="9143280" cy="2386800"/>
+          </a:xfrm>
+          <a:prstGeom prst="rect">
+            <a:avLst/>
+          </a:prstGeom>
+          <a:noFill/>
+          <a:ln w="0">
+            <a:noFill/>
+          </a:ln>
         </p:spPr>
         <p:txBody>
           <a:bodyPr lIns="0" rIns="0" tIns="0" bIns="0" anchor="ctr">
             <a:noAutofit/>
           </a:bodyPr>
           <a:p>
-            <a:endParaRPr b="0" lang="en-US" sz="1800" spc="-1" strike="noStrike">
-              <a:solidFill>
-                <a:srgbClr val="000000"/>
-              </a:solidFill>
-              <a:latin typeface="Calibri"/>
-            </a:endParaRPr>
-          </a:p>
-        </p:txBody>
-      </p:sp>
-      <p:sp>
-        <p:nvSpPr>
-          <p:cNvPr id="15" name="PlaceHolder 2"/>
-          <p:cNvSpPr>
-            <a:spLocks noGrp="1"/>
-          </p:cNvSpPr>
-          <p:nvPr>
-            <p:ph type="body"/>
+            <a:pPr algn="ctr"/>
+            <a:endParaRPr b="0" lang="en-IN" sz="4400" spc="-1" strike="noStrike">
+              <a:latin typeface="Arial"/>
+            </a:endParaRPr>
+          </a:p>
+        </p:txBody>
+      </p:sp>
+      <p:sp>
+        <p:nvSpPr>
+          <p:cNvPr id="12" name="PlaceHolder 2"/>
+          <p:cNvSpPr>
+            <a:spLocks noGrp="1"/>
+          </p:cNvSpPr>
+          <p:nvPr>
+            <p:ph/>
           </p:nvPr>
         </p:nvSpPr>
         <p:spPr>
@@ -1066,29 +1105,30 @@
           <a:prstGeom prst="rect">
             <a:avLst/>
           </a:prstGeom>
-        </p:spPr>
-        <p:txBody>
-          <a:bodyPr lIns="0" rIns="0" tIns="0" bIns="0">
-            <a:normAutofit/>
-          </a:bodyPr>
-          <a:p>
-            <a:endParaRPr b="0" lang="en-US" sz="2800" spc="-1" strike="noStrike">
-              <a:solidFill>
-                <a:srgbClr val="000000"/>
-              </a:solidFill>
-              <a:latin typeface="Calibri"/>
-            </a:endParaRPr>
-          </a:p>
-        </p:txBody>
-      </p:sp>
-      <p:sp>
-        <p:nvSpPr>
-          <p:cNvPr id="16" name="PlaceHolder 3"/>
-          <p:cNvSpPr>
-            <a:spLocks noGrp="1"/>
-          </p:cNvSpPr>
-          <p:nvPr>
-            <p:ph type="body"/>
+          <a:noFill/>
+          <a:ln w="0">
+            <a:noFill/>
+          </a:ln>
+        </p:spPr>
+        <p:txBody>
+          <a:bodyPr lIns="0" rIns="0" tIns="0" bIns="0" anchor="t">
+            <a:normAutofit/>
+          </a:bodyPr>
+          <a:p>
+            <a:endParaRPr b="0" lang="en-IN" sz="3200" spc="-1" strike="noStrike">
+              <a:latin typeface="Arial"/>
+            </a:endParaRPr>
+          </a:p>
+        </p:txBody>
+      </p:sp>
+      <p:sp>
+        <p:nvSpPr>
+          <p:cNvPr id="13" name="PlaceHolder 3"/>
+          <p:cNvSpPr>
+            <a:spLocks noGrp="1"/>
+          </p:cNvSpPr>
+          <p:nvPr>
+            <p:ph/>
           </p:nvPr>
         </p:nvSpPr>
         <p:spPr>
@@ -1099,29 +1139,30 @@
           <a:prstGeom prst="rect">
             <a:avLst/>
           </a:prstGeom>
-        </p:spPr>
-        <p:txBody>
-          <a:bodyPr lIns="0" rIns="0" tIns="0" bIns="0">
-            <a:normAutofit/>
-          </a:bodyPr>
-          <a:p>
-            <a:endParaRPr b="0" lang="en-US" sz="2800" spc="-1" strike="noStrike">
-              <a:solidFill>
-                <a:srgbClr val="000000"/>
-              </a:solidFill>
-              <a:latin typeface="Calibri"/>
-            </a:endParaRPr>
-          </a:p>
-        </p:txBody>
-      </p:sp>
-      <p:sp>
-        <p:nvSpPr>
-          <p:cNvPr id="17" name="PlaceHolder 4"/>
-          <p:cNvSpPr>
-            <a:spLocks noGrp="1"/>
-          </p:cNvSpPr>
-          <p:nvPr>
-            <p:ph type="body"/>
+          <a:noFill/>
+          <a:ln w="0">
+            <a:noFill/>
+          </a:ln>
+        </p:spPr>
+        <p:txBody>
+          <a:bodyPr lIns="0" rIns="0" tIns="0" bIns="0" anchor="t">
+            <a:normAutofit/>
+          </a:bodyPr>
+          <a:p>
+            <a:endParaRPr b="0" lang="en-IN" sz="3200" spc="-1" strike="noStrike">
+              <a:latin typeface="Arial"/>
+            </a:endParaRPr>
+          </a:p>
+        </p:txBody>
+      </p:sp>
+      <p:sp>
+        <p:nvSpPr>
+          <p:cNvPr id="14" name="PlaceHolder 4"/>
+          <p:cNvSpPr>
+            <a:spLocks noGrp="1"/>
+          </p:cNvSpPr>
+          <p:nvPr>
+            <p:ph/>
           </p:nvPr>
         </p:nvSpPr>
         <p:spPr>
@@ -1132,17 +1173,18 @@
           <a:prstGeom prst="rect">
             <a:avLst/>
           </a:prstGeom>
-        </p:spPr>
-        <p:txBody>
-          <a:bodyPr lIns="0" rIns="0" tIns="0" bIns="0">
-            <a:normAutofit/>
-          </a:bodyPr>
-          <a:p>
-            <a:endParaRPr b="0" lang="en-US" sz="2800" spc="-1" strike="noStrike">
-              <a:solidFill>
-                <a:srgbClr val="000000"/>
-              </a:solidFill>
-              <a:latin typeface="Calibri"/>
+          <a:noFill/>
+          <a:ln w="0">
+            <a:noFill/>
+          </a:ln>
+        </p:spPr>
+        <p:txBody>
+          <a:bodyPr lIns="0" rIns="0" tIns="0" bIns="0" anchor="t">
+            <a:normAutofit/>
+          </a:bodyPr>
+          <a:p>
+            <a:endParaRPr b="0" lang="en-IN" sz="3200" spc="-1" strike="noStrike">
+              <a:latin typeface="Arial"/>
             </a:endParaRPr>
           </a:p>
         </p:txBody>
@@ -1171,7 +1213,7 @@
       </p:grpSpPr>
       <p:sp>
         <p:nvSpPr>
-          <p:cNvPr id="18" name="PlaceHolder 1"/>
+          <p:cNvPr id="15" name="PlaceHolder 1"/>
           <p:cNvSpPr>
             <a:spLocks noGrp="1"/>
           </p:cNvSpPr>
@@ -1182,34 +1224,36 @@
         <p:spPr>
           <a:xfrm>
             <a:off x="1523880" y="1122480"/>
-            <a:ext cx="9143640" cy="2387160"/>
-          </a:xfrm>
-          <a:prstGeom prst="rect">
-            <a:avLst/>
-          </a:prstGeom>
+            <a:ext cx="9143280" cy="2386800"/>
+          </a:xfrm>
+          <a:prstGeom prst="rect">
+            <a:avLst/>
+          </a:prstGeom>
+          <a:noFill/>
+          <a:ln w="0">
+            <a:noFill/>
+          </a:ln>
         </p:spPr>
         <p:txBody>
           <a:bodyPr lIns="0" rIns="0" tIns="0" bIns="0" anchor="ctr">
             <a:noAutofit/>
           </a:bodyPr>
           <a:p>
-            <a:endParaRPr b="0" lang="en-US" sz="1800" spc="-1" strike="noStrike">
-              <a:solidFill>
-                <a:srgbClr val="000000"/>
-              </a:solidFill>
-              <a:latin typeface="Calibri"/>
-            </a:endParaRPr>
-          </a:p>
-        </p:txBody>
-      </p:sp>
-      <p:sp>
-        <p:nvSpPr>
-          <p:cNvPr id="19" name="PlaceHolder 2"/>
-          <p:cNvSpPr>
-            <a:spLocks noGrp="1"/>
-          </p:cNvSpPr>
-          <p:nvPr>
-            <p:ph type="body"/>
+            <a:pPr algn="ctr"/>
+            <a:endParaRPr b="0" lang="en-IN" sz="4400" spc="-1" strike="noStrike">
+              <a:latin typeface="Arial"/>
+            </a:endParaRPr>
+          </a:p>
+        </p:txBody>
+      </p:sp>
+      <p:sp>
+        <p:nvSpPr>
+          <p:cNvPr id="16" name="PlaceHolder 2"/>
+          <p:cNvSpPr>
+            <a:spLocks noGrp="1"/>
+          </p:cNvSpPr>
+          <p:nvPr>
+            <p:ph/>
           </p:nvPr>
         </p:nvSpPr>
         <p:spPr>
@@ -1220,29 +1264,30 @@
           <a:prstGeom prst="rect">
             <a:avLst/>
           </a:prstGeom>
-        </p:spPr>
-        <p:txBody>
-          <a:bodyPr lIns="0" rIns="0" tIns="0" bIns="0">
-            <a:normAutofit/>
-          </a:bodyPr>
-          <a:p>
-            <a:endParaRPr b="0" lang="en-US" sz="2800" spc="-1" strike="noStrike">
-              <a:solidFill>
-                <a:srgbClr val="000000"/>
-              </a:solidFill>
-              <a:latin typeface="Calibri"/>
-            </a:endParaRPr>
-          </a:p>
-        </p:txBody>
-      </p:sp>
-      <p:sp>
-        <p:nvSpPr>
-          <p:cNvPr id="20" name="PlaceHolder 3"/>
-          <p:cNvSpPr>
-            <a:spLocks noGrp="1"/>
-          </p:cNvSpPr>
-          <p:nvPr>
-            <p:ph type="body"/>
+          <a:noFill/>
+          <a:ln w="0">
+            <a:noFill/>
+          </a:ln>
+        </p:spPr>
+        <p:txBody>
+          <a:bodyPr lIns="0" rIns="0" tIns="0" bIns="0" anchor="t">
+            <a:normAutofit/>
+          </a:bodyPr>
+          <a:p>
+            <a:endParaRPr b="0" lang="en-IN" sz="3200" spc="-1" strike="noStrike">
+              <a:latin typeface="Arial"/>
+            </a:endParaRPr>
+          </a:p>
+        </p:txBody>
+      </p:sp>
+      <p:sp>
+        <p:nvSpPr>
+          <p:cNvPr id="17" name="PlaceHolder 3"/>
+          <p:cNvSpPr>
+            <a:spLocks noGrp="1"/>
+          </p:cNvSpPr>
+          <p:nvPr>
+            <p:ph/>
           </p:nvPr>
         </p:nvSpPr>
         <p:spPr>
@@ -1253,29 +1298,30 @@
           <a:prstGeom prst="rect">
             <a:avLst/>
           </a:prstGeom>
-        </p:spPr>
-        <p:txBody>
-          <a:bodyPr lIns="0" rIns="0" tIns="0" bIns="0">
-            <a:normAutofit/>
-          </a:bodyPr>
-          <a:p>
-            <a:endParaRPr b="0" lang="en-US" sz="2800" spc="-1" strike="noStrike">
-              <a:solidFill>
-                <a:srgbClr val="000000"/>
-              </a:solidFill>
-              <a:latin typeface="Calibri"/>
-            </a:endParaRPr>
-          </a:p>
-        </p:txBody>
-      </p:sp>
-      <p:sp>
-        <p:nvSpPr>
-          <p:cNvPr id="21" name="PlaceHolder 4"/>
-          <p:cNvSpPr>
-            <a:spLocks noGrp="1"/>
-          </p:cNvSpPr>
-          <p:nvPr>
-            <p:ph type="body"/>
+          <a:noFill/>
+          <a:ln w="0">
+            <a:noFill/>
+          </a:ln>
+        </p:spPr>
+        <p:txBody>
+          <a:bodyPr lIns="0" rIns="0" tIns="0" bIns="0" anchor="t">
+            <a:normAutofit/>
+          </a:bodyPr>
+          <a:p>
+            <a:endParaRPr b="0" lang="en-IN" sz="3200" spc="-1" strike="noStrike">
+              <a:latin typeface="Arial"/>
+            </a:endParaRPr>
+          </a:p>
+        </p:txBody>
+      </p:sp>
+      <p:sp>
+        <p:nvSpPr>
+          <p:cNvPr id="18" name="PlaceHolder 4"/>
+          <p:cNvSpPr>
+            <a:spLocks noGrp="1"/>
+          </p:cNvSpPr>
+          <p:nvPr>
+            <p:ph/>
           </p:nvPr>
         </p:nvSpPr>
         <p:spPr>
@@ -1286,17 +1332,18 @@
           <a:prstGeom prst="rect">
             <a:avLst/>
           </a:prstGeom>
-        </p:spPr>
-        <p:txBody>
-          <a:bodyPr lIns="0" rIns="0" tIns="0" bIns="0">
-            <a:normAutofit/>
-          </a:bodyPr>
-          <a:p>
-            <a:endParaRPr b="0" lang="en-US" sz="2800" spc="-1" strike="noStrike">
-              <a:solidFill>
-                <a:srgbClr val="000000"/>
-              </a:solidFill>
-              <a:latin typeface="Calibri"/>
+          <a:noFill/>
+          <a:ln w="0">
+            <a:noFill/>
+          </a:ln>
+        </p:spPr>
+        <p:txBody>
+          <a:bodyPr lIns="0" rIns="0" tIns="0" bIns="0" anchor="t">
+            <a:normAutofit/>
+          </a:bodyPr>
+          <a:p>
+            <a:endParaRPr b="0" lang="en-IN" sz="3200" spc="-1" strike="noStrike">
+              <a:latin typeface="Arial"/>
             </a:endParaRPr>
           </a:p>
         </p:txBody>
@@ -1325,7 +1372,7 @@
       </p:grpSpPr>
       <p:sp>
         <p:nvSpPr>
-          <p:cNvPr id="22" name="PlaceHolder 1"/>
+          <p:cNvPr id="19" name="PlaceHolder 1"/>
           <p:cNvSpPr>
             <a:spLocks noGrp="1"/>
           </p:cNvSpPr>
@@ -1336,34 +1383,36 @@
         <p:spPr>
           <a:xfrm>
             <a:off x="1523880" y="1122480"/>
-            <a:ext cx="9143640" cy="2387160"/>
-          </a:xfrm>
-          <a:prstGeom prst="rect">
-            <a:avLst/>
-          </a:prstGeom>
+            <a:ext cx="9143280" cy="2386800"/>
+          </a:xfrm>
+          <a:prstGeom prst="rect">
+            <a:avLst/>
+          </a:prstGeom>
+          <a:noFill/>
+          <a:ln w="0">
+            <a:noFill/>
+          </a:ln>
         </p:spPr>
         <p:txBody>
           <a:bodyPr lIns="0" rIns="0" tIns="0" bIns="0" anchor="ctr">
             <a:noAutofit/>
           </a:bodyPr>
           <a:p>
-            <a:endParaRPr b="0" lang="en-US" sz="1800" spc="-1" strike="noStrike">
-              <a:solidFill>
-                <a:srgbClr val="000000"/>
-              </a:solidFill>
-              <a:latin typeface="Calibri"/>
-            </a:endParaRPr>
-          </a:p>
-        </p:txBody>
-      </p:sp>
-      <p:sp>
-        <p:nvSpPr>
-          <p:cNvPr id="23" name="PlaceHolder 2"/>
-          <p:cNvSpPr>
-            <a:spLocks noGrp="1"/>
-          </p:cNvSpPr>
-          <p:nvPr>
-            <p:ph type="body"/>
+            <a:pPr algn="ctr"/>
+            <a:endParaRPr b="0" lang="en-IN" sz="4400" spc="-1" strike="noStrike">
+              <a:latin typeface="Arial"/>
+            </a:endParaRPr>
+          </a:p>
+        </p:txBody>
+      </p:sp>
+      <p:sp>
+        <p:nvSpPr>
+          <p:cNvPr id="20" name="PlaceHolder 2"/>
+          <p:cNvSpPr>
+            <a:spLocks noGrp="1"/>
+          </p:cNvSpPr>
+          <p:nvPr>
+            <p:ph/>
           </p:nvPr>
         </p:nvSpPr>
         <p:spPr>
@@ -1374,29 +1423,30 @@
           <a:prstGeom prst="rect">
             <a:avLst/>
           </a:prstGeom>
-        </p:spPr>
-        <p:txBody>
-          <a:bodyPr lIns="0" rIns="0" tIns="0" bIns="0">
-            <a:normAutofit/>
-          </a:bodyPr>
-          <a:p>
-            <a:endParaRPr b="0" lang="en-US" sz="2800" spc="-1" strike="noStrike">
-              <a:solidFill>
-                <a:srgbClr val="000000"/>
-              </a:solidFill>
-              <a:latin typeface="Calibri"/>
-            </a:endParaRPr>
-          </a:p>
-        </p:txBody>
-      </p:sp>
-      <p:sp>
-        <p:nvSpPr>
-          <p:cNvPr id="24" name="PlaceHolder 3"/>
-          <p:cNvSpPr>
-            <a:spLocks noGrp="1"/>
-          </p:cNvSpPr>
-          <p:nvPr>
-            <p:ph type="body"/>
+          <a:noFill/>
+          <a:ln w="0">
+            <a:noFill/>
+          </a:ln>
+        </p:spPr>
+        <p:txBody>
+          <a:bodyPr lIns="0" rIns="0" tIns="0" bIns="0" anchor="t">
+            <a:normAutofit/>
+          </a:bodyPr>
+          <a:p>
+            <a:endParaRPr b="0" lang="en-IN" sz="3200" spc="-1" strike="noStrike">
+              <a:latin typeface="Arial"/>
+            </a:endParaRPr>
+          </a:p>
+        </p:txBody>
+      </p:sp>
+      <p:sp>
+        <p:nvSpPr>
+          <p:cNvPr id="21" name="PlaceHolder 3"/>
+          <p:cNvSpPr>
+            <a:spLocks noGrp="1"/>
+          </p:cNvSpPr>
+          <p:nvPr>
+            <p:ph/>
           </p:nvPr>
         </p:nvSpPr>
         <p:spPr>
@@ -1407,29 +1457,30 @@
           <a:prstGeom prst="rect">
             <a:avLst/>
           </a:prstGeom>
-        </p:spPr>
-        <p:txBody>
-          <a:bodyPr lIns="0" rIns="0" tIns="0" bIns="0">
-            <a:normAutofit/>
-          </a:bodyPr>
-          <a:p>
-            <a:endParaRPr b="0" lang="en-US" sz="2800" spc="-1" strike="noStrike">
-              <a:solidFill>
-                <a:srgbClr val="000000"/>
-              </a:solidFill>
-              <a:latin typeface="Calibri"/>
-            </a:endParaRPr>
-          </a:p>
-        </p:txBody>
-      </p:sp>
-      <p:sp>
-        <p:nvSpPr>
-          <p:cNvPr id="25" name="PlaceHolder 4"/>
-          <p:cNvSpPr>
-            <a:spLocks noGrp="1"/>
-          </p:cNvSpPr>
-          <p:nvPr>
-            <p:ph type="body"/>
+          <a:noFill/>
+          <a:ln w="0">
+            <a:noFill/>
+          </a:ln>
+        </p:spPr>
+        <p:txBody>
+          <a:bodyPr lIns="0" rIns="0" tIns="0" bIns="0" anchor="t">
+            <a:normAutofit/>
+          </a:bodyPr>
+          <a:p>
+            <a:endParaRPr b="0" lang="en-IN" sz="3200" spc="-1" strike="noStrike">
+              <a:latin typeface="Arial"/>
+            </a:endParaRPr>
+          </a:p>
+        </p:txBody>
+      </p:sp>
+      <p:sp>
+        <p:nvSpPr>
+          <p:cNvPr id="22" name="PlaceHolder 4"/>
+          <p:cNvSpPr>
+            <a:spLocks noGrp="1"/>
+          </p:cNvSpPr>
+          <p:nvPr>
+            <p:ph/>
           </p:nvPr>
         </p:nvSpPr>
         <p:spPr>
@@ -1440,17 +1491,18 @@
           <a:prstGeom prst="rect">
             <a:avLst/>
           </a:prstGeom>
-        </p:spPr>
-        <p:txBody>
-          <a:bodyPr lIns="0" rIns="0" tIns="0" bIns="0">
-            <a:normAutofit/>
-          </a:bodyPr>
-          <a:p>
-            <a:endParaRPr b="0" lang="en-US" sz="2800" spc="-1" strike="noStrike">
-              <a:solidFill>
-                <a:srgbClr val="000000"/>
-              </a:solidFill>
-              <a:latin typeface="Calibri"/>
+          <a:noFill/>
+          <a:ln w="0">
+            <a:noFill/>
+          </a:ln>
+        </p:spPr>
+        <p:txBody>
+          <a:bodyPr lIns="0" rIns="0" tIns="0" bIns="0" anchor="t">
+            <a:normAutofit/>
+          </a:bodyPr>
+          <a:p>
+            <a:endParaRPr b="0" lang="en-IN" sz="3200" spc="-1" strike="noStrike">
+              <a:latin typeface="Arial"/>
             </a:endParaRPr>
           </a:p>
         </p:txBody>
@@ -1497,36 +1549,35 @@
         <p:spPr>
           <a:xfrm>
             <a:off x="1523880" y="1122480"/>
-            <a:ext cx="9143640" cy="2387160"/>
-          </a:xfrm>
-          <a:prstGeom prst="rect">
-            <a:avLst/>
-          </a:prstGeom>
-        </p:spPr>
-        <p:txBody>
-          <a:bodyPr anchor="b">
+            <a:ext cx="9143280" cy="2386800"/>
+          </a:xfrm>
+          <a:prstGeom prst="rect">
+            <a:avLst/>
+          </a:prstGeom>
+          <a:noFill/>
+          <a:ln w="0">
+            <a:noFill/>
+          </a:ln>
+        </p:spPr>
+        <p:txBody>
+          <a:bodyPr lIns="0" rIns="0" tIns="0" bIns="0" anchor="ctr">
             <a:noAutofit/>
           </a:bodyPr>
           <a:p>
-            <a:pPr algn="ctr">
-              <a:lnSpc>
-                <a:spcPct val="90000"/>
-              </a:lnSpc>
-            </a:pPr>
             <a:r>
-              <a:rPr b="0" lang="en-GB" sz="6000" spc="-1" strike="noStrike">
-                <a:solidFill>
-                  <a:srgbClr val="000000"/>
-                </a:solidFill>
-                <a:latin typeface="Calibri Light"/>
+              <a:rPr b="0" lang="en-IN" sz="1800" spc="-1" strike="noStrike">
+                <a:latin typeface="Arial"/>
               </a:rPr>
-              <a:t>Click to edit Master title style</a:t>
+              <a:t>Click to edit the title text </a:t>
             </a:r>
-            <a:endParaRPr b="0" lang="en-US" sz="6000" spc="-1" strike="noStrike">
-              <a:solidFill>
-                <a:srgbClr val="000000"/>
-              </a:solidFill>
-              <a:latin typeface="Calibri"/>
+            <a:r>
+              <a:rPr b="0" lang="en-IN" sz="1800" spc="-1" strike="noStrike">
+                <a:latin typeface="Arial"/>
+              </a:rPr>
+              <a:t>format</a:t>
+            </a:r>
+            <a:endParaRPr b="0" lang="en-IN" sz="1800" spc="-1" strike="noStrike">
+              <a:latin typeface="Arial"/>
             </a:endParaRPr>
           </a:p>
         </p:txBody>
@@ -1534,124 +1585,6 @@
       <p:sp>
         <p:nvSpPr>
           <p:cNvPr id="1" name="PlaceHolder 2"/>
-          <p:cNvSpPr>
-            <a:spLocks noGrp="1"/>
-          </p:cNvSpPr>
-          <p:nvPr>
-            <p:ph type="dt"/>
-          </p:nvPr>
-        </p:nvSpPr>
-        <p:spPr>
-          <a:xfrm>
-            <a:off x="838080" y="6356520"/>
-            <a:ext cx="2742840" cy="364680"/>
-          </a:xfrm>
-          <a:prstGeom prst="rect">
-            <a:avLst/>
-          </a:prstGeom>
-        </p:spPr>
-        <p:txBody>
-          <a:bodyPr anchor="ctr">
-            <a:noAutofit/>
-          </a:bodyPr>
-          <a:p>
-            <a:pPr>
-              <a:lnSpc>
-                <a:spcPct val="100000"/>
-              </a:lnSpc>
-            </a:pPr>
-            <a:fld id="{0AA8CAC5-8AC3-406C-AE70-B0204AEE6C7A}" type="datetime">
-              <a:rPr b="0" lang="en-US" sz="1200" spc="-1" strike="noStrike">
-                <a:solidFill>
-                  <a:srgbClr val="8b8b8b"/>
-                </a:solidFill>
-                <a:latin typeface="Calibri"/>
-              </a:rPr>
-              <a:t>7/11/21</a:t>
-            </a:fld>
-            <a:endParaRPr b="0" lang="en-IN" sz="1200" spc="-1" strike="noStrike">
-              <a:latin typeface="Times New Roman"/>
-            </a:endParaRPr>
-          </a:p>
-        </p:txBody>
-      </p:sp>
-      <p:sp>
-        <p:nvSpPr>
-          <p:cNvPr id="2" name="PlaceHolder 3"/>
-          <p:cNvSpPr>
-            <a:spLocks noGrp="1"/>
-          </p:cNvSpPr>
-          <p:nvPr>
-            <p:ph type="ftr"/>
-          </p:nvPr>
-        </p:nvSpPr>
-        <p:spPr>
-          <a:xfrm>
-            <a:off x="4038480" y="6356520"/>
-            <a:ext cx="4114440" cy="364680"/>
-          </a:xfrm>
-          <a:prstGeom prst="rect">
-            <a:avLst/>
-          </a:prstGeom>
-        </p:spPr>
-        <p:txBody>
-          <a:bodyPr anchor="ctr">
-            <a:noAutofit/>
-          </a:bodyPr>
-          <a:p>
-            <a:endParaRPr b="0" lang="en-IN" sz="2400" spc="-1" strike="noStrike">
-              <a:latin typeface="Times New Roman"/>
-            </a:endParaRPr>
-          </a:p>
-        </p:txBody>
-      </p:sp>
-      <p:sp>
-        <p:nvSpPr>
-          <p:cNvPr id="3" name="PlaceHolder 4"/>
-          <p:cNvSpPr>
-            <a:spLocks noGrp="1"/>
-          </p:cNvSpPr>
-          <p:nvPr>
-            <p:ph type="sldNum"/>
-          </p:nvPr>
-        </p:nvSpPr>
-        <p:spPr>
-          <a:xfrm>
-            <a:off x="8610480" y="6356520"/>
-            <a:ext cx="2742840" cy="364680"/>
-          </a:xfrm>
-          <a:prstGeom prst="rect">
-            <a:avLst/>
-          </a:prstGeom>
-        </p:spPr>
-        <p:txBody>
-          <a:bodyPr anchor="ctr">
-            <a:noAutofit/>
-          </a:bodyPr>
-          <a:p>
-            <a:pPr algn="r">
-              <a:lnSpc>
-                <a:spcPct val="100000"/>
-              </a:lnSpc>
-            </a:pPr>
-            <a:fld id="{A8FD5B66-BEC3-412A-B4D8-8A7BDA14CF39}" type="slidenum">
-              <a:rPr b="0" lang="en-US" sz="1200" spc="-1" strike="noStrike">
-                <a:solidFill>
-                  <a:srgbClr val="8b8b8b"/>
-                </a:solidFill>
-                <a:latin typeface="Calibri"/>
-              </a:rPr>
-              <a:t>&lt;number&gt;</a:t>
-            </a:fld>
-            <a:endParaRPr b="0" lang="en-IN" sz="1200" spc="-1" strike="noStrike">
-              <a:latin typeface="Times New Roman"/>
-            </a:endParaRPr>
-          </a:p>
-        </p:txBody>
-      </p:sp>
-      <p:sp>
-        <p:nvSpPr>
-          <p:cNvPr id="4" name="PlaceHolder 5"/>
           <p:cNvSpPr>
             <a:spLocks noGrp="1"/>
           </p:cNvSpPr>
@@ -1667,9 +1600,13 @@
           <a:prstGeom prst="rect">
             <a:avLst/>
           </a:prstGeom>
-        </p:spPr>
-        <p:txBody>
-          <a:bodyPr lIns="0" rIns="0" tIns="0" bIns="0">
+          <a:noFill/>
+          <a:ln w="0">
+            <a:noFill/>
+          </a:ln>
+        </p:spPr>
+        <p:txBody>
+          <a:bodyPr lIns="0" rIns="0" tIns="0" bIns="0" anchor="t">
             <a:normAutofit/>
           </a:bodyPr>
           <a:p>
@@ -1685,19 +1622,13 @@
               <a:buChar char=""/>
             </a:pPr>
             <a:r>
-              <a:rPr b="0" lang="en-US" sz="2800" spc="-1" strike="noStrike">
-                <a:solidFill>
-                  <a:srgbClr val="000000"/>
-                </a:solidFill>
-                <a:latin typeface="Calibri"/>
+              <a:rPr b="0" lang="en-IN" sz="3200" spc="-1" strike="noStrike">
+                <a:latin typeface="Arial"/>
               </a:rPr>
               <a:t>Click to edit the outline text format</a:t>
             </a:r>
-            <a:endParaRPr b="0" lang="en-US" sz="2800" spc="-1" strike="noStrike">
-              <a:solidFill>
-                <a:srgbClr val="000000"/>
-              </a:solidFill>
-              <a:latin typeface="Calibri"/>
+            <a:endParaRPr b="0" lang="en-IN" sz="3200" spc="-1" strike="noStrike">
+              <a:latin typeface="Arial"/>
             </a:endParaRPr>
           </a:p>
           <a:p>
@@ -1713,19 +1644,13 @@
               <a:buChar char=""/>
             </a:pPr>
             <a:r>
-              <a:rPr b="0" lang="en-US" sz="2000" spc="-1" strike="noStrike">
-                <a:solidFill>
-                  <a:srgbClr val="000000"/>
-                </a:solidFill>
-                <a:latin typeface="Calibri"/>
+              <a:rPr b="0" lang="en-IN" sz="2800" spc="-1" strike="noStrike">
+                <a:latin typeface="Arial"/>
               </a:rPr>
               <a:t>Second Outline Level</a:t>
             </a:r>
-            <a:endParaRPr b="0" lang="en-US" sz="2000" spc="-1" strike="noStrike">
-              <a:solidFill>
-                <a:srgbClr val="000000"/>
-              </a:solidFill>
-              <a:latin typeface="Calibri"/>
+            <a:endParaRPr b="0" lang="en-IN" sz="2800" spc="-1" strike="noStrike">
+              <a:latin typeface="Arial"/>
             </a:endParaRPr>
           </a:p>
           <a:p>
@@ -1741,19 +1666,13 @@
               <a:buChar char=""/>
             </a:pPr>
             <a:r>
-              <a:rPr b="0" lang="en-US" sz="1800" spc="-1" strike="noStrike">
-                <a:solidFill>
-                  <a:srgbClr val="000000"/>
-                </a:solidFill>
-                <a:latin typeface="Calibri"/>
+              <a:rPr b="0" lang="en-IN" sz="2400" spc="-1" strike="noStrike">
+                <a:latin typeface="Arial"/>
               </a:rPr>
               <a:t>Third Outline Level</a:t>
             </a:r>
-            <a:endParaRPr b="0" lang="en-US" sz="1800" spc="-1" strike="noStrike">
-              <a:solidFill>
-                <a:srgbClr val="000000"/>
-              </a:solidFill>
-              <a:latin typeface="Calibri"/>
+            <a:endParaRPr b="0" lang="en-IN" sz="2400" spc="-1" strike="noStrike">
+              <a:latin typeface="Arial"/>
             </a:endParaRPr>
           </a:p>
           <a:p>
@@ -1769,19 +1688,13 @@
               <a:buChar char=""/>
             </a:pPr>
             <a:r>
-              <a:rPr b="0" lang="en-US" sz="1800" spc="-1" strike="noStrike">
-                <a:solidFill>
-                  <a:srgbClr val="000000"/>
-                </a:solidFill>
-                <a:latin typeface="Calibri"/>
+              <a:rPr b="0" lang="en-IN" sz="2000" spc="-1" strike="noStrike">
+                <a:latin typeface="Arial"/>
               </a:rPr>
               <a:t>Fourth Outline Level</a:t>
             </a:r>
-            <a:endParaRPr b="0" lang="en-US" sz="1800" spc="-1" strike="noStrike">
-              <a:solidFill>
-                <a:srgbClr val="000000"/>
-              </a:solidFill>
-              <a:latin typeface="Calibri"/>
+            <a:endParaRPr b="0" lang="en-IN" sz="2000" spc="-1" strike="noStrike">
+              <a:latin typeface="Arial"/>
             </a:endParaRPr>
           </a:p>
           <a:p>
@@ -1797,19 +1710,13 @@
               <a:buChar char=""/>
             </a:pPr>
             <a:r>
-              <a:rPr b="0" lang="en-US" sz="2000" spc="-1" strike="noStrike">
-                <a:solidFill>
-                  <a:srgbClr val="000000"/>
-                </a:solidFill>
-                <a:latin typeface="Calibri"/>
+              <a:rPr b="0" lang="en-IN" sz="2000" spc="-1" strike="noStrike">
+                <a:latin typeface="Arial"/>
               </a:rPr>
               <a:t>Fifth Outline Level</a:t>
             </a:r>
-            <a:endParaRPr b="0" lang="en-US" sz="2000" spc="-1" strike="noStrike">
-              <a:solidFill>
-                <a:srgbClr val="000000"/>
-              </a:solidFill>
-              <a:latin typeface="Calibri"/>
+            <a:endParaRPr b="0" lang="en-IN" sz="2000" spc="-1" strike="noStrike">
+              <a:latin typeface="Arial"/>
             </a:endParaRPr>
           </a:p>
           <a:p>
@@ -1825,19 +1732,13 @@
               <a:buChar char=""/>
             </a:pPr>
             <a:r>
-              <a:rPr b="0" lang="en-US" sz="2000" spc="-1" strike="noStrike">
-                <a:solidFill>
-                  <a:srgbClr val="000000"/>
-                </a:solidFill>
-                <a:latin typeface="Calibri"/>
+              <a:rPr b="0" lang="en-IN" sz="2000" spc="-1" strike="noStrike">
+                <a:latin typeface="Arial"/>
               </a:rPr>
               <a:t>Sixth Outline Level</a:t>
             </a:r>
-            <a:endParaRPr b="0" lang="en-US" sz="2000" spc="-1" strike="noStrike">
-              <a:solidFill>
-                <a:srgbClr val="000000"/>
-              </a:solidFill>
-              <a:latin typeface="Calibri"/>
+            <a:endParaRPr b="0" lang="en-IN" sz="2000" spc="-1" strike="noStrike">
+              <a:latin typeface="Arial"/>
             </a:endParaRPr>
           </a:p>
           <a:p>
@@ -1853,19 +1754,13 @@
               <a:buChar char=""/>
             </a:pPr>
             <a:r>
-              <a:rPr b="0" lang="en-US" sz="2000" spc="-1" strike="noStrike">
-                <a:solidFill>
-                  <a:srgbClr val="000000"/>
-                </a:solidFill>
-                <a:latin typeface="Calibri"/>
+              <a:rPr b="0" lang="en-IN" sz="2000" spc="-1" strike="noStrike">
+                <a:latin typeface="Arial"/>
               </a:rPr>
               <a:t>Seventh Outline Level</a:t>
             </a:r>
-            <a:endParaRPr b="0" lang="en-US" sz="2000" spc="-1" strike="noStrike">
-              <a:solidFill>
-                <a:srgbClr val="000000"/>
-              </a:solidFill>
-              <a:latin typeface="Calibri"/>
+            <a:endParaRPr b="0" lang="en-IN" sz="2000" spc="-1" strike="noStrike">
+              <a:latin typeface="Arial"/>
             </a:endParaRPr>
           </a:p>
         </p:txBody>
@@ -1909,28 +1804,28 @@
       </p:grpSpPr>
       <p:grpSp>
         <p:nvGrpSpPr>
-          <p:cNvPr id="41" name="Group 12"/>
+          <p:cNvPr id="38" name="Group 12"/>
           <p:cNvGrpSpPr/>
           <p:nvPr/>
         </p:nvGrpSpPr>
         <p:grpSpPr>
           <a:xfrm>
             <a:off x="4620600" y="3029760"/>
-            <a:ext cx="2928960" cy="1708920"/>
+            <a:ext cx="2928600" cy="1708560"/>
             <a:chOff x="4620600" y="3029760"/>
-            <a:chExt cx="2928960" cy="1708920"/>
+            <a:chExt cx="2928600" cy="1708560"/>
           </a:xfrm>
         </p:grpSpPr>
         <p:sp>
           <p:nvSpPr>
-            <p:cNvPr id="42" name="TextBox 9"/>
+            <p:cNvPr id="39" name="TextBox 9"/>
             <p:cNvSpPr/>
             <p:nvPr/>
           </p:nvSpPr>
           <p:spPr>
             <a:xfrm>
               <a:off x="5266800" y="3029760"/>
-              <a:ext cx="1636560" cy="395280"/>
+              <a:ext cx="1636200" cy="394920"/>
             </a:xfrm>
             <a:prstGeom prst="rect">
               <a:avLst/>
@@ -1947,7 +1842,7 @@
             <a:fontRef idx="minor"/>
           </p:style>
           <p:txBody>
-            <a:bodyPr wrap="none" lIns="90000" rIns="90000" tIns="45000" bIns="45000">
+            <a:bodyPr wrap="none" lIns="90000" rIns="90000" tIns="45000" bIns="45000" anchor="t">
               <a:spAutoFit/>
             </a:bodyPr>
             <a:p>
@@ -1962,6 +1857,7 @@
                     <a:srgbClr val="000000"/>
                   </a:solidFill>
                   <a:latin typeface="Arial"/>
+                  <a:ea typeface="DejaVu Sans"/>
                 </a:rPr>
                 <a:t>pLisp 0.1.30</a:t>
               </a:r>
@@ -1973,14 +1869,14 @@
         </p:sp>
         <p:sp>
           <p:nvSpPr>
-            <p:cNvPr id="43" name="TextBox 10"/>
+            <p:cNvPr id="40" name="TextBox 10"/>
             <p:cNvSpPr/>
             <p:nvPr/>
           </p:nvSpPr>
           <p:spPr>
             <a:xfrm>
               <a:off x="5365080" y="3465360"/>
-              <a:ext cx="1440000" cy="303480"/>
+              <a:ext cx="1439640" cy="303120"/>
             </a:xfrm>
             <a:prstGeom prst="rect">
               <a:avLst/>
@@ -1997,7 +1893,7 @@
             <a:fontRef idx="minor"/>
           </p:style>
           <p:txBody>
-            <a:bodyPr wrap="none" lIns="90000" rIns="90000" tIns="45000" bIns="45000">
+            <a:bodyPr wrap="none" lIns="90000" rIns="90000" tIns="45000" bIns="45000" anchor="t">
               <a:spAutoFit/>
             </a:bodyPr>
             <a:p>
@@ -2012,6 +1908,7 @@
                     <a:srgbClr val="000000"/>
                   </a:solidFill>
                   <a:latin typeface="Arial"/>
+                  <a:ea typeface="DejaVu Sans"/>
                 </a:rPr>
                 <a:t>Don’t Lisp. Talk!</a:t>
               </a:r>
@@ -2023,14 +1920,14 @@
         </p:sp>
         <p:sp>
           <p:nvSpPr>
-            <p:cNvPr id="44" name="TextBox 11"/>
+            <p:cNvPr id="41" name="TextBox 11"/>
             <p:cNvSpPr/>
             <p:nvPr/>
           </p:nvSpPr>
           <p:spPr>
             <a:xfrm>
               <a:off x="4620600" y="4313520"/>
-              <a:ext cx="2928960" cy="425160"/>
+              <a:ext cx="2928600" cy="424800"/>
             </a:xfrm>
             <a:prstGeom prst="rect">
               <a:avLst/>
@@ -2047,7 +1944,7 @@
             <a:fontRef idx="minor"/>
           </p:style>
           <p:txBody>
-            <a:bodyPr wrap="none" lIns="90000" rIns="90000" tIns="45000" bIns="45000">
+            <a:bodyPr wrap="none" lIns="90000" rIns="90000" tIns="45000" bIns="45000" anchor="t">
               <a:spAutoFit/>
             </a:bodyPr>
             <a:p>
@@ -2062,8 +1959,9 @@
                     <a:srgbClr val="000000"/>
                   </a:solidFill>
                   <a:latin typeface="Arial"/>
+                  <a:ea typeface="DejaVu Sans"/>
                 </a:rPr>
-                <a:t>Copyright © 2011-2021 Rajesh Jayaprakash</a:t>
+                <a:t>Copyright © 2011-2022 Rajesh Jayaprakash</a:t>
               </a:r>
               <a:endParaRPr b="0" lang="en-IN" sz="1100" spc="-1" strike="noStrike">
                 <a:latin typeface="Arial"/>
@@ -2081,6 +1979,7 @@
                     <a:srgbClr val="000000"/>
                   </a:solidFill>
                   <a:latin typeface="Arial"/>
+                  <a:ea typeface="DejaVu Sans"/>
                 </a:rPr>
                 <a:t>All rights reserved</a:t>
               </a:r>
@@ -2093,14 +1992,14 @@
       </p:grpSp>
       <p:sp>
         <p:nvSpPr>
-          <p:cNvPr id="45" name="Rectangle 13"/>
+          <p:cNvPr id="42" name="Rectangle 13"/>
           <p:cNvSpPr/>
           <p:nvPr/>
         </p:nvSpPr>
         <p:spPr>
           <a:xfrm>
             <a:off x="2769120" y="1094760"/>
-            <a:ext cx="6666840" cy="3803040"/>
+            <a:ext cx="6666480" cy="3802680"/>
           </a:xfrm>
           <a:prstGeom prst="rect">
             <a:avLst/>
@@ -2129,7 +2028,7 @@
       </p:sp>
       <p:pic>
         <p:nvPicPr>
-          <p:cNvPr id="46" name="Picture 2" descr=""/>
+          <p:cNvPr id="43" name="Picture 2" descr=""/>
           <p:cNvPicPr/>
           <p:nvPr/>
         </p:nvPicPr>
@@ -2140,7 +2039,7 @@
         <p:spPr>
           <a:xfrm>
             <a:off x="5222160" y="1221120"/>
-            <a:ext cx="1802880" cy="1752120"/>
+            <a:ext cx="1802520" cy="1751760"/>
           </a:xfrm>
           <a:prstGeom prst="rect">
             <a:avLst/>

</xml_diff>

<commit_message>
Changed copyright year to 2023
</commit_message>
<xml_diff>
--- a/icons/splash.pptx
+++ b/icons/splash.pptx
@@ -64,7 +64,7 @@
         <p:spPr>
           <a:xfrm>
             <a:off x="1523880" y="1122480"/>
-            <a:ext cx="9143280" cy="2386800"/>
+            <a:ext cx="9142920" cy="2386440"/>
           </a:xfrm>
           <a:prstGeom prst="rect">
             <a:avLst/>
@@ -79,8 +79,13 @@
             <a:noAutofit/>
           </a:bodyPr>
           <a:p>
-            <a:pPr algn="ctr"/>
-            <a:endParaRPr b="0" lang="en-IN" sz="4400" spc="-1" strike="noStrike">
+            <a:pPr indent="0" algn="ctr">
+              <a:buNone/>
+            </a:pPr>
+            <a:endParaRPr b="0" lang="en-US" sz="4400" spc="-1" strike="noStrike">
+              <a:solidFill>
+                <a:srgbClr val="000000"/>
+              </a:solidFill>
               <a:latin typeface="Arial"/>
             </a:endParaRPr>
           </a:p>
@@ -99,7 +104,7 @@
         <p:spPr>
           <a:xfrm>
             <a:off x="609480" y="1604520"/>
-            <a:ext cx="10972440" cy="1896840"/>
+            <a:ext cx="10972080" cy="1896840"/>
           </a:xfrm>
           <a:prstGeom prst="rect">
             <a:avLst/>
@@ -114,7 +119,16 @@
             <a:normAutofit/>
           </a:bodyPr>
           <a:p>
-            <a:endParaRPr b="0" lang="en-IN" sz="3200" spc="-1" strike="noStrike">
+            <a:pPr indent="0">
+              <a:spcBef>
+                <a:spcPts val="1417"/>
+              </a:spcBef>
+              <a:buNone/>
+            </a:pPr>
+            <a:endParaRPr b="0" lang="en-US" sz="3200" spc="-1" strike="noStrike">
+              <a:solidFill>
+                <a:srgbClr val="000000"/>
+              </a:solidFill>
               <a:latin typeface="Arial"/>
             </a:endParaRPr>
           </a:p>
@@ -133,7 +147,7 @@
         <p:spPr>
           <a:xfrm>
             <a:off x="609480" y="3682080"/>
-            <a:ext cx="10972440" cy="1896840"/>
+            <a:ext cx="10972080" cy="1896840"/>
           </a:xfrm>
           <a:prstGeom prst="rect">
             <a:avLst/>
@@ -148,7 +162,16 @@
             <a:normAutofit/>
           </a:bodyPr>
           <a:p>
-            <a:endParaRPr b="0" lang="en-IN" sz="3200" spc="-1" strike="noStrike">
+            <a:pPr indent="0">
+              <a:spcBef>
+                <a:spcPts val="1417"/>
+              </a:spcBef>
+              <a:buNone/>
+            </a:pPr>
+            <a:endParaRPr b="0" lang="en-US" sz="3200" spc="-1" strike="noStrike">
+              <a:solidFill>
+                <a:srgbClr val="000000"/>
+              </a:solidFill>
               <a:latin typeface="Arial"/>
             </a:endParaRPr>
           </a:p>
@@ -189,7 +212,7 @@
         <p:spPr>
           <a:xfrm>
             <a:off x="1523880" y="1122480"/>
-            <a:ext cx="9143280" cy="2386800"/>
+            <a:ext cx="9142920" cy="2386440"/>
           </a:xfrm>
           <a:prstGeom prst="rect">
             <a:avLst/>
@@ -204,8 +227,13 @@
             <a:noAutofit/>
           </a:bodyPr>
           <a:p>
-            <a:pPr algn="ctr"/>
-            <a:endParaRPr b="0" lang="en-IN" sz="4400" spc="-1" strike="noStrike">
+            <a:pPr indent="0" algn="ctr">
+              <a:buNone/>
+            </a:pPr>
+            <a:endParaRPr b="0" lang="en-US" sz="4400" spc="-1" strike="noStrike">
+              <a:solidFill>
+                <a:srgbClr val="000000"/>
+              </a:solidFill>
               <a:latin typeface="Arial"/>
             </a:endParaRPr>
           </a:p>
@@ -239,7 +267,16 @@
             <a:normAutofit/>
           </a:bodyPr>
           <a:p>
-            <a:endParaRPr b="0" lang="en-IN" sz="3200" spc="-1" strike="noStrike">
+            <a:pPr indent="0">
+              <a:spcBef>
+                <a:spcPts val="1417"/>
+              </a:spcBef>
+              <a:buNone/>
+            </a:pPr>
+            <a:endParaRPr b="0" lang="en-US" sz="3200" spc="-1" strike="noStrike">
+              <a:solidFill>
+                <a:srgbClr val="000000"/>
+              </a:solidFill>
               <a:latin typeface="Arial"/>
             </a:endParaRPr>
           </a:p>
@@ -273,7 +310,16 @@
             <a:normAutofit/>
           </a:bodyPr>
           <a:p>
-            <a:endParaRPr b="0" lang="en-IN" sz="3200" spc="-1" strike="noStrike">
+            <a:pPr indent="0">
+              <a:spcBef>
+                <a:spcPts val="1417"/>
+              </a:spcBef>
+              <a:buNone/>
+            </a:pPr>
+            <a:endParaRPr b="0" lang="en-US" sz="3200" spc="-1" strike="noStrike">
+              <a:solidFill>
+                <a:srgbClr val="000000"/>
+              </a:solidFill>
               <a:latin typeface="Arial"/>
             </a:endParaRPr>
           </a:p>
@@ -307,7 +353,16 @@
             <a:normAutofit/>
           </a:bodyPr>
           <a:p>
-            <a:endParaRPr b="0" lang="en-IN" sz="3200" spc="-1" strike="noStrike">
+            <a:pPr indent="0">
+              <a:spcBef>
+                <a:spcPts val="1417"/>
+              </a:spcBef>
+              <a:buNone/>
+            </a:pPr>
+            <a:endParaRPr b="0" lang="en-US" sz="3200" spc="-1" strike="noStrike">
+              <a:solidFill>
+                <a:srgbClr val="000000"/>
+              </a:solidFill>
               <a:latin typeface="Arial"/>
             </a:endParaRPr>
           </a:p>
@@ -341,7 +396,16 @@
             <a:normAutofit/>
           </a:bodyPr>
           <a:p>
-            <a:endParaRPr b="0" lang="en-IN" sz="3200" spc="-1" strike="noStrike">
+            <a:pPr indent="0">
+              <a:spcBef>
+                <a:spcPts val="1417"/>
+              </a:spcBef>
+              <a:buNone/>
+            </a:pPr>
+            <a:endParaRPr b="0" lang="en-US" sz="3200" spc="-1" strike="noStrike">
+              <a:solidFill>
+                <a:srgbClr val="000000"/>
+              </a:solidFill>
               <a:latin typeface="Arial"/>
             </a:endParaRPr>
           </a:p>
@@ -382,7 +446,7 @@
         <p:spPr>
           <a:xfrm>
             <a:off x="1523880" y="1122480"/>
-            <a:ext cx="9143280" cy="2386800"/>
+            <a:ext cx="9142920" cy="2386440"/>
           </a:xfrm>
           <a:prstGeom prst="rect">
             <a:avLst/>
@@ -397,8 +461,13 @@
             <a:noAutofit/>
           </a:bodyPr>
           <a:p>
-            <a:pPr algn="ctr"/>
-            <a:endParaRPr b="0" lang="en-IN" sz="4400" spc="-1" strike="noStrike">
+            <a:pPr indent="0" algn="ctr">
+              <a:buNone/>
+            </a:pPr>
+            <a:endParaRPr b="0" lang="en-US" sz="4400" spc="-1" strike="noStrike">
+              <a:solidFill>
+                <a:srgbClr val="000000"/>
+              </a:solidFill>
               <a:latin typeface="Arial"/>
             </a:endParaRPr>
           </a:p>
@@ -417,7 +486,7 @@
         <p:spPr>
           <a:xfrm>
             <a:off x="609480" y="1604520"/>
-            <a:ext cx="3533040" cy="1896840"/>
+            <a:ext cx="3532680" cy="1896840"/>
           </a:xfrm>
           <a:prstGeom prst="rect">
             <a:avLst/>
@@ -432,7 +501,16 @@
             <a:normAutofit/>
           </a:bodyPr>
           <a:p>
-            <a:endParaRPr b="0" lang="en-IN" sz="3200" spc="-1" strike="noStrike">
+            <a:pPr indent="0">
+              <a:spcBef>
+                <a:spcPts val="1417"/>
+              </a:spcBef>
+              <a:buNone/>
+            </a:pPr>
+            <a:endParaRPr b="0" lang="en-US" sz="3200" spc="-1" strike="noStrike">
+              <a:solidFill>
+                <a:srgbClr val="000000"/>
+              </a:solidFill>
               <a:latin typeface="Arial"/>
             </a:endParaRPr>
           </a:p>
@@ -450,8 +528,8 @@
         </p:nvSpPr>
         <p:spPr>
           <a:xfrm>
-            <a:off x="4319640" y="1604520"/>
-            <a:ext cx="3533040" cy="1896840"/>
+            <a:off x="4319280" y="1604520"/>
+            <a:ext cx="3532680" cy="1896840"/>
           </a:xfrm>
           <a:prstGeom prst="rect">
             <a:avLst/>
@@ -466,7 +544,16 @@
             <a:normAutofit/>
           </a:bodyPr>
           <a:p>
-            <a:endParaRPr b="0" lang="en-IN" sz="3200" spc="-1" strike="noStrike">
+            <a:pPr indent="0">
+              <a:spcBef>
+                <a:spcPts val="1417"/>
+              </a:spcBef>
+              <a:buNone/>
+            </a:pPr>
+            <a:endParaRPr b="0" lang="en-US" sz="3200" spc="-1" strike="noStrike">
+              <a:solidFill>
+                <a:srgbClr val="000000"/>
+              </a:solidFill>
               <a:latin typeface="Arial"/>
             </a:endParaRPr>
           </a:p>
@@ -484,8 +571,8 @@
         </p:nvSpPr>
         <p:spPr>
           <a:xfrm>
-            <a:off x="8029800" y="1604520"/>
-            <a:ext cx="3533040" cy="1896840"/>
+            <a:off x="8028720" y="1604520"/>
+            <a:ext cx="3532680" cy="1896840"/>
           </a:xfrm>
           <a:prstGeom prst="rect">
             <a:avLst/>
@@ -500,7 +587,16 @@
             <a:normAutofit/>
           </a:bodyPr>
           <a:p>
-            <a:endParaRPr b="0" lang="en-IN" sz="3200" spc="-1" strike="noStrike">
+            <a:pPr indent="0">
+              <a:spcBef>
+                <a:spcPts val="1417"/>
+              </a:spcBef>
+              <a:buNone/>
+            </a:pPr>
+            <a:endParaRPr b="0" lang="en-US" sz="3200" spc="-1" strike="noStrike">
+              <a:solidFill>
+                <a:srgbClr val="000000"/>
+              </a:solidFill>
               <a:latin typeface="Arial"/>
             </a:endParaRPr>
           </a:p>
@@ -519,7 +615,7 @@
         <p:spPr>
           <a:xfrm>
             <a:off x="609480" y="3682080"/>
-            <a:ext cx="3533040" cy="1896840"/>
+            <a:ext cx="3532680" cy="1896840"/>
           </a:xfrm>
           <a:prstGeom prst="rect">
             <a:avLst/>
@@ -534,7 +630,16 @@
             <a:normAutofit/>
           </a:bodyPr>
           <a:p>
-            <a:endParaRPr b="0" lang="en-IN" sz="3200" spc="-1" strike="noStrike">
+            <a:pPr indent="0">
+              <a:spcBef>
+                <a:spcPts val="1417"/>
+              </a:spcBef>
+              <a:buNone/>
+            </a:pPr>
+            <a:endParaRPr b="0" lang="en-US" sz="3200" spc="-1" strike="noStrike">
+              <a:solidFill>
+                <a:srgbClr val="000000"/>
+              </a:solidFill>
               <a:latin typeface="Arial"/>
             </a:endParaRPr>
           </a:p>
@@ -552,8 +657,8 @@
         </p:nvSpPr>
         <p:spPr>
           <a:xfrm>
-            <a:off x="4319640" y="3682080"/>
-            <a:ext cx="3533040" cy="1896840"/>
+            <a:off x="4319280" y="3682080"/>
+            <a:ext cx="3532680" cy="1896840"/>
           </a:xfrm>
           <a:prstGeom prst="rect">
             <a:avLst/>
@@ -568,7 +673,16 @@
             <a:normAutofit/>
           </a:bodyPr>
           <a:p>
-            <a:endParaRPr b="0" lang="en-IN" sz="3200" spc="-1" strike="noStrike">
+            <a:pPr indent="0">
+              <a:spcBef>
+                <a:spcPts val="1417"/>
+              </a:spcBef>
+              <a:buNone/>
+            </a:pPr>
+            <a:endParaRPr b="0" lang="en-US" sz="3200" spc="-1" strike="noStrike">
+              <a:solidFill>
+                <a:srgbClr val="000000"/>
+              </a:solidFill>
               <a:latin typeface="Arial"/>
             </a:endParaRPr>
           </a:p>
@@ -586,8 +700,8 @@
         </p:nvSpPr>
         <p:spPr>
           <a:xfrm>
-            <a:off x="8029800" y="3682080"/>
-            <a:ext cx="3533040" cy="1896840"/>
+            <a:off x="8028720" y="3682080"/>
+            <a:ext cx="3532680" cy="1896840"/>
           </a:xfrm>
           <a:prstGeom prst="rect">
             <a:avLst/>
@@ -602,7 +716,16 @@
             <a:normAutofit/>
           </a:bodyPr>
           <a:p>
-            <a:endParaRPr b="0" lang="en-IN" sz="3200" spc="-1" strike="noStrike">
+            <a:pPr indent="0">
+              <a:spcBef>
+                <a:spcPts val="1417"/>
+              </a:spcBef>
+              <a:buNone/>
+            </a:pPr>
+            <a:endParaRPr b="0" lang="en-US" sz="3200" spc="-1" strike="noStrike">
+              <a:solidFill>
+                <a:srgbClr val="000000"/>
+              </a:solidFill>
               <a:latin typeface="Arial"/>
             </a:endParaRPr>
           </a:p>
@@ -643,7 +766,7 @@
         <p:spPr>
           <a:xfrm>
             <a:off x="1523880" y="1122480"/>
-            <a:ext cx="9143280" cy="2386800"/>
+            <a:ext cx="9142920" cy="2386440"/>
           </a:xfrm>
           <a:prstGeom prst="rect">
             <a:avLst/>
@@ -658,8 +781,13 @@
             <a:noAutofit/>
           </a:bodyPr>
           <a:p>
-            <a:pPr algn="ctr"/>
-            <a:endParaRPr b="0" lang="en-IN" sz="4400" spc="-1" strike="noStrike">
+            <a:pPr indent="0" algn="ctr">
+              <a:buNone/>
+            </a:pPr>
+            <a:endParaRPr b="0" lang="en-US" sz="4400" spc="-1" strike="noStrike">
+              <a:solidFill>
+                <a:srgbClr val="000000"/>
+              </a:solidFill>
               <a:latin typeface="Arial"/>
             </a:endParaRPr>
           </a:p>
@@ -678,7 +806,7 @@
         <p:spPr>
           <a:xfrm>
             <a:off x="609480" y="1604520"/>
-            <a:ext cx="10972440" cy="3977280"/>
+            <a:ext cx="10972080" cy="3976920"/>
           </a:xfrm>
           <a:prstGeom prst="rect">
             <a:avLst/>
@@ -693,8 +821,13 @@
             <a:noAutofit/>
           </a:bodyPr>
           <a:p>
-            <a:pPr algn="ctr"/>
-            <a:endParaRPr b="0" lang="en-IN" sz="3200" spc="-1" strike="noStrike">
+            <a:pPr indent="0" algn="ctr">
+              <a:buNone/>
+            </a:pPr>
+            <a:endParaRPr b="0" lang="en-US" sz="3200" spc="-1" strike="noStrike">
+              <a:solidFill>
+                <a:srgbClr val="000000"/>
+              </a:solidFill>
               <a:latin typeface="Arial"/>
             </a:endParaRPr>
           </a:p>
@@ -735,7 +868,7 @@
         <p:spPr>
           <a:xfrm>
             <a:off x="1523880" y="1122480"/>
-            <a:ext cx="9143280" cy="2386800"/>
+            <a:ext cx="9142920" cy="2386440"/>
           </a:xfrm>
           <a:prstGeom prst="rect">
             <a:avLst/>
@@ -750,8 +883,13 @@
             <a:noAutofit/>
           </a:bodyPr>
           <a:p>
-            <a:pPr algn="ctr"/>
-            <a:endParaRPr b="0" lang="en-IN" sz="4400" spc="-1" strike="noStrike">
+            <a:pPr indent="0" algn="ctr">
+              <a:buNone/>
+            </a:pPr>
+            <a:endParaRPr b="0" lang="en-US" sz="4400" spc="-1" strike="noStrike">
+              <a:solidFill>
+                <a:srgbClr val="000000"/>
+              </a:solidFill>
               <a:latin typeface="Arial"/>
             </a:endParaRPr>
           </a:p>
@@ -770,7 +908,7 @@
         <p:spPr>
           <a:xfrm>
             <a:off x="609480" y="1604520"/>
-            <a:ext cx="10972440" cy="3977280"/>
+            <a:ext cx="10972080" cy="3976920"/>
           </a:xfrm>
           <a:prstGeom prst="rect">
             <a:avLst/>
@@ -785,7 +923,16 @@
             <a:normAutofit/>
           </a:bodyPr>
           <a:p>
-            <a:endParaRPr b="0" lang="en-IN" sz="3200" spc="-1" strike="noStrike">
+            <a:pPr indent="0">
+              <a:spcBef>
+                <a:spcPts val="1417"/>
+              </a:spcBef>
+              <a:buNone/>
+            </a:pPr>
+            <a:endParaRPr b="0" lang="en-US" sz="3200" spc="-1" strike="noStrike">
+              <a:solidFill>
+                <a:srgbClr val="000000"/>
+              </a:solidFill>
               <a:latin typeface="Arial"/>
             </a:endParaRPr>
           </a:p>
@@ -826,7 +973,7 @@
         <p:spPr>
           <a:xfrm>
             <a:off x="1523880" y="1122480"/>
-            <a:ext cx="9143280" cy="2386800"/>
+            <a:ext cx="9142920" cy="2386440"/>
           </a:xfrm>
           <a:prstGeom prst="rect">
             <a:avLst/>
@@ -841,8 +988,13 @@
             <a:noAutofit/>
           </a:bodyPr>
           <a:p>
-            <a:pPr algn="ctr"/>
-            <a:endParaRPr b="0" lang="en-IN" sz="4400" spc="-1" strike="noStrike">
+            <a:pPr indent="0" algn="ctr">
+              <a:buNone/>
+            </a:pPr>
+            <a:endParaRPr b="0" lang="en-US" sz="4400" spc="-1" strike="noStrike">
+              <a:solidFill>
+                <a:srgbClr val="000000"/>
+              </a:solidFill>
               <a:latin typeface="Arial"/>
             </a:endParaRPr>
           </a:p>
@@ -861,7 +1013,7 @@
         <p:spPr>
           <a:xfrm>
             <a:off x="609480" y="1604520"/>
-            <a:ext cx="5354280" cy="3977280"/>
+            <a:ext cx="5354280" cy="3976920"/>
           </a:xfrm>
           <a:prstGeom prst="rect">
             <a:avLst/>
@@ -876,7 +1028,16 @@
             <a:normAutofit/>
           </a:bodyPr>
           <a:p>
-            <a:endParaRPr b="0" lang="en-IN" sz="3200" spc="-1" strike="noStrike">
+            <a:pPr indent="0">
+              <a:spcBef>
+                <a:spcPts val="1417"/>
+              </a:spcBef>
+              <a:buNone/>
+            </a:pPr>
+            <a:endParaRPr b="0" lang="en-US" sz="3200" spc="-1" strike="noStrike">
+              <a:solidFill>
+                <a:srgbClr val="000000"/>
+              </a:solidFill>
               <a:latin typeface="Arial"/>
             </a:endParaRPr>
           </a:p>
@@ -895,7 +1056,7 @@
         <p:spPr>
           <a:xfrm>
             <a:off x="6231960" y="1604520"/>
-            <a:ext cx="5354280" cy="3977280"/>
+            <a:ext cx="5354280" cy="3976920"/>
           </a:xfrm>
           <a:prstGeom prst="rect">
             <a:avLst/>
@@ -910,7 +1071,16 @@
             <a:normAutofit/>
           </a:bodyPr>
           <a:p>
-            <a:endParaRPr b="0" lang="en-IN" sz="3200" spc="-1" strike="noStrike">
+            <a:pPr indent="0">
+              <a:spcBef>
+                <a:spcPts val="1417"/>
+              </a:spcBef>
+              <a:buNone/>
+            </a:pPr>
+            <a:endParaRPr b="0" lang="en-US" sz="3200" spc="-1" strike="noStrike">
+              <a:solidFill>
+                <a:srgbClr val="000000"/>
+              </a:solidFill>
               <a:latin typeface="Arial"/>
             </a:endParaRPr>
           </a:p>
@@ -951,7 +1121,7 @@
         <p:spPr>
           <a:xfrm>
             <a:off x="1523880" y="1122480"/>
-            <a:ext cx="9143280" cy="2386800"/>
+            <a:ext cx="9142920" cy="2386440"/>
           </a:xfrm>
           <a:prstGeom prst="rect">
             <a:avLst/>
@@ -966,8 +1136,13 @@
             <a:noAutofit/>
           </a:bodyPr>
           <a:p>
-            <a:pPr algn="ctr"/>
-            <a:endParaRPr b="0" lang="en-IN" sz="4400" spc="-1" strike="noStrike">
+            <a:pPr indent="0" algn="ctr">
+              <a:buNone/>
+            </a:pPr>
+            <a:endParaRPr b="0" lang="en-US" sz="4400" spc="-1" strike="noStrike">
+              <a:solidFill>
+                <a:srgbClr val="000000"/>
+              </a:solidFill>
               <a:latin typeface="Arial"/>
             </a:endParaRPr>
           </a:p>
@@ -1008,7 +1183,7 @@
         <p:spPr>
           <a:xfrm>
             <a:off x="1523880" y="1122480"/>
-            <a:ext cx="9143280" cy="11064960"/>
+            <a:ext cx="9142920" cy="11063520"/>
           </a:xfrm>
           <a:prstGeom prst="rect">
             <a:avLst/>
@@ -1024,7 +1199,10 @@
           </a:bodyPr>
           <a:p>
             <a:pPr algn="ctr"/>
-            <a:endParaRPr b="0" lang="en-IN" sz="3200" spc="-1" strike="noStrike">
+            <a:endParaRPr b="0" lang="en-US" sz="3200" spc="-1" strike="noStrike">
+              <a:solidFill>
+                <a:srgbClr val="000000"/>
+              </a:solidFill>
               <a:latin typeface="Arial"/>
             </a:endParaRPr>
           </a:p>
@@ -1065,7 +1243,7 @@
         <p:spPr>
           <a:xfrm>
             <a:off x="1523880" y="1122480"/>
-            <a:ext cx="9143280" cy="2386800"/>
+            <a:ext cx="9142920" cy="2386440"/>
           </a:xfrm>
           <a:prstGeom prst="rect">
             <a:avLst/>
@@ -1080,8 +1258,13 @@
             <a:noAutofit/>
           </a:bodyPr>
           <a:p>
-            <a:pPr algn="ctr"/>
-            <a:endParaRPr b="0" lang="en-IN" sz="4400" spc="-1" strike="noStrike">
+            <a:pPr indent="0" algn="ctr">
+              <a:buNone/>
+            </a:pPr>
+            <a:endParaRPr b="0" lang="en-US" sz="4400" spc="-1" strike="noStrike">
+              <a:solidFill>
+                <a:srgbClr val="000000"/>
+              </a:solidFill>
               <a:latin typeface="Arial"/>
             </a:endParaRPr>
           </a:p>
@@ -1115,7 +1298,16 @@
             <a:normAutofit/>
           </a:bodyPr>
           <a:p>
-            <a:endParaRPr b="0" lang="en-IN" sz="3200" spc="-1" strike="noStrike">
+            <a:pPr indent="0">
+              <a:spcBef>
+                <a:spcPts val="1417"/>
+              </a:spcBef>
+              <a:buNone/>
+            </a:pPr>
+            <a:endParaRPr b="0" lang="en-US" sz="3200" spc="-1" strike="noStrike">
+              <a:solidFill>
+                <a:srgbClr val="000000"/>
+              </a:solidFill>
               <a:latin typeface="Arial"/>
             </a:endParaRPr>
           </a:p>
@@ -1134,7 +1326,7 @@
         <p:spPr>
           <a:xfrm>
             <a:off x="6231960" y="1604520"/>
-            <a:ext cx="5354280" cy="3977280"/>
+            <a:ext cx="5354280" cy="3976920"/>
           </a:xfrm>
           <a:prstGeom prst="rect">
             <a:avLst/>
@@ -1149,7 +1341,16 @@
             <a:normAutofit/>
           </a:bodyPr>
           <a:p>
-            <a:endParaRPr b="0" lang="en-IN" sz="3200" spc="-1" strike="noStrike">
+            <a:pPr indent="0">
+              <a:spcBef>
+                <a:spcPts val="1417"/>
+              </a:spcBef>
+              <a:buNone/>
+            </a:pPr>
+            <a:endParaRPr b="0" lang="en-US" sz="3200" spc="-1" strike="noStrike">
+              <a:solidFill>
+                <a:srgbClr val="000000"/>
+              </a:solidFill>
               <a:latin typeface="Arial"/>
             </a:endParaRPr>
           </a:p>
@@ -1183,7 +1384,16 @@
             <a:normAutofit/>
           </a:bodyPr>
           <a:p>
-            <a:endParaRPr b="0" lang="en-IN" sz="3200" spc="-1" strike="noStrike">
+            <a:pPr indent="0">
+              <a:spcBef>
+                <a:spcPts val="1417"/>
+              </a:spcBef>
+              <a:buNone/>
+            </a:pPr>
+            <a:endParaRPr b="0" lang="en-US" sz="3200" spc="-1" strike="noStrike">
+              <a:solidFill>
+                <a:srgbClr val="000000"/>
+              </a:solidFill>
               <a:latin typeface="Arial"/>
             </a:endParaRPr>
           </a:p>
@@ -1224,7 +1434,7 @@
         <p:spPr>
           <a:xfrm>
             <a:off x="1523880" y="1122480"/>
-            <a:ext cx="9143280" cy="2386800"/>
+            <a:ext cx="9142920" cy="2386440"/>
           </a:xfrm>
           <a:prstGeom prst="rect">
             <a:avLst/>
@@ -1239,8 +1449,13 @@
             <a:noAutofit/>
           </a:bodyPr>
           <a:p>
-            <a:pPr algn="ctr"/>
-            <a:endParaRPr b="0" lang="en-IN" sz="4400" spc="-1" strike="noStrike">
+            <a:pPr indent="0" algn="ctr">
+              <a:buNone/>
+            </a:pPr>
+            <a:endParaRPr b="0" lang="en-US" sz="4400" spc="-1" strike="noStrike">
+              <a:solidFill>
+                <a:srgbClr val="000000"/>
+              </a:solidFill>
               <a:latin typeface="Arial"/>
             </a:endParaRPr>
           </a:p>
@@ -1259,7 +1474,7 @@
         <p:spPr>
           <a:xfrm>
             <a:off x="609480" y="1604520"/>
-            <a:ext cx="5354280" cy="3977280"/>
+            <a:ext cx="5354280" cy="3976920"/>
           </a:xfrm>
           <a:prstGeom prst="rect">
             <a:avLst/>
@@ -1274,7 +1489,16 @@
             <a:normAutofit/>
           </a:bodyPr>
           <a:p>
-            <a:endParaRPr b="0" lang="en-IN" sz="3200" spc="-1" strike="noStrike">
+            <a:pPr indent="0">
+              <a:spcBef>
+                <a:spcPts val="1417"/>
+              </a:spcBef>
+              <a:buNone/>
+            </a:pPr>
+            <a:endParaRPr b="0" lang="en-US" sz="3200" spc="-1" strike="noStrike">
+              <a:solidFill>
+                <a:srgbClr val="000000"/>
+              </a:solidFill>
               <a:latin typeface="Arial"/>
             </a:endParaRPr>
           </a:p>
@@ -1308,7 +1532,16 @@
             <a:normAutofit/>
           </a:bodyPr>
           <a:p>
-            <a:endParaRPr b="0" lang="en-IN" sz="3200" spc="-1" strike="noStrike">
+            <a:pPr indent="0">
+              <a:spcBef>
+                <a:spcPts val="1417"/>
+              </a:spcBef>
+              <a:buNone/>
+            </a:pPr>
+            <a:endParaRPr b="0" lang="en-US" sz="3200" spc="-1" strike="noStrike">
+              <a:solidFill>
+                <a:srgbClr val="000000"/>
+              </a:solidFill>
               <a:latin typeface="Arial"/>
             </a:endParaRPr>
           </a:p>
@@ -1342,7 +1575,16 @@
             <a:normAutofit/>
           </a:bodyPr>
           <a:p>
-            <a:endParaRPr b="0" lang="en-IN" sz="3200" spc="-1" strike="noStrike">
+            <a:pPr indent="0">
+              <a:spcBef>
+                <a:spcPts val="1417"/>
+              </a:spcBef>
+              <a:buNone/>
+            </a:pPr>
+            <a:endParaRPr b="0" lang="en-US" sz="3200" spc="-1" strike="noStrike">
+              <a:solidFill>
+                <a:srgbClr val="000000"/>
+              </a:solidFill>
               <a:latin typeface="Arial"/>
             </a:endParaRPr>
           </a:p>
@@ -1383,7 +1625,7 @@
         <p:spPr>
           <a:xfrm>
             <a:off x="1523880" y="1122480"/>
-            <a:ext cx="9143280" cy="2386800"/>
+            <a:ext cx="9142920" cy="2386440"/>
           </a:xfrm>
           <a:prstGeom prst="rect">
             <a:avLst/>
@@ -1398,8 +1640,13 @@
             <a:noAutofit/>
           </a:bodyPr>
           <a:p>
-            <a:pPr algn="ctr"/>
-            <a:endParaRPr b="0" lang="en-IN" sz="4400" spc="-1" strike="noStrike">
+            <a:pPr indent="0" algn="ctr">
+              <a:buNone/>
+            </a:pPr>
+            <a:endParaRPr b="0" lang="en-US" sz="4400" spc="-1" strike="noStrike">
+              <a:solidFill>
+                <a:srgbClr val="000000"/>
+              </a:solidFill>
               <a:latin typeface="Arial"/>
             </a:endParaRPr>
           </a:p>
@@ -1433,7 +1680,16 @@
             <a:normAutofit/>
           </a:bodyPr>
           <a:p>
-            <a:endParaRPr b="0" lang="en-IN" sz="3200" spc="-1" strike="noStrike">
+            <a:pPr indent="0">
+              <a:spcBef>
+                <a:spcPts val="1417"/>
+              </a:spcBef>
+              <a:buNone/>
+            </a:pPr>
+            <a:endParaRPr b="0" lang="en-US" sz="3200" spc="-1" strike="noStrike">
+              <a:solidFill>
+                <a:srgbClr val="000000"/>
+              </a:solidFill>
               <a:latin typeface="Arial"/>
             </a:endParaRPr>
           </a:p>
@@ -1467,7 +1723,16 @@
             <a:normAutofit/>
           </a:bodyPr>
           <a:p>
-            <a:endParaRPr b="0" lang="en-IN" sz="3200" spc="-1" strike="noStrike">
+            <a:pPr indent="0">
+              <a:spcBef>
+                <a:spcPts val="1417"/>
+              </a:spcBef>
+              <a:buNone/>
+            </a:pPr>
+            <a:endParaRPr b="0" lang="en-US" sz="3200" spc="-1" strike="noStrike">
+              <a:solidFill>
+                <a:srgbClr val="000000"/>
+              </a:solidFill>
               <a:latin typeface="Arial"/>
             </a:endParaRPr>
           </a:p>
@@ -1486,7 +1751,7 @@
         <p:spPr>
           <a:xfrm>
             <a:off x="609480" y="3682080"/>
-            <a:ext cx="10972440" cy="1896840"/>
+            <a:ext cx="10972080" cy="1896840"/>
           </a:xfrm>
           <a:prstGeom prst="rect">
             <a:avLst/>
@@ -1501,7 +1766,16 @@
             <a:normAutofit/>
           </a:bodyPr>
           <a:p>
-            <a:endParaRPr b="0" lang="en-IN" sz="3200" spc="-1" strike="noStrike">
+            <a:pPr indent="0">
+              <a:spcBef>
+                <a:spcPts val="1417"/>
+              </a:spcBef>
+              <a:buNone/>
+            </a:pPr>
+            <a:endParaRPr b="0" lang="en-US" sz="3200" spc="-1" strike="noStrike">
+              <a:solidFill>
+                <a:srgbClr val="000000"/>
+              </a:solidFill>
               <a:latin typeface="Arial"/>
             </a:endParaRPr>
           </a:p>
@@ -1549,7 +1823,7 @@
         <p:spPr>
           <a:xfrm>
             <a:off x="1523880" y="1122480"/>
-            <a:ext cx="9143280" cy="2386800"/>
+            <a:ext cx="9142920" cy="2386440"/>
           </a:xfrm>
           <a:prstGeom prst="rect">
             <a:avLst/>
@@ -1564,19 +1838,22 @@
             <a:noAutofit/>
           </a:bodyPr>
           <a:p>
+            <a:pPr indent="0">
+              <a:buNone/>
+            </a:pPr>
             <a:r>
-              <a:rPr b="0" lang="en-IN" sz="1800" spc="-1" strike="noStrike">
+              <a:rPr b="0" lang="en-US" sz="1800" spc="-1" strike="noStrike">
+                <a:solidFill>
+                  <a:srgbClr val="000000"/>
+                </a:solidFill>
                 <a:latin typeface="Arial"/>
               </a:rPr>
-              <a:t>Click to edit the title text </a:t>
+              <a:t>Click to edit the title text format</a:t>
             </a:r>
-            <a:r>
-              <a:rPr b="0" lang="en-IN" sz="1800" spc="-1" strike="noStrike">
-                <a:latin typeface="Arial"/>
-              </a:rPr>
-              <a:t>format</a:t>
-            </a:r>
-            <a:endParaRPr b="0" lang="en-IN" sz="1800" spc="-1" strike="noStrike">
+            <a:endParaRPr b="0" lang="en-US" sz="1800" spc="-1" strike="noStrike">
+              <a:solidFill>
+                <a:srgbClr val="000000"/>
+              </a:solidFill>
               <a:latin typeface="Arial"/>
             </a:endParaRPr>
           </a:p>
@@ -1595,7 +1872,7 @@
         <p:spPr>
           <a:xfrm>
             <a:off x="609480" y="1604520"/>
-            <a:ext cx="10972440" cy="3977280"/>
+            <a:ext cx="10972080" cy="3976920"/>
           </a:xfrm>
           <a:prstGeom prst="rect">
             <a:avLst/>
@@ -1622,12 +1899,18 @@
               <a:buChar char=""/>
             </a:pPr>
             <a:r>
-              <a:rPr b="0" lang="en-IN" sz="3200" spc="-1" strike="noStrike">
+              <a:rPr b="0" lang="en-US" sz="1800" spc="-1" strike="noStrike">
+                <a:solidFill>
+                  <a:srgbClr val="000000"/>
+                </a:solidFill>
                 <a:latin typeface="Arial"/>
               </a:rPr>
               <a:t>Click to edit the outline text format</a:t>
             </a:r>
-            <a:endParaRPr b="0" lang="en-IN" sz="3200" spc="-1" strike="noStrike">
+            <a:endParaRPr b="0" lang="en-US" sz="1800" spc="-1" strike="noStrike">
+              <a:solidFill>
+                <a:srgbClr val="000000"/>
+              </a:solidFill>
               <a:latin typeface="Arial"/>
             </a:endParaRPr>
           </a:p>
@@ -1644,12 +1927,18 @@
               <a:buChar char=""/>
             </a:pPr>
             <a:r>
-              <a:rPr b="0" lang="en-IN" sz="2800" spc="-1" strike="noStrike">
+              <a:rPr b="0" lang="en-US" sz="1800" spc="-1" strike="noStrike">
+                <a:solidFill>
+                  <a:srgbClr val="000000"/>
+                </a:solidFill>
                 <a:latin typeface="Arial"/>
               </a:rPr>
               <a:t>Second Outline Level</a:t>
             </a:r>
-            <a:endParaRPr b="0" lang="en-IN" sz="2800" spc="-1" strike="noStrike">
+            <a:endParaRPr b="0" lang="en-US" sz="1800" spc="-1" strike="noStrike">
+              <a:solidFill>
+                <a:srgbClr val="000000"/>
+              </a:solidFill>
               <a:latin typeface="Arial"/>
             </a:endParaRPr>
           </a:p>
@@ -1666,12 +1955,18 @@
               <a:buChar char=""/>
             </a:pPr>
             <a:r>
-              <a:rPr b="0" lang="en-IN" sz="2400" spc="-1" strike="noStrike">
+              <a:rPr b="0" lang="en-US" sz="1800" spc="-1" strike="noStrike">
+                <a:solidFill>
+                  <a:srgbClr val="000000"/>
+                </a:solidFill>
                 <a:latin typeface="Arial"/>
               </a:rPr>
               <a:t>Third Outline Level</a:t>
             </a:r>
-            <a:endParaRPr b="0" lang="en-IN" sz="2400" spc="-1" strike="noStrike">
+            <a:endParaRPr b="0" lang="en-US" sz="1800" spc="-1" strike="noStrike">
+              <a:solidFill>
+                <a:srgbClr val="000000"/>
+              </a:solidFill>
               <a:latin typeface="Arial"/>
             </a:endParaRPr>
           </a:p>
@@ -1688,12 +1983,18 @@
               <a:buChar char=""/>
             </a:pPr>
             <a:r>
-              <a:rPr b="0" lang="en-IN" sz="2000" spc="-1" strike="noStrike">
+              <a:rPr b="0" lang="en-US" sz="1800" spc="-1" strike="noStrike">
+                <a:solidFill>
+                  <a:srgbClr val="000000"/>
+                </a:solidFill>
                 <a:latin typeface="Arial"/>
               </a:rPr>
               <a:t>Fourth Outline Level</a:t>
             </a:r>
-            <a:endParaRPr b="0" lang="en-IN" sz="2000" spc="-1" strike="noStrike">
+            <a:endParaRPr b="0" lang="en-US" sz="1800" spc="-1" strike="noStrike">
+              <a:solidFill>
+                <a:srgbClr val="000000"/>
+              </a:solidFill>
               <a:latin typeface="Arial"/>
             </a:endParaRPr>
           </a:p>
@@ -1710,12 +2011,18 @@
               <a:buChar char=""/>
             </a:pPr>
             <a:r>
-              <a:rPr b="0" lang="en-IN" sz="2000" spc="-1" strike="noStrike">
+              <a:rPr b="0" lang="en-US" sz="1800" spc="-1" strike="noStrike">
+                <a:solidFill>
+                  <a:srgbClr val="000000"/>
+                </a:solidFill>
                 <a:latin typeface="Arial"/>
               </a:rPr>
               <a:t>Fifth Outline Level</a:t>
             </a:r>
-            <a:endParaRPr b="0" lang="en-IN" sz="2000" spc="-1" strike="noStrike">
+            <a:endParaRPr b="0" lang="en-US" sz="1800" spc="-1" strike="noStrike">
+              <a:solidFill>
+                <a:srgbClr val="000000"/>
+              </a:solidFill>
               <a:latin typeface="Arial"/>
             </a:endParaRPr>
           </a:p>
@@ -1732,12 +2039,18 @@
               <a:buChar char=""/>
             </a:pPr>
             <a:r>
-              <a:rPr b="0" lang="en-IN" sz="2000" spc="-1" strike="noStrike">
+              <a:rPr b="0" lang="en-US" sz="1800" spc="-1" strike="noStrike">
+                <a:solidFill>
+                  <a:srgbClr val="000000"/>
+                </a:solidFill>
                 <a:latin typeface="Arial"/>
               </a:rPr>
               <a:t>Sixth Outline Level</a:t>
             </a:r>
-            <a:endParaRPr b="0" lang="en-IN" sz="2000" spc="-1" strike="noStrike">
+            <a:endParaRPr b="0" lang="en-US" sz="1800" spc="-1" strike="noStrike">
+              <a:solidFill>
+                <a:srgbClr val="000000"/>
+              </a:solidFill>
               <a:latin typeface="Arial"/>
             </a:endParaRPr>
           </a:p>
@@ -1754,12 +2067,18 @@
               <a:buChar char=""/>
             </a:pPr>
             <a:r>
-              <a:rPr b="0" lang="en-IN" sz="2000" spc="-1" strike="noStrike">
+              <a:rPr b="0" lang="en-US" sz="1800" spc="-1" strike="noStrike">
+                <a:solidFill>
+                  <a:srgbClr val="000000"/>
+                </a:solidFill>
                 <a:latin typeface="Arial"/>
               </a:rPr>
               <a:t>Seventh Outline Level</a:t>
             </a:r>
-            <a:endParaRPr b="0" lang="en-IN" sz="2000" spc="-1" strike="noStrike">
+            <a:endParaRPr b="0" lang="en-US" sz="1800" spc="-1" strike="noStrike">
+              <a:solidFill>
+                <a:srgbClr val="000000"/>
+              </a:solidFill>
               <a:latin typeface="Arial"/>
             </a:endParaRPr>
           </a:p>
@@ -1811,9 +2130,9 @@
         <p:grpSpPr>
           <a:xfrm>
             <a:off x="4620600" y="3029760"/>
-            <a:ext cx="2928600" cy="1708560"/>
+            <a:ext cx="2928240" cy="1708200"/>
             <a:chOff x="4620600" y="3029760"/>
-            <a:chExt cx="2928600" cy="1708560"/>
+            <a:chExt cx="2928240" cy="1708200"/>
           </a:xfrm>
         </p:grpSpPr>
         <p:sp>
@@ -1825,7 +2144,7 @@
           <p:spPr>
             <a:xfrm>
               <a:off x="5266800" y="3029760"/>
-              <a:ext cx="1636200" cy="394920"/>
+              <a:ext cx="1635840" cy="394560"/>
             </a:xfrm>
             <a:prstGeom prst="rect">
               <a:avLst/>
@@ -1861,7 +2180,10 @@
                 </a:rPr>
                 <a:t>pLisp 0.1.30</a:t>
               </a:r>
-              <a:endParaRPr b="0" lang="en-IN" sz="2000" spc="-1" strike="noStrike">
+              <a:endParaRPr b="0" lang="en-US" sz="2000" spc="-1" strike="noStrike">
+                <a:solidFill>
+                  <a:srgbClr val="000000"/>
+                </a:solidFill>
                 <a:latin typeface="Arial"/>
               </a:endParaRPr>
             </a:p>
@@ -1876,7 +2198,7 @@
           <p:spPr>
             <a:xfrm>
               <a:off x="5365080" y="3465360"/>
-              <a:ext cx="1439640" cy="303120"/>
+              <a:ext cx="1439280" cy="302760"/>
             </a:xfrm>
             <a:prstGeom prst="rect">
               <a:avLst/>
@@ -1912,7 +2234,10 @@
                 </a:rPr>
                 <a:t>Don’t Lisp. Talk!</a:t>
               </a:r>
-              <a:endParaRPr b="0" lang="en-IN" sz="1400" spc="-1" strike="noStrike">
+              <a:endParaRPr b="0" lang="en-US" sz="1400" spc="-1" strike="noStrike">
+                <a:solidFill>
+                  <a:srgbClr val="000000"/>
+                </a:solidFill>
                 <a:latin typeface="Arial"/>
               </a:endParaRPr>
             </a:p>
@@ -1927,7 +2252,7 @@
           <p:spPr>
             <a:xfrm>
               <a:off x="4620600" y="4313520"/>
-              <a:ext cx="2928600" cy="424800"/>
+              <a:ext cx="2928240" cy="424440"/>
             </a:xfrm>
             <a:prstGeom prst="rect">
               <a:avLst/>
@@ -1961,9 +2286,12 @@
                   <a:latin typeface="Arial"/>
                   <a:ea typeface="DejaVu Sans"/>
                 </a:rPr>
-                <a:t>Copyright © 2011-2022 Rajesh Jayaprakash</a:t>
+                <a:t>Copyright © 2011-2023 Rajesh Jayaprakash</a:t>
               </a:r>
-              <a:endParaRPr b="0" lang="en-IN" sz="1100" spc="-1" strike="noStrike">
+              <a:endParaRPr b="0" lang="en-US" sz="1100" spc="-1" strike="noStrike">
+                <a:solidFill>
+                  <a:srgbClr val="000000"/>
+                </a:solidFill>
                 <a:latin typeface="Arial"/>
               </a:endParaRPr>
             </a:p>
@@ -1983,7 +2311,10 @@
                 </a:rPr>
                 <a:t>All rights reserved</a:t>
               </a:r>
-              <a:endParaRPr b="0" lang="en-IN" sz="1100" spc="-1" strike="noStrike">
+              <a:endParaRPr b="0" lang="en-US" sz="1100" spc="-1" strike="noStrike">
+                <a:solidFill>
+                  <a:srgbClr val="000000"/>
+                </a:solidFill>
                 <a:latin typeface="Arial"/>
               </a:endParaRPr>
             </a:p>
@@ -1999,7 +2330,7 @@
         <p:spPr>
           <a:xfrm>
             <a:off x="2769120" y="1094760"/>
-            <a:ext cx="6666480" cy="3802680"/>
+            <a:ext cx="6666120" cy="3802320"/>
           </a:xfrm>
           <a:prstGeom prst="rect">
             <a:avLst/>
@@ -2025,6 +2356,19 @@
           </a:effectRef>
           <a:fontRef idx="minor"/>
         </p:style>
+        <p:txBody>
+          <a:bodyPr lIns="90000" rIns="90000" tIns="45000" bIns="45000" anchor="t">
+            <a:noAutofit/>
+          </a:bodyPr>
+          <a:p>
+            <a:endParaRPr b="0" lang="en-US" sz="1800" spc="-1" strike="noStrike">
+              <a:solidFill>
+                <a:srgbClr val="000000"/>
+              </a:solidFill>
+              <a:latin typeface="Arial"/>
+            </a:endParaRPr>
+          </a:p>
+        </p:txBody>
       </p:sp>
       <p:pic>
         <p:nvPicPr>
@@ -2039,7 +2383,7 @@
         <p:spPr>
           <a:xfrm>
             <a:off x="5222160" y="1221120"/>
-            <a:ext cx="1802520" cy="1751760"/>
+            <a:ext cx="1802160" cy="1751400"/>
           </a:xfrm>
           <a:prstGeom prst="rect">
             <a:avLst/>
@@ -2067,10 +2411,10 @@
   <a:themeElements>
     <a:clrScheme name="Office">
       <a:dk1>
-        <a:sysClr val="windowText" lastClr="000000"/>
+        <a:srgbClr val="000000"/>
       </a:dk1>
       <a:lt1>
-        <a:sysClr val="window" lastClr="FFFFFF"/>
+        <a:srgbClr val="ffffff"/>
       </a:lt1>
       <a:dk2>
         <a:srgbClr val="44546a"/>
@@ -2168,7 +2512,7 @@
         </a:gradFill>
       </a:fillStyleLst>
       <a:lnStyleLst>
-        <a:ln w="9525" cap="flat" cmpd="sng" algn="ctr">
+        <a:ln w="6350" cap="flat" cmpd="sng" algn="ctr">
           <a:solidFill>
             <a:schemeClr val="phClr">
               <a:shade val="95000"/>
@@ -2178,14 +2522,14 @@
           <a:prstDash val="solid"/>
           <a:miter/>
         </a:ln>
-        <a:ln w="25400" cap="flat" cmpd="sng" algn="ctr">
+        <a:ln w="12700" cap="flat" cmpd="sng" algn="ctr">
           <a:solidFill>
             <a:schemeClr val="phClr"/>
           </a:solidFill>
           <a:prstDash val="solid"/>
           <a:miter/>
         </a:ln>
-        <a:ln w="38100" cap="flat" cmpd="sng" algn="ctr">
+        <a:ln w="19050" cap="flat" cmpd="sng" algn="ctr">
           <a:solidFill>
             <a:schemeClr val="phClr"/>
           </a:solidFill>
@@ -2195,22 +2539,10 @@
       </a:lnStyleLst>
       <a:effectStyleLst>
         <a:effectStyle>
-          <a:effectLst>
-            <a:outerShdw blurRad="40000" dist="20000" dir="5400000" rotWithShape="0">
-              <a:srgbClr val="000000">
-                <a:alpha val="38000"/>
-              </a:srgbClr>
-            </a:outerShdw>
-          </a:effectLst>
+          <a:effectLst/>
         </a:effectStyle>
         <a:effectStyle>
-          <a:effectLst>
-            <a:outerShdw blurRad="40000" dist="23000" dir="5400000" rotWithShape="0">
-              <a:srgbClr val="000000">
-                <a:alpha val="35000"/>
-              </a:srgbClr>
-            </a:outerShdw>
-          </a:effectLst>
+          <a:effectLst/>
         </a:effectStyle>
         <a:effectStyle>
           <a:effectLst>

</xml_diff>

<commit_message>
Changed copyright year to 2024
</commit_message>
<xml_diff>
--- a/icons/splash.pptx
+++ b/icons/splash.pptx
@@ -53,7 +53,7 @@
       </p:grpSpPr>
       <p:sp>
         <p:nvSpPr>
-          <p:cNvPr id="23" name="PlaceHolder 1"/>
+          <p:cNvPr id="25" name="PlaceHolder 1"/>
           <p:cNvSpPr>
             <a:spLocks noGrp="1"/>
           </p:cNvSpPr>
@@ -63,8 +63,8 @@
         </p:nvSpPr>
         <p:spPr>
           <a:xfrm>
-            <a:off x="1523880" y="1122480"/>
-            <a:ext cx="9142920" cy="2386440"/>
+            <a:off x="609480" y="273600"/>
+            <a:ext cx="10972440" cy="1144800"/>
           </a:xfrm>
           <a:prstGeom prst="rect">
             <a:avLst/>
@@ -82,18 +82,18 @@
             <a:pPr indent="0" algn="ctr">
               <a:buNone/>
             </a:pPr>
-            <a:endParaRPr b="0" lang="en-US" sz="4400" spc="-1" strike="noStrike">
-              <a:solidFill>
-                <a:srgbClr val="000000"/>
-              </a:solidFill>
-              <a:latin typeface="Arial"/>
-            </a:endParaRPr>
-          </a:p>
-        </p:txBody>
-      </p:sp>
-      <p:sp>
-        <p:nvSpPr>
-          <p:cNvPr id="24" name="PlaceHolder 2"/>
+            <a:endParaRPr b="0" lang="en-GB" sz="4400" spc="-1" strike="noStrike">
+              <a:solidFill>
+                <a:srgbClr val="000000"/>
+              </a:solidFill>
+              <a:latin typeface="Arial"/>
+            </a:endParaRPr>
+          </a:p>
+        </p:txBody>
+      </p:sp>
+      <p:sp>
+        <p:nvSpPr>
+          <p:cNvPr id="26" name="PlaceHolder 2"/>
           <p:cNvSpPr>
             <a:spLocks noGrp="1"/>
           </p:cNvSpPr>
@@ -104,7 +104,7 @@
         <p:spPr>
           <a:xfrm>
             <a:off x="609480" y="1604520"/>
-            <a:ext cx="10972080" cy="1896840"/>
+            <a:ext cx="10972440" cy="1896840"/>
           </a:xfrm>
           <a:prstGeom prst="rect">
             <a:avLst/>
@@ -125,18 +125,18 @@
               </a:spcBef>
               <a:buNone/>
             </a:pPr>
-            <a:endParaRPr b="0" lang="en-US" sz="3200" spc="-1" strike="noStrike">
-              <a:solidFill>
-                <a:srgbClr val="000000"/>
-              </a:solidFill>
-              <a:latin typeface="Arial"/>
-            </a:endParaRPr>
-          </a:p>
-        </p:txBody>
-      </p:sp>
-      <p:sp>
-        <p:nvSpPr>
-          <p:cNvPr id="25" name="PlaceHolder 3"/>
+            <a:endParaRPr b="0" lang="en-GB" sz="3200" spc="-1" strike="noStrike">
+              <a:solidFill>
+                <a:srgbClr val="000000"/>
+              </a:solidFill>
+              <a:latin typeface="Arial"/>
+            </a:endParaRPr>
+          </a:p>
+        </p:txBody>
+      </p:sp>
+      <p:sp>
+        <p:nvSpPr>
+          <p:cNvPr id="27" name="PlaceHolder 3"/>
           <p:cNvSpPr>
             <a:spLocks noGrp="1"/>
           </p:cNvSpPr>
@@ -147,7 +147,7 @@
         <p:spPr>
           <a:xfrm>
             <a:off x="609480" y="3682080"/>
-            <a:ext cx="10972080" cy="1896840"/>
+            <a:ext cx="10972440" cy="1896840"/>
           </a:xfrm>
           <a:prstGeom prst="rect">
             <a:avLst/>
@@ -168,7 +168,7 @@
               </a:spcBef>
               <a:buNone/>
             </a:pPr>
-            <a:endParaRPr b="0" lang="en-US" sz="3200" spc="-1" strike="noStrike">
+            <a:endParaRPr b="0" lang="en-GB" sz="3200" spc="-1" strike="noStrike">
               <a:solidFill>
                 <a:srgbClr val="000000"/>
               </a:solidFill>
@@ -201,7 +201,7 @@
       </p:grpSpPr>
       <p:sp>
         <p:nvSpPr>
-          <p:cNvPr id="26" name="PlaceHolder 1"/>
+          <p:cNvPr id="28" name="PlaceHolder 1"/>
           <p:cNvSpPr>
             <a:spLocks noGrp="1"/>
           </p:cNvSpPr>
@@ -211,8 +211,8 @@
         </p:nvSpPr>
         <p:spPr>
           <a:xfrm>
-            <a:off x="1523880" y="1122480"/>
-            <a:ext cx="9142920" cy="2386440"/>
+            <a:off x="609480" y="273600"/>
+            <a:ext cx="10972440" cy="1144800"/>
           </a:xfrm>
           <a:prstGeom prst="rect">
             <a:avLst/>
@@ -230,18 +230,18 @@
             <a:pPr indent="0" algn="ctr">
               <a:buNone/>
             </a:pPr>
-            <a:endParaRPr b="0" lang="en-US" sz="4400" spc="-1" strike="noStrike">
-              <a:solidFill>
-                <a:srgbClr val="000000"/>
-              </a:solidFill>
-              <a:latin typeface="Arial"/>
-            </a:endParaRPr>
-          </a:p>
-        </p:txBody>
-      </p:sp>
-      <p:sp>
-        <p:nvSpPr>
-          <p:cNvPr id="27" name="PlaceHolder 2"/>
+            <a:endParaRPr b="0" lang="en-GB" sz="4400" spc="-1" strike="noStrike">
+              <a:solidFill>
+                <a:srgbClr val="000000"/>
+              </a:solidFill>
+              <a:latin typeface="Arial"/>
+            </a:endParaRPr>
+          </a:p>
+        </p:txBody>
+      </p:sp>
+      <p:sp>
+        <p:nvSpPr>
+          <p:cNvPr id="29" name="PlaceHolder 2"/>
           <p:cNvSpPr>
             <a:spLocks noGrp="1"/>
           </p:cNvSpPr>
@@ -273,18 +273,18 @@
               </a:spcBef>
               <a:buNone/>
             </a:pPr>
-            <a:endParaRPr b="0" lang="en-US" sz="3200" spc="-1" strike="noStrike">
-              <a:solidFill>
-                <a:srgbClr val="000000"/>
-              </a:solidFill>
-              <a:latin typeface="Arial"/>
-            </a:endParaRPr>
-          </a:p>
-        </p:txBody>
-      </p:sp>
-      <p:sp>
-        <p:nvSpPr>
-          <p:cNvPr id="28" name="PlaceHolder 3"/>
+            <a:endParaRPr b="0" lang="en-GB" sz="3200" spc="-1" strike="noStrike">
+              <a:solidFill>
+                <a:srgbClr val="000000"/>
+              </a:solidFill>
+              <a:latin typeface="Arial"/>
+            </a:endParaRPr>
+          </a:p>
+        </p:txBody>
+      </p:sp>
+      <p:sp>
+        <p:nvSpPr>
+          <p:cNvPr id="30" name="PlaceHolder 3"/>
           <p:cNvSpPr>
             <a:spLocks noGrp="1"/>
           </p:cNvSpPr>
@@ -316,18 +316,18 @@
               </a:spcBef>
               <a:buNone/>
             </a:pPr>
-            <a:endParaRPr b="0" lang="en-US" sz="3200" spc="-1" strike="noStrike">
-              <a:solidFill>
-                <a:srgbClr val="000000"/>
-              </a:solidFill>
-              <a:latin typeface="Arial"/>
-            </a:endParaRPr>
-          </a:p>
-        </p:txBody>
-      </p:sp>
-      <p:sp>
-        <p:nvSpPr>
-          <p:cNvPr id="29" name="PlaceHolder 4"/>
+            <a:endParaRPr b="0" lang="en-GB" sz="3200" spc="-1" strike="noStrike">
+              <a:solidFill>
+                <a:srgbClr val="000000"/>
+              </a:solidFill>
+              <a:latin typeface="Arial"/>
+            </a:endParaRPr>
+          </a:p>
+        </p:txBody>
+      </p:sp>
+      <p:sp>
+        <p:nvSpPr>
+          <p:cNvPr id="31" name="PlaceHolder 4"/>
           <p:cNvSpPr>
             <a:spLocks noGrp="1"/>
           </p:cNvSpPr>
@@ -359,18 +359,18 @@
               </a:spcBef>
               <a:buNone/>
             </a:pPr>
-            <a:endParaRPr b="0" lang="en-US" sz="3200" spc="-1" strike="noStrike">
-              <a:solidFill>
-                <a:srgbClr val="000000"/>
-              </a:solidFill>
-              <a:latin typeface="Arial"/>
-            </a:endParaRPr>
-          </a:p>
-        </p:txBody>
-      </p:sp>
-      <p:sp>
-        <p:nvSpPr>
-          <p:cNvPr id="30" name="PlaceHolder 5"/>
+            <a:endParaRPr b="0" lang="en-GB" sz="3200" spc="-1" strike="noStrike">
+              <a:solidFill>
+                <a:srgbClr val="000000"/>
+              </a:solidFill>
+              <a:latin typeface="Arial"/>
+            </a:endParaRPr>
+          </a:p>
+        </p:txBody>
+      </p:sp>
+      <p:sp>
+        <p:nvSpPr>
+          <p:cNvPr id="32" name="PlaceHolder 5"/>
           <p:cNvSpPr>
             <a:spLocks noGrp="1"/>
           </p:cNvSpPr>
@@ -402,7 +402,7 @@
               </a:spcBef>
               <a:buNone/>
             </a:pPr>
-            <a:endParaRPr b="0" lang="en-US" sz="3200" spc="-1" strike="noStrike">
+            <a:endParaRPr b="0" lang="en-GB" sz="3200" spc="-1" strike="noStrike">
               <a:solidFill>
                 <a:srgbClr val="000000"/>
               </a:solidFill>
@@ -435,7 +435,7 @@
       </p:grpSpPr>
       <p:sp>
         <p:nvSpPr>
-          <p:cNvPr id="31" name="PlaceHolder 1"/>
+          <p:cNvPr id="33" name="PlaceHolder 1"/>
           <p:cNvSpPr>
             <a:spLocks noGrp="1"/>
           </p:cNvSpPr>
@@ -445,8 +445,8 @@
         </p:nvSpPr>
         <p:spPr>
           <a:xfrm>
-            <a:off x="1523880" y="1122480"/>
-            <a:ext cx="9142920" cy="2386440"/>
+            <a:off x="609480" y="273600"/>
+            <a:ext cx="10972440" cy="1144800"/>
           </a:xfrm>
           <a:prstGeom prst="rect">
             <a:avLst/>
@@ -464,18 +464,18 @@
             <a:pPr indent="0" algn="ctr">
               <a:buNone/>
             </a:pPr>
-            <a:endParaRPr b="0" lang="en-US" sz="4400" spc="-1" strike="noStrike">
-              <a:solidFill>
-                <a:srgbClr val="000000"/>
-              </a:solidFill>
-              <a:latin typeface="Arial"/>
-            </a:endParaRPr>
-          </a:p>
-        </p:txBody>
-      </p:sp>
-      <p:sp>
-        <p:nvSpPr>
-          <p:cNvPr id="32" name="PlaceHolder 2"/>
+            <a:endParaRPr b="0" lang="en-GB" sz="4400" spc="-1" strike="noStrike">
+              <a:solidFill>
+                <a:srgbClr val="000000"/>
+              </a:solidFill>
+              <a:latin typeface="Arial"/>
+            </a:endParaRPr>
+          </a:p>
+        </p:txBody>
+      </p:sp>
+      <p:sp>
+        <p:nvSpPr>
+          <p:cNvPr id="34" name="PlaceHolder 2"/>
           <p:cNvSpPr>
             <a:spLocks noGrp="1"/>
           </p:cNvSpPr>
@@ -486,7 +486,7 @@
         <p:spPr>
           <a:xfrm>
             <a:off x="609480" y="1604520"/>
-            <a:ext cx="3532680" cy="1896840"/>
+            <a:ext cx="3533040" cy="1896840"/>
           </a:xfrm>
           <a:prstGeom prst="rect">
             <a:avLst/>
@@ -507,18 +507,18 @@
               </a:spcBef>
               <a:buNone/>
             </a:pPr>
-            <a:endParaRPr b="0" lang="en-US" sz="3200" spc="-1" strike="noStrike">
-              <a:solidFill>
-                <a:srgbClr val="000000"/>
-              </a:solidFill>
-              <a:latin typeface="Arial"/>
-            </a:endParaRPr>
-          </a:p>
-        </p:txBody>
-      </p:sp>
-      <p:sp>
-        <p:nvSpPr>
-          <p:cNvPr id="33" name="PlaceHolder 3"/>
+            <a:endParaRPr b="0" lang="en-GB" sz="3200" spc="-1" strike="noStrike">
+              <a:solidFill>
+                <a:srgbClr val="000000"/>
+              </a:solidFill>
+              <a:latin typeface="Arial"/>
+            </a:endParaRPr>
+          </a:p>
+        </p:txBody>
+      </p:sp>
+      <p:sp>
+        <p:nvSpPr>
+          <p:cNvPr id="35" name="PlaceHolder 3"/>
           <p:cNvSpPr>
             <a:spLocks noGrp="1"/>
           </p:cNvSpPr>
@@ -528,8 +528,8 @@
         </p:nvSpPr>
         <p:spPr>
           <a:xfrm>
-            <a:off x="4319280" y="1604520"/>
-            <a:ext cx="3532680" cy="1896840"/>
+            <a:off x="4319640" y="1604520"/>
+            <a:ext cx="3533040" cy="1896840"/>
           </a:xfrm>
           <a:prstGeom prst="rect">
             <a:avLst/>
@@ -550,18 +550,18 @@
               </a:spcBef>
               <a:buNone/>
             </a:pPr>
-            <a:endParaRPr b="0" lang="en-US" sz="3200" spc="-1" strike="noStrike">
-              <a:solidFill>
-                <a:srgbClr val="000000"/>
-              </a:solidFill>
-              <a:latin typeface="Arial"/>
-            </a:endParaRPr>
-          </a:p>
-        </p:txBody>
-      </p:sp>
-      <p:sp>
-        <p:nvSpPr>
-          <p:cNvPr id="34" name="PlaceHolder 4"/>
+            <a:endParaRPr b="0" lang="en-GB" sz="3200" spc="-1" strike="noStrike">
+              <a:solidFill>
+                <a:srgbClr val="000000"/>
+              </a:solidFill>
+              <a:latin typeface="Arial"/>
+            </a:endParaRPr>
+          </a:p>
+        </p:txBody>
+      </p:sp>
+      <p:sp>
+        <p:nvSpPr>
+          <p:cNvPr id="36" name="PlaceHolder 4"/>
           <p:cNvSpPr>
             <a:spLocks noGrp="1"/>
           </p:cNvSpPr>
@@ -571,8 +571,8 @@
         </p:nvSpPr>
         <p:spPr>
           <a:xfrm>
-            <a:off x="8028720" y="1604520"/>
-            <a:ext cx="3532680" cy="1896840"/>
+            <a:off x="8029800" y="1604520"/>
+            <a:ext cx="3533040" cy="1896840"/>
           </a:xfrm>
           <a:prstGeom prst="rect">
             <a:avLst/>
@@ -593,18 +593,18 @@
               </a:spcBef>
               <a:buNone/>
             </a:pPr>
-            <a:endParaRPr b="0" lang="en-US" sz="3200" spc="-1" strike="noStrike">
-              <a:solidFill>
-                <a:srgbClr val="000000"/>
-              </a:solidFill>
-              <a:latin typeface="Arial"/>
-            </a:endParaRPr>
-          </a:p>
-        </p:txBody>
-      </p:sp>
-      <p:sp>
-        <p:nvSpPr>
-          <p:cNvPr id="35" name="PlaceHolder 5"/>
+            <a:endParaRPr b="0" lang="en-GB" sz="3200" spc="-1" strike="noStrike">
+              <a:solidFill>
+                <a:srgbClr val="000000"/>
+              </a:solidFill>
+              <a:latin typeface="Arial"/>
+            </a:endParaRPr>
+          </a:p>
+        </p:txBody>
+      </p:sp>
+      <p:sp>
+        <p:nvSpPr>
+          <p:cNvPr id="37" name="PlaceHolder 5"/>
           <p:cNvSpPr>
             <a:spLocks noGrp="1"/>
           </p:cNvSpPr>
@@ -615,7 +615,7 @@
         <p:spPr>
           <a:xfrm>
             <a:off x="609480" y="3682080"/>
-            <a:ext cx="3532680" cy="1896840"/>
+            <a:ext cx="3533040" cy="1896840"/>
           </a:xfrm>
           <a:prstGeom prst="rect">
             <a:avLst/>
@@ -636,18 +636,18 @@
               </a:spcBef>
               <a:buNone/>
             </a:pPr>
-            <a:endParaRPr b="0" lang="en-US" sz="3200" spc="-1" strike="noStrike">
-              <a:solidFill>
-                <a:srgbClr val="000000"/>
-              </a:solidFill>
-              <a:latin typeface="Arial"/>
-            </a:endParaRPr>
-          </a:p>
-        </p:txBody>
-      </p:sp>
-      <p:sp>
-        <p:nvSpPr>
-          <p:cNvPr id="36" name="PlaceHolder 6"/>
+            <a:endParaRPr b="0" lang="en-GB" sz="3200" spc="-1" strike="noStrike">
+              <a:solidFill>
+                <a:srgbClr val="000000"/>
+              </a:solidFill>
+              <a:latin typeface="Arial"/>
+            </a:endParaRPr>
+          </a:p>
+        </p:txBody>
+      </p:sp>
+      <p:sp>
+        <p:nvSpPr>
+          <p:cNvPr id="38" name="PlaceHolder 6"/>
           <p:cNvSpPr>
             <a:spLocks noGrp="1"/>
           </p:cNvSpPr>
@@ -657,8 +657,8 @@
         </p:nvSpPr>
         <p:spPr>
           <a:xfrm>
-            <a:off x="4319280" y="3682080"/>
-            <a:ext cx="3532680" cy="1896840"/>
+            <a:off x="4319640" y="3682080"/>
+            <a:ext cx="3533040" cy="1896840"/>
           </a:xfrm>
           <a:prstGeom prst="rect">
             <a:avLst/>
@@ -679,18 +679,18 @@
               </a:spcBef>
               <a:buNone/>
             </a:pPr>
-            <a:endParaRPr b="0" lang="en-US" sz="3200" spc="-1" strike="noStrike">
-              <a:solidFill>
-                <a:srgbClr val="000000"/>
-              </a:solidFill>
-              <a:latin typeface="Arial"/>
-            </a:endParaRPr>
-          </a:p>
-        </p:txBody>
-      </p:sp>
-      <p:sp>
-        <p:nvSpPr>
-          <p:cNvPr id="37" name="PlaceHolder 7"/>
+            <a:endParaRPr b="0" lang="en-GB" sz="3200" spc="-1" strike="noStrike">
+              <a:solidFill>
+                <a:srgbClr val="000000"/>
+              </a:solidFill>
+              <a:latin typeface="Arial"/>
+            </a:endParaRPr>
+          </a:p>
+        </p:txBody>
+      </p:sp>
+      <p:sp>
+        <p:nvSpPr>
+          <p:cNvPr id="39" name="PlaceHolder 7"/>
           <p:cNvSpPr>
             <a:spLocks noGrp="1"/>
           </p:cNvSpPr>
@@ -700,8 +700,8 @@
         </p:nvSpPr>
         <p:spPr>
           <a:xfrm>
-            <a:off x="8028720" y="3682080"/>
-            <a:ext cx="3532680" cy="1896840"/>
+            <a:off x="8029800" y="3682080"/>
+            <a:ext cx="3533040" cy="1896840"/>
           </a:xfrm>
           <a:prstGeom prst="rect">
             <a:avLst/>
@@ -722,7 +722,7 @@
               </a:spcBef>
               <a:buNone/>
             </a:pPr>
-            <a:endParaRPr b="0" lang="en-US" sz="3200" spc="-1" strike="noStrike">
+            <a:endParaRPr b="0" lang="en-GB" sz="3200" spc="-1" strike="noStrike">
               <a:solidFill>
                 <a:srgbClr val="000000"/>
               </a:solidFill>
@@ -755,7 +755,7 @@
       </p:grpSpPr>
       <p:sp>
         <p:nvSpPr>
-          <p:cNvPr id="2" name="PlaceHolder 1"/>
+          <p:cNvPr id="4" name="PlaceHolder 1"/>
           <p:cNvSpPr>
             <a:spLocks noGrp="1"/>
           </p:cNvSpPr>
@@ -765,8 +765,8 @@
         </p:nvSpPr>
         <p:spPr>
           <a:xfrm>
-            <a:off x="1523880" y="1122480"/>
-            <a:ext cx="9142920" cy="2386440"/>
+            <a:off x="609480" y="273600"/>
+            <a:ext cx="10972440" cy="1144800"/>
           </a:xfrm>
           <a:prstGeom prst="rect">
             <a:avLst/>
@@ -784,18 +784,18 @@
             <a:pPr indent="0" algn="ctr">
               <a:buNone/>
             </a:pPr>
-            <a:endParaRPr b="0" lang="en-US" sz="4400" spc="-1" strike="noStrike">
-              <a:solidFill>
-                <a:srgbClr val="000000"/>
-              </a:solidFill>
-              <a:latin typeface="Arial"/>
-            </a:endParaRPr>
-          </a:p>
-        </p:txBody>
-      </p:sp>
-      <p:sp>
-        <p:nvSpPr>
-          <p:cNvPr id="3" name="PlaceHolder 2"/>
+            <a:endParaRPr b="0" lang="en-GB" sz="4400" spc="-1" strike="noStrike">
+              <a:solidFill>
+                <a:srgbClr val="000000"/>
+              </a:solidFill>
+              <a:latin typeface="Arial"/>
+            </a:endParaRPr>
+          </a:p>
+        </p:txBody>
+      </p:sp>
+      <p:sp>
+        <p:nvSpPr>
+          <p:cNvPr id="5" name="PlaceHolder 2"/>
           <p:cNvSpPr>
             <a:spLocks noGrp="1"/>
           </p:cNvSpPr>
@@ -806,7 +806,7 @@
         <p:spPr>
           <a:xfrm>
             <a:off x="609480" y="1604520"/>
-            <a:ext cx="10972080" cy="3976920"/>
+            <a:ext cx="10972440" cy="3977280"/>
           </a:xfrm>
           <a:prstGeom prst="rect">
             <a:avLst/>
@@ -824,7 +824,7 @@
             <a:pPr indent="0" algn="ctr">
               <a:buNone/>
             </a:pPr>
-            <a:endParaRPr b="0" lang="en-US" sz="3200" spc="-1" strike="noStrike">
+            <a:endParaRPr b="0" lang="en-GB" sz="3200" spc="-1" strike="noStrike">
               <a:solidFill>
                 <a:srgbClr val="000000"/>
               </a:solidFill>
@@ -857,7 +857,7 @@
       </p:grpSpPr>
       <p:sp>
         <p:nvSpPr>
-          <p:cNvPr id="4" name="PlaceHolder 1"/>
+          <p:cNvPr id="6" name="PlaceHolder 1"/>
           <p:cNvSpPr>
             <a:spLocks noGrp="1"/>
           </p:cNvSpPr>
@@ -867,8 +867,8 @@
         </p:nvSpPr>
         <p:spPr>
           <a:xfrm>
-            <a:off x="1523880" y="1122480"/>
-            <a:ext cx="9142920" cy="2386440"/>
+            <a:off x="609480" y="273600"/>
+            <a:ext cx="10972440" cy="1144800"/>
           </a:xfrm>
           <a:prstGeom prst="rect">
             <a:avLst/>
@@ -886,18 +886,18 @@
             <a:pPr indent="0" algn="ctr">
               <a:buNone/>
             </a:pPr>
-            <a:endParaRPr b="0" lang="en-US" sz="4400" spc="-1" strike="noStrike">
-              <a:solidFill>
-                <a:srgbClr val="000000"/>
-              </a:solidFill>
-              <a:latin typeface="Arial"/>
-            </a:endParaRPr>
-          </a:p>
-        </p:txBody>
-      </p:sp>
-      <p:sp>
-        <p:nvSpPr>
-          <p:cNvPr id="5" name="PlaceHolder 2"/>
+            <a:endParaRPr b="0" lang="en-GB" sz="4400" spc="-1" strike="noStrike">
+              <a:solidFill>
+                <a:srgbClr val="000000"/>
+              </a:solidFill>
+              <a:latin typeface="Arial"/>
+            </a:endParaRPr>
+          </a:p>
+        </p:txBody>
+      </p:sp>
+      <p:sp>
+        <p:nvSpPr>
+          <p:cNvPr id="7" name="PlaceHolder 2"/>
           <p:cNvSpPr>
             <a:spLocks noGrp="1"/>
           </p:cNvSpPr>
@@ -908,7 +908,7 @@
         <p:spPr>
           <a:xfrm>
             <a:off x="609480" y="1604520"/>
-            <a:ext cx="10972080" cy="3976920"/>
+            <a:ext cx="10972440" cy="3977280"/>
           </a:xfrm>
           <a:prstGeom prst="rect">
             <a:avLst/>
@@ -929,7 +929,7 @@
               </a:spcBef>
               <a:buNone/>
             </a:pPr>
-            <a:endParaRPr b="0" lang="en-US" sz="3200" spc="-1" strike="noStrike">
+            <a:endParaRPr b="0" lang="en-GB" sz="3200" spc="-1" strike="noStrike">
               <a:solidFill>
                 <a:srgbClr val="000000"/>
               </a:solidFill>
@@ -962,7 +962,7 @@
       </p:grpSpPr>
       <p:sp>
         <p:nvSpPr>
-          <p:cNvPr id="6" name="PlaceHolder 1"/>
+          <p:cNvPr id="8" name="PlaceHolder 1"/>
           <p:cNvSpPr>
             <a:spLocks noGrp="1"/>
           </p:cNvSpPr>
@@ -972,8 +972,8 @@
         </p:nvSpPr>
         <p:spPr>
           <a:xfrm>
-            <a:off x="1523880" y="1122480"/>
-            <a:ext cx="9142920" cy="2386440"/>
+            <a:off x="609480" y="273600"/>
+            <a:ext cx="10972440" cy="1144800"/>
           </a:xfrm>
           <a:prstGeom prst="rect">
             <a:avLst/>
@@ -991,18 +991,18 @@
             <a:pPr indent="0" algn="ctr">
               <a:buNone/>
             </a:pPr>
-            <a:endParaRPr b="0" lang="en-US" sz="4400" spc="-1" strike="noStrike">
-              <a:solidFill>
-                <a:srgbClr val="000000"/>
-              </a:solidFill>
-              <a:latin typeface="Arial"/>
-            </a:endParaRPr>
-          </a:p>
-        </p:txBody>
-      </p:sp>
-      <p:sp>
-        <p:nvSpPr>
-          <p:cNvPr id="7" name="PlaceHolder 2"/>
+            <a:endParaRPr b="0" lang="en-GB" sz="4400" spc="-1" strike="noStrike">
+              <a:solidFill>
+                <a:srgbClr val="000000"/>
+              </a:solidFill>
+              <a:latin typeface="Arial"/>
+            </a:endParaRPr>
+          </a:p>
+        </p:txBody>
+      </p:sp>
+      <p:sp>
+        <p:nvSpPr>
+          <p:cNvPr id="9" name="PlaceHolder 2"/>
           <p:cNvSpPr>
             <a:spLocks noGrp="1"/>
           </p:cNvSpPr>
@@ -1013,7 +1013,7 @@
         <p:spPr>
           <a:xfrm>
             <a:off x="609480" y="1604520"/>
-            <a:ext cx="5354280" cy="3976920"/>
+            <a:ext cx="5354280" cy="3977280"/>
           </a:xfrm>
           <a:prstGeom prst="rect">
             <a:avLst/>
@@ -1034,18 +1034,18 @@
               </a:spcBef>
               <a:buNone/>
             </a:pPr>
-            <a:endParaRPr b="0" lang="en-US" sz="3200" spc="-1" strike="noStrike">
-              <a:solidFill>
-                <a:srgbClr val="000000"/>
-              </a:solidFill>
-              <a:latin typeface="Arial"/>
-            </a:endParaRPr>
-          </a:p>
-        </p:txBody>
-      </p:sp>
-      <p:sp>
-        <p:nvSpPr>
-          <p:cNvPr id="8" name="PlaceHolder 3"/>
+            <a:endParaRPr b="0" lang="en-GB" sz="3200" spc="-1" strike="noStrike">
+              <a:solidFill>
+                <a:srgbClr val="000000"/>
+              </a:solidFill>
+              <a:latin typeface="Arial"/>
+            </a:endParaRPr>
+          </a:p>
+        </p:txBody>
+      </p:sp>
+      <p:sp>
+        <p:nvSpPr>
+          <p:cNvPr id="10" name="PlaceHolder 3"/>
           <p:cNvSpPr>
             <a:spLocks noGrp="1"/>
           </p:cNvSpPr>
@@ -1056,7 +1056,7 @@
         <p:spPr>
           <a:xfrm>
             <a:off x="6231960" y="1604520"/>
-            <a:ext cx="5354280" cy="3976920"/>
+            <a:ext cx="5354280" cy="3977280"/>
           </a:xfrm>
           <a:prstGeom prst="rect">
             <a:avLst/>
@@ -1077,7 +1077,7 @@
               </a:spcBef>
               <a:buNone/>
             </a:pPr>
-            <a:endParaRPr b="0" lang="en-US" sz="3200" spc="-1" strike="noStrike">
+            <a:endParaRPr b="0" lang="en-GB" sz="3200" spc="-1" strike="noStrike">
               <a:solidFill>
                 <a:srgbClr val="000000"/>
               </a:solidFill>
@@ -1110,7 +1110,7 @@
       </p:grpSpPr>
       <p:sp>
         <p:nvSpPr>
-          <p:cNvPr id="9" name="PlaceHolder 1"/>
+          <p:cNvPr id="11" name="PlaceHolder 1"/>
           <p:cNvSpPr>
             <a:spLocks noGrp="1"/>
           </p:cNvSpPr>
@@ -1120,8 +1120,8 @@
         </p:nvSpPr>
         <p:spPr>
           <a:xfrm>
-            <a:off x="1523880" y="1122480"/>
-            <a:ext cx="9142920" cy="2386440"/>
+            <a:off x="609480" y="273600"/>
+            <a:ext cx="10972440" cy="1144800"/>
           </a:xfrm>
           <a:prstGeom prst="rect">
             <a:avLst/>
@@ -1139,7 +1139,7 @@
             <a:pPr indent="0" algn="ctr">
               <a:buNone/>
             </a:pPr>
-            <a:endParaRPr b="0" lang="en-US" sz="4400" spc="-1" strike="noStrike">
+            <a:endParaRPr b="0" lang="en-GB" sz="4400" spc="-1" strike="noStrike">
               <a:solidFill>
                 <a:srgbClr val="000000"/>
               </a:solidFill>
@@ -1172,7 +1172,7 @@
       </p:grpSpPr>
       <p:sp>
         <p:nvSpPr>
-          <p:cNvPr id="10" name="PlaceHolder 1"/>
+          <p:cNvPr id="12" name="PlaceHolder 1"/>
           <p:cNvSpPr>
             <a:spLocks noGrp="1"/>
           </p:cNvSpPr>
@@ -1182,8 +1182,8 @@
         </p:nvSpPr>
         <p:spPr>
           <a:xfrm>
-            <a:off x="1523880" y="1122480"/>
-            <a:ext cx="9142920" cy="11063520"/>
+            <a:off x="609480" y="273600"/>
+            <a:ext cx="10972440" cy="5307840"/>
           </a:xfrm>
           <a:prstGeom prst="rect">
             <a:avLst/>
@@ -1199,7 +1199,7 @@
           </a:bodyPr>
           <a:p>
             <a:pPr algn="ctr"/>
-            <a:endParaRPr b="0" lang="en-US" sz="3200" spc="-1" strike="noStrike">
+            <a:endParaRPr b="0" lang="en-GB" sz="3200" spc="-1" strike="noStrike">
               <a:solidFill>
                 <a:srgbClr val="000000"/>
               </a:solidFill>
@@ -1232,7 +1232,7 @@
       </p:grpSpPr>
       <p:sp>
         <p:nvSpPr>
-          <p:cNvPr id="11" name="PlaceHolder 1"/>
+          <p:cNvPr id="13" name="PlaceHolder 1"/>
           <p:cNvSpPr>
             <a:spLocks noGrp="1"/>
           </p:cNvSpPr>
@@ -1242,8 +1242,8 @@
         </p:nvSpPr>
         <p:spPr>
           <a:xfrm>
-            <a:off x="1523880" y="1122480"/>
-            <a:ext cx="9142920" cy="2386440"/>
+            <a:off x="609480" y="273600"/>
+            <a:ext cx="10972440" cy="1144800"/>
           </a:xfrm>
           <a:prstGeom prst="rect">
             <a:avLst/>
@@ -1261,18 +1261,18 @@
             <a:pPr indent="0" algn="ctr">
               <a:buNone/>
             </a:pPr>
-            <a:endParaRPr b="0" lang="en-US" sz="4400" spc="-1" strike="noStrike">
-              <a:solidFill>
-                <a:srgbClr val="000000"/>
-              </a:solidFill>
-              <a:latin typeface="Arial"/>
-            </a:endParaRPr>
-          </a:p>
-        </p:txBody>
-      </p:sp>
-      <p:sp>
-        <p:nvSpPr>
-          <p:cNvPr id="12" name="PlaceHolder 2"/>
+            <a:endParaRPr b="0" lang="en-GB" sz="4400" spc="-1" strike="noStrike">
+              <a:solidFill>
+                <a:srgbClr val="000000"/>
+              </a:solidFill>
+              <a:latin typeface="Arial"/>
+            </a:endParaRPr>
+          </a:p>
+        </p:txBody>
+      </p:sp>
+      <p:sp>
+        <p:nvSpPr>
+          <p:cNvPr id="14" name="PlaceHolder 2"/>
           <p:cNvSpPr>
             <a:spLocks noGrp="1"/>
           </p:cNvSpPr>
@@ -1304,18 +1304,18 @@
               </a:spcBef>
               <a:buNone/>
             </a:pPr>
-            <a:endParaRPr b="0" lang="en-US" sz="3200" spc="-1" strike="noStrike">
-              <a:solidFill>
-                <a:srgbClr val="000000"/>
-              </a:solidFill>
-              <a:latin typeface="Arial"/>
-            </a:endParaRPr>
-          </a:p>
-        </p:txBody>
-      </p:sp>
-      <p:sp>
-        <p:nvSpPr>
-          <p:cNvPr id="13" name="PlaceHolder 3"/>
+            <a:endParaRPr b="0" lang="en-GB" sz="3200" spc="-1" strike="noStrike">
+              <a:solidFill>
+                <a:srgbClr val="000000"/>
+              </a:solidFill>
+              <a:latin typeface="Arial"/>
+            </a:endParaRPr>
+          </a:p>
+        </p:txBody>
+      </p:sp>
+      <p:sp>
+        <p:nvSpPr>
+          <p:cNvPr id="15" name="PlaceHolder 3"/>
           <p:cNvSpPr>
             <a:spLocks noGrp="1"/>
           </p:cNvSpPr>
@@ -1326,7 +1326,7 @@
         <p:spPr>
           <a:xfrm>
             <a:off x="6231960" y="1604520"/>
-            <a:ext cx="5354280" cy="3976920"/>
+            <a:ext cx="5354280" cy="3977280"/>
           </a:xfrm>
           <a:prstGeom prst="rect">
             <a:avLst/>
@@ -1347,18 +1347,18 @@
               </a:spcBef>
               <a:buNone/>
             </a:pPr>
-            <a:endParaRPr b="0" lang="en-US" sz="3200" spc="-1" strike="noStrike">
-              <a:solidFill>
-                <a:srgbClr val="000000"/>
-              </a:solidFill>
-              <a:latin typeface="Arial"/>
-            </a:endParaRPr>
-          </a:p>
-        </p:txBody>
-      </p:sp>
-      <p:sp>
-        <p:nvSpPr>
-          <p:cNvPr id="14" name="PlaceHolder 4"/>
+            <a:endParaRPr b="0" lang="en-GB" sz="3200" spc="-1" strike="noStrike">
+              <a:solidFill>
+                <a:srgbClr val="000000"/>
+              </a:solidFill>
+              <a:latin typeface="Arial"/>
+            </a:endParaRPr>
+          </a:p>
+        </p:txBody>
+      </p:sp>
+      <p:sp>
+        <p:nvSpPr>
+          <p:cNvPr id="16" name="PlaceHolder 4"/>
           <p:cNvSpPr>
             <a:spLocks noGrp="1"/>
           </p:cNvSpPr>
@@ -1390,7 +1390,7 @@
               </a:spcBef>
               <a:buNone/>
             </a:pPr>
-            <a:endParaRPr b="0" lang="en-US" sz="3200" spc="-1" strike="noStrike">
+            <a:endParaRPr b="0" lang="en-GB" sz="3200" spc="-1" strike="noStrike">
               <a:solidFill>
                 <a:srgbClr val="000000"/>
               </a:solidFill>
@@ -1423,7 +1423,7 @@
       </p:grpSpPr>
       <p:sp>
         <p:nvSpPr>
-          <p:cNvPr id="15" name="PlaceHolder 1"/>
+          <p:cNvPr id="17" name="PlaceHolder 1"/>
           <p:cNvSpPr>
             <a:spLocks noGrp="1"/>
           </p:cNvSpPr>
@@ -1433,8 +1433,8 @@
         </p:nvSpPr>
         <p:spPr>
           <a:xfrm>
-            <a:off x="1523880" y="1122480"/>
-            <a:ext cx="9142920" cy="2386440"/>
+            <a:off x="609480" y="273600"/>
+            <a:ext cx="10972440" cy="1144800"/>
           </a:xfrm>
           <a:prstGeom prst="rect">
             <a:avLst/>
@@ -1452,18 +1452,18 @@
             <a:pPr indent="0" algn="ctr">
               <a:buNone/>
             </a:pPr>
-            <a:endParaRPr b="0" lang="en-US" sz="4400" spc="-1" strike="noStrike">
-              <a:solidFill>
-                <a:srgbClr val="000000"/>
-              </a:solidFill>
-              <a:latin typeface="Arial"/>
-            </a:endParaRPr>
-          </a:p>
-        </p:txBody>
-      </p:sp>
-      <p:sp>
-        <p:nvSpPr>
-          <p:cNvPr id="16" name="PlaceHolder 2"/>
+            <a:endParaRPr b="0" lang="en-GB" sz="4400" spc="-1" strike="noStrike">
+              <a:solidFill>
+                <a:srgbClr val="000000"/>
+              </a:solidFill>
+              <a:latin typeface="Arial"/>
+            </a:endParaRPr>
+          </a:p>
+        </p:txBody>
+      </p:sp>
+      <p:sp>
+        <p:nvSpPr>
+          <p:cNvPr id="18" name="PlaceHolder 2"/>
           <p:cNvSpPr>
             <a:spLocks noGrp="1"/>
           </p:cNvSpPr>
@@ -1474,7 +1474,7 @@
         <p:spPr>
           <a:xfrm>
             <a:off x="609480" y="1604520"/>
-            <a:ext cx="5354280" cy="3976920"/>
+            <a:ext cx="5354280" cy="3977280"/>
           </a:xfrm>
           <a:prstGeom prst="rect">
             <a:avLst/>
@@ -1495,18 +1495,18 @@
               </a:spcBef>
               <a:buNone/>
             </a:pPr>
-            <a:endParaRPr b="0" lang="en-US" sz="3200" spc="-1" strike="noStrike">
-              <a:solidFill>
-                <a:srgbClr val="000000"/>
-              </a:solidFill>
-              <a:latin typeface="Arial"/>
-            </a:endParaRPr>
-          </a:p>
-        </p:txBody>
-      </p:sp>
-      <p:sp>
-        <p:nvSpPr>
-          <p:cNvPr id="17" name="PlaceHolder 3"/>
+            <a:endParaRPr b="0" lang="en-GB" sz="3200" spc="-1" strike="noStrike">
+              <a:solidFill>
+                <a:srgbClr val="000000"/>
+              </a:solidFill>
+              <a:latin typeface="Arial"/>
+            </a:endParaRPr>
+          </a:p>
+        </p:txBody>
+      </p:sp>
+      <p:sp>
+        <p:nvSpPr>
+          <p:cNvPr id="19" name="PlaceHolder 3"/>
           <p:cNvSpPr>
             <a:spLocks noGrp="1"/>
           </p:cNvSpPr>
@@ -1538,18 +1538,18 @@
               </a:spcBef>
               <a:buNone/>
             </a:pPr>
-            <a:endParaRPr b="0" lang="en-US" sz="3200" spc="-1" strike="noStrike">
-              <a:solidFill>
-                <a:srgbClr val="000000"/>
-              </a:solidFill>
-              <a:latin typeface="Arial"/>
-            </a:endParaRPr>
-          </a:p>
-        </p:txBody>
-      </p:sp>
-      <p:sp>
-        <p:nvSpPr>
-          <p:cNvPr id="18" name="PlaceHolder 4"/>
+            <a:endParaRPr b="0" lang="en-GB" sz="3200" spc="-1" strike="noStrike">
+              <a:solidFill>
+                <a:srgbClr val="000000"/>
+              </a:solidFill>
+              <a:latin typeface="Arial"/>
+            </a:endParaRPr>
+          </a:p>
+        </p:txBody>
+      </p:sp>
+      <p:sp>
+        <p:nvSpPr>
+          <p:cNvPr id="20" name="PlaceHolder 4"/>
           <p:cNvSpPr>
             <a:spLocks noGrp="1"/>
           </p:cNvSpPr>
@@ -1581,7 +1581,7 @@
               </a:spcBef>
               <a:buNone/>
             </a:pPr>
-            <a:endParaRPr b="0" lang="en-US" sz="3200" spc="-1" strike="noStrike">
+            <a:endParaRPr b="0" lang="en-GB" sz="3200" spc="-1" strike="noStrike">
               <a:solidFill>
                 <a:srgbClr val="000000"/>
               </a:solidFill>
@@ -1614,7 +1614,7 @@
       </p:grpSpPr>
       <p:sp>
         <p:nvSpPr>
-          <p:cNvPr id="19" name="PlaceHolder 1"/>
+          <p:cNvPr id="21" name="PlaceHolder 1"/>
           <p:cNvSpPr>
             <a:spLocks noGrp="1"/>
           </p:cNvSpPr>
@@ -1624,8 +1624,8 @@
         </p:nvSpPr>
         <p:spPr>
           <a:xfrm>
-            <a:off x="1523880" y="1122480"/>
-            <a:ext cx="9142920" cy="2386440"/>
+            <a:off x="609480" y="273600"/>
+            <a:ext cx="10972440" cy="1144800"/>
           </a:xfrm>
           <a:prstGeom prst="rect">
             <a:avLst/>
@@ -1643,18 +1643,18 @@
             <a:pPr indent="0" algn="ctr">
               <a:buNone/>
             </a:pPr>
-            <a:endParaRPr b="0" lang="en-US" sz="4400" spc="-1" strike="noStrike">
-              <a:solidFill>
-                <a:srgbClr val="000000"/>
-              </a:solidFill>
-              <a:latin typeface="Arial"/>
-            </a:endParaRPr>
-          </a:p>
-        </p:txBody>
-      </p:sp>
-      <p:sp>
-        <p:nvSpPr>
-          <p:cNvPr id="20" name="PlaceHolder 2"/>
+            <a:endParaRPr b="0" lang="en-GB" sz="4400" spc="-1" strike="noStrike">
+              <a:solidFill>
+                <a:srgbClr val="000000"/>
+              </a:solidFill>
+              <a:latin typeface="Arial"/>
+            </a:endParaRPr>
+          </a:p>
+        </p:txBody>
+      </p:sp>
+      <p:sp>
+        <p:nvSpPr>
+          <p:cNvPr id="22" name="PlaceHolder 2"/>
           <p:cNvSpPr>
             <a:spLocks noGrp="1"/>
           </p:cNvSpPr>
@@ -1686,18 +1686,18 @@
               </a:spcBef>
               <a:buNone/>
             </a:pPr>
-            <a:endParaRPr b="0" lang="en-US" sz="3200" spc="-1" strike="noStrike">
-              <a:solidFill>
-                <a:srgbClr val="000000"/>
-              </a:solidFill>
-              <a:latin typeface="Arial"/>
-            </a:endParaRPr>
-          </a:p>
-        </p:txBody>
-      </p:sp>
-      <p:sp>
-        <p:nvSpPr>
-          <p:cNvPr id="21" name="PlaceHolder 3"/>
+            <a:endParaRPr b="0" lang="en-GB" sz="3200" spc="-1" strike="noStrike">
+              <a:solidFill>
+                <a:srgbClr val="000000"/>
+              </a:solidFill>
+              <a:latin typeface="Arial"/>
+            </a:endParaRPr>
+          </a:p>
+        </p:txBody>
+      </p:sp>
+      <p:sp>
+        <p:nvSpPr>
+          <p:cNvPr id="23" name="PlaceHolder 3"/>
           <p:cNvSpPr>
             <a:spLocks noGrp="1"/>
           </p:cNvSpPr>
@@ -1729,18 +1729,18 @@
               </a:spcBef>
               <a:buNone/>
             </a:pPr>
-            <a:endParaRPr b="0" lang="en-US" sz="3200" spc="-1" strike="noStrike">
-              <a:solidFill>
-                <a:srgbClr val="000000"/>
-              </a:solidFill>
-              <a:latin typeface="Arial"/>
-            </a:endParaRPr>
-          </a:p>
-        </p:txBody>
-      </p:sp>
-      <p:sp>
-        <p:nvSpPr>
-          <p:cNvPr id="22" name="PlaceHolder 4"/>
+            <a:endParaRPr b="0" lang="en-GB" sz="3200" spc="-1" strike="noStrike">
+              <a:solidFill>
+                <a:srgbClr val="000000"/>
+              </a:solidFill>
+              <a:latin typeface="Arial"/>
+            </a:endParaRPr>
+          </a:p>
+        </p:txBody>
+      </p:sp>
+      <p:sp>
+        <p:nvSpPr>
+          <p:cNvPr id="24" name="PlaceHolder 4"/>
           <p:cNvSpPr>
             <a:spLocks noGrp="1"/>
           </p:cNvSpPr>
@@ -1751,7 +1751,7 @@
         <p:spPr>
           <a:xfrm>
             <a:off x="609480" y="3682080"/>
-            <a:ext cx="10972080" cy="1896840"/>
+            <a:ext cx="10972440" cy="1896840"/>
           </a:xfrm>
           <a:prstGeom prst="rect">
             <a:avLst/>
@@ -1772,7 +1772,7 @@
               </a:spcBef>
               <a:buNone/>
             </a:pPr>
-            <a:endParaRPr b="0" lang="en-US" sz="3200" spc="-1" strike="noStrike">
+            <a:endParaRPr b="0" lang="en-GB" sz="3200" spc="-1" strike="noStrike">
               <a:solidFill>
                 <a:srgbClr val="000000"/>
               </a:solidFill>
@@ -1823,7 +1823,7 @@
         <p:spPr>
           <a:xfrm>
             <a:off x="1523880" y="1122480"/>
-            <a:ext cx="9142920" cy="2386440"/>
+            <a:ext cx="9142560" cy="2386080"/>
           </a:xfrm>
           <a:prstGeom prst="rect">
             <a:avLst/>
@@ -1842,15 +1842,24 @@
               <a:buNone/>
             </a:pPr>
             <a:r>
-              <a:rPr b="0" lang="en-US" sz="1800" spc="-1" strike="noStrike">
+              <a:rPr b="0" lang="en-GB" sz="1800" spc="-1" strike="noStrike">
                 <a:solidFill>
                   <a:srgbClr val="000000"/>
                 </a:solidFill>
                 <a:latin typeface="Arial"/>
               </a:rPr>
-              <a:t>Click to edit the title text format</a:t>
+              <a:t>Click to edit the title text </a:t>
             </a:r>
-            <a:endParaRPr b="0" lang="en-US" sz="1800" spc="-1" strike="noStrike">
+            <a:r>
+              <a:rPr b="0" lang="en-GB" sz="1800" spc="-1" strike="noStrike">
+                <a:solidFill>
+                  <a:srgbClr val="000000"/>
+                </a:solidFill>
+                <a:latin typeface="Arial"/>
+              </a:rPr>
+              <a:t>format</a:t>
+            </a:r>
+            <a:endParaRPr b="0" lang="en-GB" sz="1800" spc="-1" strike="noStrike">
               <a:solidFill>
                 <a:srgbClr val="000000"/>
               </a:solidFill>
@@ -1872,7 +1881,7 @@
         <p:spPr>
           <a:xfrm>
             <a:off x="609480" y="1604520"/>
-            <a:ext cx="10972080" cy="3976920"/>
+            <a:ext cx="5353920" cy="1896480"/>
           </a:xfrm>
           <a:prstGeom prst="rect">
             <a:avLst/>
@@ -1884,7 +1893,7 @@
         </p:spPr>
         <p:txBody>
           <a:bodyPr lIns="0" rIns="0" tIns="0" bIns="0" anchor="t">
-            <a:normAutofit/>
+            <a:normAutofit fontScale="71666"/>
           </a:bodyPr>
           <a:p>
             <a:pPr marL="432000" indent="-324000">
@@ -1899,7 +1908,7 @@
               <a:buChar char=""/>
             </a:pPr>
             <a:r>
-              <a:rPr b="0" lang="en-US" sz="1800" spc="-1" strike="noStrike">
+              <a:rPr b="0" lang="en-GB" sz="1800" spc="-1" strike="noStrike">
                 <a:solidFill>
                   <a:srgbClr val="000000"/>
                 </a:solidFill>
@@ -1907,7 +1916,7 @@
               </a:rPr>
               <a:t>Click to edit the outline text format</a:t>
             </a:r>
-            <a:endParaRPr b="0" lang="en-US" sz="1800" spc="-1" strike="noStrike">
+            <a:endParaRPr b="0" lang="en-GB" sz="1800" spc="-1" strike="noStrike">
               <a:solidFill>
                 <a:srgbClr val="000000"/>
               </a:solidFill>
@@ -1927,7 +1936,7 @@
               <a:buChar char=""/>
             </a:pPr>
             <a:r>
-              <a:rPr b="0" lang="en-US" sz="1800" spc="-1" strike="noStrike">
+              <a:rPr b="0" lang="en-GB" sz="1800" spc="-1" strike="noStrike">
                 <a:solidFill>
                   <a:srgbClr val="000000"/>
                 </a:solidFill>
@@ -1935,7 +1944,7 @@
               </a:rPr>
               <a:t>Second Outline Level</a:t>
             </a:r>
-            <a:endParaRPr b="0" lang="en-US" sz="1800" spc="-1" strike="noStrike">
+            <a:endParaRPr b="0" lang="en-GB" sz="1800" spc="-1" strike="noStrike">
               <a:solidFill>
                 <a:srgbClr val="000000"/>
               </a:solidFill>
@@ -1955,7 +1964,7 @@
               <a:buChar char=""/>
             </a:pPr>
             <a:r>
-              <a:rPr b="0" lang="en-US" sz="1800" spc="-1" strike="noStrike">
+              <a:rPr b="0" lang="en-GB" sz="1800" spc="-1" strike="noStrike">
                 <a:solidFill>
                   <a:srgbClr val="000000"/>
                 </a:solidFill>
@@ -1963,7 +1972,7 @@
               </a:rPr>
               <a:t>Third Outline Level</a:t>
             </a:r>
-            <a:endParaRPr b="0" lang="en-US" sz="1800" spc="-1" strike="noStrike">
+            <a:endParaRPr b="0" lang="en-GB" sz="1800" spc="-1" strike="noStrike">
               <a:solidFill>
                 <a:srgbClr val="000000"/>
               </a:solidFill>
@@ -1983,7 +1992,7 @@
               <a:buChar char=""/>
             </a:pPr>
             <a:r>
-              <a:rPr b="0" lang="en-US" sz="1800" spc="-1" strike="noStrike">
+              <a:rPr b="0" lang="en-GB" sz="1800" spc="-1" strike="noStrike">
                 <a:solidFill>
                   <a:srgbClr val="000000"/>
                 </a:solidFill>
@@ -1991,7 +2000,7 @@
               </a:rPr>
               <a:t>Fourth Outline Level</a:t>
             </a:r>
-            <a:endParaRPr b="0" lang="en-US" sz="1800" spc="-1" strike="noStrike">
+            <a:endParaRPr b="0" lang="en-GB" sz="1800" spc="-1" strike="noStrike">
               <a:solidFill>
                 <a:srgbClr val="000000"/>
               </a:solidFill>
@@ -2011,7 +2020,7 @@
               <a:buChar char=""/>
             </a:pPr>
             <a:r>
-              <a:rPr b="0" lang="en-US" sz="1800" spc="-1" strike="noStrike">
+              <a:rPr b="0" lang="en-GB" sz="1800" spc="-1" strike="noStrike">
                 <a:solidFill>
                   <a:srgbClr val="000000"/>
                 </a:solidFill>
@@ -2019,7 +2028,7 @@
               </a:rPr>
               <a:t>Fifth Outline Level</a:t>
             </a:r>
-            <a:endParaRPr b="0" lang="en-US" sz="1800" spc="-1" strike="noStrike">
+            <a:endParaRPr b="0" lang="en-GB" sz="1800" spc="-1" strike="noStrike">
               <a:solidFill>
                 <a:srgbClr val="000000"/>
               </a:solidFill>
@@ -2039,7 +2048,7 @@
               <a:buChar char=""/>
             </a:pPr>
             <a:r>
-              <a:rPr b="0" lang="en-US" sz="1800" spc="-1" strike="noStrike">
+              <a:rPr b="0" lang="en-GB" sz="1800" spc="-1" strike="noStrike">
                 <a:solidFill>
                   <a:srgbClr val="000000"/>
                 </a:solidFill>
@@ -2047,7 +2056,7 @@
               </a:rPr>
               <a:t>Sixth Outline Level</a:t>
             </a:r>
-            <a:endParaRPr b="0" lang="en-US" sz="1800" spc="-1" strike="noStrike">
+            <a:endParaRPr b="0" lang="en-GB" sz="1800" spc="-1" strike="noStrike">
               <a:solidFill>
                 <a:srgbClr val="000000"/>
               </a:solidFill>
@@ -2067,7 +2076,7 @@
               <a:buChar char=""/>
             </a:pPr>
             <a:r>
-              <a:rPr b="0" lang="en-US" sz="1800" spc="-1" strike="noStrike">
+              <a:rPr b="0" lang="en-GB" sz="1800" spc="-1" strike="noStrike">
                 <a:solidFill>
                   <a:srgbClr val="000000"/>
                 </a:solidFill>
@@ -2075,7 +2084,457 @@
               </a:rPr>
               <a:t>Seventh Outline Level</a:t>
             </a:r>
-            <a:endParaRPr b="0" lang="en-US" sz="1800" spc="-1" strike="noStrike">
+            <a:endParaRPr b="0" lang="en-GB" sz="1800" spc="-1" strike="noStrike">
+              <a:solidFill>
+                <a:srgbClr val="000000"/>
+              </a:solidFill>
+              <a:latin typeface="Arial"/>
+            </a:endParaRPr>
+          </a:p>
+        </p:txBody>
+      </p:sp>
+      <p:sp>
+        <p:nvSpPr>
+          <p:cNvPr id="2" name="PlaceHolder 3"/>
+          <p:cNvSpPr>
+            <a:spLocks noGrp="1"/>
+          </p:cNvSpPr>
+          <p:nvPr>
+            <p:ph type="body"/>
+          </p:nvPr>
+        </p:nvSpPr>
+        <p:spPr>
+          <a:xfrm>
+            <a:off x="6231960" y="1604520"/>
+            <a:ext cx="5353920" cy="1896480"/>
+          </a:xfrm>
+          <a:prstGeom prst="rect">
+            <a:avLst/>
+          </a:prstGeom>
+          <a:noFill/>
+          <a:ln w="0">
+            <a:noFill/>
+          </a:ln>
+        </p:spPr>
+        <p:txBody>
+          <a:bodyPr lIns="0" rIns="0" tIns="0" bIns="0" anchor="t">
+            <a:normAutofit fontScale="71666"/>
+          </a:bodyPr>
+          <a:p>
+            <a:pPr marL="432000" indent="-324000">
+              <a:spcBef>
+                <a:spcPts val="1417"/>
+              </a:spcBef>
+              <a:buClr>
+                <a:srgbClr val="000000"/>
+              </a:buClr>
+              <a:buSzPct val="45000"/>
+              <a:buFont typeface="Wingdings" charset="2"/>
+              <a:buChar char=""/>
+            </a:pPr>
+            <a:r>
+              <a:rPr b="0" lang="en-GB" sz="1800" spc="-1" strike="noStrike">
+                <a:solidFill>
+                  <a:srgbClr val="000000"/>
+                </a:solidFill>
+                <a:latin typeface="Arial"/>
+              </a:rPr>
+              <a:t>Click to edit the outline text format</a:t>
+            </a:r>
+            <a:endParaRPr b="0" lang="en-GB" sz="1800" spc="-1" strike="noStrike">
+              <a:solidFill>
+                <a:srgbClr val="000000"/>
+              </a:solidFill>
+              <a:latin typeface="Arial"/>
+            </a:endParaRPr>
+          </a:p>
+          <a:p>
+            <a:pPr lvl="1" marL="864000" indent="-324000">
+              <a:spcBef>
+                <a:spcPts val="1134"/>
+              </a:spcBef>
+              <a:buClr>
+                <a:srgbClr val="000000"/>
+              </a:buClr>
+              <a:buSzPct val="75000"/>
+              <a:buFont typeface="Symbol" charset="2"/>
+              <a:buChar char=""/>
+            </a:pPr>
+            <a:r>
+              <a:rPr b="0" lang="en-GB" sz="1800" spc="-1" strike="noStrike">
+                <a:solidFill>
+                  <a:srgbClr val="000000"/>
+                </a:solidFill>
+                <a:latin typeface="Arial"/>
+              </a:rPr>
+              <a:t>Second Outline Level</a:t>
+            </a:r>
+            <a:endParaRPr b="0" lang="en-GB" sz="1800" spc="-1" strike="noStrike">
+              <a:solidFill>
+                <a:srgbClr val="000000"/>
+              </a:solidFill>
+              <a:latin typeface="Arial"/>
+            </a:endParaRPr>
+          </a:p>
+          <a:p>
+            <a:pPr lvl="2" marL="1296000" indent="-288000">
+              <a:spcBef>
+                <a:spcPts val="850"/>
+              </a:spcBef>
+              <a:buClr>
+                <a:srgbClr val="000000"/>
+              </a:buClr>
+              <a:buSzPct val="45000"/>
+              <a:buFont typeface="Wingdings" charset="2"/>
+              <a:buChar char=""/>
+            </a:pPr>
+            <a:r>
+              <a:rPr b="0" lang="en-GB" sz="1800" spc="-1" strike="noStrike">
+                <a:solidFill>
+                  <a:srgbClr val="000000"/>
+                </a:solidFill>
+                <a:latin typeface="Arial"/>
+              </a:rPr>
+              <a:t>Third Outline Level</a:t>
+            </a:r>
+            <a:endParaRPr b="0" lang="en-GB" sz="1800" spc="-1" strike="noStrike">
+              <a:solidFill>
+                <a:srgbClr val="000000"/>
+              </a:solidFill>
+              <a:latin typeface="Arial"/>
+            </a:endParaRPr>
+          </a:p>
+          <a:p>
+            <a:pPr lvl="3" marL="1728000" indent="-216000">
+              <a:spcBef>
+                <a:spcPts val="567"/>
+              </a:spcBef>
+              <a:buClr>
+                <a:srgbClr val="000000"/>
+              </a:buClr>
+              <a:buSzPct val="75000"/>
+              <a:buFont typeface="Symbol" charset="2"/>
+              <a:buChar char=""/>
+            </a:pPr>
+            <a:r>
+              <a:rPr b="0" lang="en-GB" sz="1800" spc="-1" strike="noStrike">
+                <a:solidFill>
+                  <a:srgbClr val="000000"/>
+                </a:solidFill>
+                <a:latin typeface="Arial"/>
+              </a:rPr>
+              <a:t>Fourth Outline Level</a:t>
+            </a:r>
+            <a:endParaRPr b="0" lang="en-GB" sz="1800" spc="-1" strike="noStrike">
+              <a:solidFill>
+                <a:srgbClr val="000000"/>
+              </a:solidFill>
+              <a:latin typeface="Arial"/>
+            </a:endParaRPr>
+          </a:p>
+          <a:p>
+            <a:pPr lvl="4" marL="2160000" indent="-216000">
+              <a:spcBef>
+                <a:spcPts val="283"/>
+              </a:spcBef>
+              <a:buClr>
+                <a:srgbClr val="000000"/>
+              </a:buClr>
+              <a:buSzPct val="45000"/>
+              <a:buFont typeface="Wingdings" charset="2"/>
+              <a:buChar char=""/>
+            </a:pPr>
+            <a:r>
+              <a:rPr b="0" lang="en-GB" sz="1800" spc="-1" strike="noStrike">
+                <a:solidFill>
+                  <a:srgbClr val="000000"/>
+                </a:solidFill>
+                <a:latin typeface="Arial"/>
+              </a:rPr>
+              <a:t>Fifth Outline Level</a:t>
+            </a:r>
+            <a:endParaRPr b="0" lang="en-GB" sz="1800" spc="-1" strike="noStrike">
+              <a:solidFill>
+                <a:srgbClr val="000000"/>
+              </a:solidFill>
+              <a:latin typeface="Arial"/>
+            </a:endParaRPr>
+          </a:p>
+          <a:p>
+            <a:pPr lvl="5" marL="2592000" indent="-216000">
+              <a:spcBef>
+                <a:spcPts val="283"/>
+              </a:spcBef>
+              <a:buClr>
+                <a:srgbClr val="000000"/>
+              </a:buClr>
+              <a:buSzPct val="45000"/>
+              <a:buFont typeface="Wingdings" charset="2"/>
+              <a:buChar char=""/>
+            </a:pPr>
+            <a:r>
+              <a:rPr b="0" lang="en-GB" sz="1800" spc="-1" strike="noStrike">
+                <a:solidFill>
+                  <a:srgbClr val="000000"/>
+                </a:solidFill>
+                <a:latin typeface="Arial"/>
+              </a:rPr>
+              <a:t>Sixth Outline Level</a:t>
+            </a:r>
+            <a:endParaRPr b="0" lang="en-GB" sz="1800" spc="-1" strike="noStrike">
+              <a:solidFill>
+                <a:srgbClr val="000000"/>
+              </a:solidFill>
+              <a:latin typeface="Arial"/>
+            </a:endParaRPr>
+          </a:p>
+          <a:p>
+            <a:pPr lvl="6" marL="3024000" indent="-216000">
+              <a:spcBef>
+                <a:spcPts val="283"/>
+              </a:spcBef>
+              <a:buClr>
+                <a:srgbClr val="000000"/>
+              </a:buClr>
+              <a:buSzPct val="45000"/>
+              <a:buFont typeface="Wingdings" charset="2"/>
+              <a:buChar char=""/>
+            </a:pPr>
+            <a:r>
+              <a:rPr b="0" lang="en-GB" sz="1800" spc="-1" strike="noStrike">
+                <a:solidFill>
+                  <a:srgbClr val="000000"/>
+                </a:solidFill>
+                <a:latin typeface="Arial"/>
+              </a:rPr>
+              <a:t>Seventh Outline Level</a:t>
+            </a:r>
+            <a:endParaRPr b="0" lang="en-GB" sz="1800" spc="-1" strike="noStrike">
+              <a:solidFill>
+                <a:srgbClr val="000000"/>
+              </a:solidFill>
+              <a:latin typeface="Arial"/>
+            </a:endParaRPr>
+          </a:p>
+        </p:txBody>
+      </p:sp>
+      <p:sp>
+        <p:nvSpPr>
+          <p:cNvPr id="3" name="PlaceHolder 4"/>
+          <p:cNvSpPr>
+            <a:spLocks noGrp="1"/>
+          </p:cNvSpPr>
+          <p:nvPr>
+            <p:ph type="body"/>
+          </p:nvPr>
+        </p:nvSpPr>
+        <p:spPr>
+          <a:xfrm>
+            <a:off x="609480" y="3682080"/>
+            <a:ext cx="10971720" cy="1896480"/>
+          </a:xfrm>
+          <a:prstGeom prst="rect">
+            <a:avLst/>
+          </a:prstGeom>
+          <a:noFill/>
+          <a:ln w="0">
+            <a:noFill/>
+          </a:ln>
+        </p:spPr>
+        <p:txBody>
+          <a:bodyPr lIns="0" rIns="0" tIns="0" bIns="0" anchor="t">
+            <a:normAutofit fontScale="71666"/>
+          </a:bodyPr>
+          <a:p>
+            <a:pPr marL="432000" indent="-324000">
+              <a:spcBef>
+                <a:spcPts val="1417"/>
+              </a:spcBef>
+              <a:buClr>
+                <a:srgbClr val="000000"/>
+              </a:buClr>
+              <a:buSzPct val="45000"/>
+              <a:buFont typeface="Wingdings" charset="2"/>
+              <a:buChar char=""/>
+            </a:pPr>
+            <a:r>
+              <a:rPr b="0" lang="en-GB" sz="1800" spc="-1" strike="noStrike">
+                <a:solidFill>
+                  <a:srgbClr val="000000"/>
+                </a:solidFill>
+                <a:latin typeface="Arial"/>
+              </a:rPr>
+              <a:t>Click to edit the outline text format</a:t>
+            </a:r>
+            <a:endParaRPr b="0" lang="en-GB" sz="1800" spc="-1" strike="noStrike">
+              <a:solidFill>
+                <a:srgbClr val="000000"/>
+              </a:solidFill>
+              <a:latin typeface="Arial"/>
+            </a:endParaRPr>
+          </a:p>
+          <a:p>
+            <a:pPr lvl="1" marL="864000" indent="-324000">
+              <a:spcBef>
+                <a:spcPts val="1134"/>
+              </a:spcBef>
+              <a:buClr>
+                <a:srgbClr val="000000"/>
+              </a:buClr>
+              <a:buSzPct val="75000"/>
+              <a:buFont typeface="Symbol" charset="2"/>
+              <a:buChar char=""/>
+            </a:pPr>
+            <a:r>
+              <a:rPr b="0" lang="en-GB" sz="1800" spc="-1" strike="noStrike">
+                <a:solidFill>
+                  <a:srgbClr val="000000"/>
+                </a:solidFill>
+                <a:latin typeface="Arial"/>
+              </a:rPr>
+              <a:t>Second Outline Level</a:t>
+            </a:r>
+            <a:endParaRPr b="0" lang="en-GB" sz="1800" spc="-1" strike="noStrike">
+              <a:solidFill>
+                <a:srgbClr val="000000"/>
+              </a:solidFill>
+              <a:latin typeface="Arial"/>
+            </a:endParaRPr>
+          </a:p>
+          <a:p>
+            <a:pPr lvl="2" marL="1296000" indent="-288000">
+              <a:spcBef>
+                <a:spcPts val="850"/>
+              </a:spcBef>
+              <a:buClr>
+                <a:srgbClr val="000000"/>
+              </a:buClr>
+              <a:buSzPct val="45000"/>
+              <a:buFont typeface="Wingdings" charset="2"/>
+              <a:buChar char=""/>
+            </a:pPr>
+            <a:r>
+              <a:rPr b="0" lang="en-GB" sz="1800" spc="-1" strike="noStrike">
+                <a:solidFill>
+                  <a:srgbClr val="000000"/>
+                </a:solidFill>
+                <a:latin typeface="Arial"/>
+              </a:rPr>
+              <a:t>Third Outline Level</a:t>
+            </a:r>
+            <a:endParaRPr b="0" lang="en-GB" sz="1800" spc="-1" strike="noStrike">
+              <a:solidFill>
+                <a:srgbClr val="000000"/>
+              </a:solidFill>
+              <a:latin typeface="Arial"/>
+            </a:endParaRPr>
+          </a:p>
+          <a:p>
+            <a:pPr lvl="3" marL="1728000" indent="-216000">
+              <a:spcBef>
+                <a:spcPts val="567"/>
+              </a:spcBef>
+              <a:buClr>
+                <a:srgbClr val="000000"/>
+              </a:buClr>
+              <a:buSzPct val="75000"/>
+              <a:buFont typeface="Symbol" charset="2"/>
+              <a:buChar char=""/>
+            </a:pPr>
+            <a:r>
+              <a:rPr b="0" lang="en-GB" sz="1800" spc="-1" strike="noStrike">
+                <a:solidFill>
+                  <a:srgbClr val="000000"/>
+                </a:solidFill>
+                <a:latin typeface="Arial"/>
+              </a:rPr>
+              <a:t>Fourth Outline Level</a:t>
+            </a:r>
+            <a:endParaRPr b="0" lang="en-GB" sz="1800" spc="-1" strike="noStrike">
+              <a:solidFill>
+                <a:srgbClr val="000000"/>
+              </a:solidFill>
+              <a:latin typeface="Arial"/>
+            </a:endParaRPr>
+          </a:p>
+          <a:p>
+            <a:pPr lvl="4" marL="2160000" indent="-216000">
+              <a:spcBef>
+                <a:spcPts val="283"/>
+              </a:spcBef>
+              <a:buClr>
+                <a:srgbClr val="000000"/>
+              </a:buClr>
+              <a:buSzPct val="45000"/>
+              <a:buFont typeface="Wingdings" charset="2"/>
+              <a:buChar char=""/>
+            </a:pPr>
+            <a:r>
+              <a:rPr b="0" lang="en-GB" sz="1800" spc="-1" strike="noStrike">
+                <a:solidFill>
+                  <a:srgbClr val="000000"/>
+                </a:solidFill>
+                <a:latin typeface="Arial"/>
+              </a:rPr>
+              <a:t>Fifth Outline Level</a:t>
+            </a:r>
+            <a:endParaRPr b="0" lang="en-GB" sz="1800" spc="-1" strike="noStrike">
+              <a:solidFill>
+                <a:srgbClr val="000000"/>
+              </a:solidFill>
+              <a:latin typeface="Arial"/>
+            </a:endParaRPr>
+          </a:p>
+          <a:p>
+            <a:pPr lvl="5" marL="2592000" indent="-216000">
+              <a:spcBef>
+                <a:spcPts val="283"/>
+              </a:spcBef>
+              <a:buClr>
+                <a:srgbClr val="000000"/>
+              </a:buClr>
+              <a:buSzPct val="45000"/>
+              <a:buFont typeface="Wingdings" charset="2"/>
+              <a:buChar char=""/>
+            </a:pPr>
+            <a:r>
+              <a:rPr b="0" lang="en-GB" sz="1800" spc="-1" strike="noStrike">
+                <a:solidFill>
+                  <a:srgbClr val="000000"/>
+                </a:solidFill>
+                <a:latin typeface="Arial"/>
+              </a:rPr>
+              <a:t>Sixth Outline Level</a:t>
+            </a:r>
+            <a:endParaRPr b="0" lang="en-GB" sz="1800" spc="-1" strike="noStrike">
+              <a:solidFill>
+                <a:srgbClr val="000000"/>
+              </a:solidFill>
+              <a:latin typeface="Arial"/>
+            </a:endParaRPr>
+          </a:p>
+          <a:p>
+            <a:pPr lvl="6" marL="3024000" indent="-216000">
+              <a:spcBef>
+                <a:spcPts val="283"/>
+              </a:spcBef>
+              <a:buClr>
+                <a:srgbClr val="000000"/>
+              </a:buClr>
+              <a:buSzPct val="45000"/>
+              <a:buFont typeface="Wingdings" charset="2"/>
+              <a:buChar char=""/>
+            </a:pPr>
+            <a:r>
+              <a:rPr b="0" lang="en-GB" sz="1800" spc="-1" strike="noStrike">
+                <a:solidFill>
+                  <a:srgbClr val="000000"/>
+                </a:solidFill>
+                <a:latin typeface="Arial"/>
+              </a:rPr>
+              <a:t>Seventh Outline Level</a:t>
+            </a:r>
+            <a:endParaRPr b="0" lang="en-GB" sz="1800" spc="-1" strike="noStrike">
               <a:solidFill>
                 <a:srgbClr val="000000"/>
               </a:solidFill>
@@ -2123,28 +2582,28 @@
       </p:grpSpPr>
       <p:grpSp>
         <p:nvGrpSpPr>
-          <p:cNvPr id="38" name="Group 12"/>
+          <p:cNvPr id="40" name="Group 12"/>
           <p:cNvGrpSpPr/>
           <p:nvPr/>
         </p:nvGrpSpPr>
         <p:grpSpPr>
           <a:xfrm>
             <a:off x="4620600" y="3029760"/>
-            <a:ext cx="2928240" cy="1708200"/>
+            <a:ext cx="2927880" cy="1708920"/>
             <a:chOff x="4620600" y="3029760"/>
-            <a:chExt cx="2928240" cy="1708200"/>
+            <a:chExt cx="2927880" cy="1708920"/>
           </a:xfrm>
         </p:grpSpPr>
         <p:sp>
           <p:nvSpPr>
-            <p:cNvPr id="39" name="TextBox 9"/>
+            <p:cNvPr id="41" name="TextBox 9"/>
             <p:cNvSpPr/>
             <p:nvPr/>
           </p:nvSpPr>
           <p:spPr>
             <a:xfrm>
               <a:off x="5266800" y="3029760"/>
-              <a:ext cx="1635840" cy="394560"/>
+              <a:ext cx="1635480" cy="394560"/>
             </a:xfrm>
             <a:prstGeom prst="rect">
               <a:avLst/>
@@ -2180,7 +2639,7 @@
                 </a:rPr>
                 <a:t>pLisp 0.1.30</a:t>
               </a:r>
-              <a:endParaRPr b="0" lang="en-US" sz="2000" spc="-1" strike="noStrike">
+              <a:endParaRPr b="0" lang="en-GB" sz="2000" spc="-1" strike="noStrike">
                 <a:solidFill>
                   <a:srgbClr val="000000"/>
                 </a:solidFill>
@@ -2191,14 +2650,14 @@
         </p:sp>
         <p:sp>
           <p:nvSpPr>
-            <p:cNvPr id="40" name="TextBox 10"/>
+            <p:cNvPr id="42" name="TextBox 10"/>
             <p:cNvSpPr/>
             <p:nvPr/>
           </p:nvSpPr>
           <p:spPr>
             <a:xfrm>
               <a:off x="5365080" y="3465360"/>
-              <a:ext cx="1439280" cy="302760"/>
+              <a:ext cx="1438920" cy="303120"/>
             </a:xfrm>
             <a:prstGeom prst="rect">
               <a:avLst/>
@@ -2234,7 +2693,7 @@
                 </a:rPr>
                 <a:t>Don’t Lisp. Talk!</a:t>
               </a:r>
-              <a:endParaRPr b="0" lang="en-US" sz="1400" spc="-1" strike="noStrike">
+              <a:endParaRPr b="0" lang="en-GB" sz="1400" spc="-1" strike="noStrike">
                 <a:solidFill>
                   <a:srgbClr val="000000"/>
                 </a:solidFill>
@@ -2245,14 +2704,14 @@
         </p:sp>
         <p:sp>
           <p:nvSpPr>
-            <p:cNvPr id="41" name="TextBox 11"/>
+            <p:cNvPr id="43" name="TextBox 11"/>
             <p:cNvSpPr/>
             <p:nvPr/>
           </p:nvSpPr>
           <p:spPr>
             <a:xfrm>
               <a:off x="4620600" y="4313520"/>
-              <a:ext cx="2928240" cy="424440"/>
+              <a:ext cx="2927880" cy="425160"/>
             </a:xfrm>
             <a:prstGeom prst="rect">
               <a:avLst/>
@@ -2286,9 +2745,9 @@
                   <a:latin typeface="Arial"/>
                   <a:ea typeface="DejaVu Sans"/>
                 </a:rPr>
-                <a:t>Copyright © 2011-2023 Rajesh Jayaprakash</a:t>
+                <a:t>Copyright © 2011-2024 Rajesh Jayaprakash</a:t>
               </a:r>
-              <a:endParaRPr b="0" lang="en-US" sz="1100" spc="-1" strike="noStrike">
+              <a:endParaRPr b="0" lang="en-GB" sz="1100" spc="-1" strike="noStrike">
                 <a:solidFill>
                   <a:srgbClr val="000000"/>
                 </a:solidFill>
@@ -2311,7 +2770,7 @@
                 </a:rPr>
                 <a:t>All rights reserved</a:t>
               </a:r>
-              <a:endParaRPr b="0" lang="en-US" sz="1100" spc="-1" strike="noStrike">
+              <a:endParaRPr b="0" lang="en-GB" sz="1100" spc="-1" strike="noStrike">
                 <a:solidFill>
                   <a:srgbClr val="000000"/>
                 </a:solidFill>
@@ -2323,14 +2782,14 @@
       </p:grpSp>
       <p:sp>
         <p:nvSpPr>
-          <p:cNvPr id="42" name="Rectangle 13"/>
+          <p:cNvPr id="44" name="Rectangle 13"/>
           <p:cNvSpPr/>
           <p:nvPr/>
         </p:nvSpPr>
         <p:spPr>
           <a:xfrm>
             <a:off x="2769120" y="1094760"/>
-            <a:ext cx="6666120" cy="3802320"/>
+            <a:ext cx="6665760" cy="3801960"/>
           </a:xfrm>
           <a:prstGeom prst="rect">
             <a:avLst/>
@@ -2361,18 +2820,24 @@
             <a:noAutofit/>
           </a:bodyPr>
           <a:p>
+            <a:pPr>
+              <a:lnSpc>
+                <a:spcPct val="100000"/>
+              </a:lnSpc>
+            </a:pPr>
             <a:endParaRPr b="0" lang="en-US" sz="1800" spc="-1" strike="noStrike">
               <a:solidFill>
                 <a:srgbClr val="000000"/>
               </a:solidFill>
               <a:latin typeface="Arial"/>
+              <a:ea typeface="DejaVu Sans"/>
             </a:endParaRPr>
           </a:p>
         </p:txBody>
       </p:sp>
       <p:pic>
         <p:nvPicPr>
-          <p:cNvPr id="43" name="Picture 2" descr=""/>
+          <p:cNvPr id="45" name="Picture 2" descr=""/>
           <p:cNvPicPr/>
           <p:nvPr/>
         </p:nvPicPr>
@@ -2383,7 +2848,7 @@
         <p:spPr>
           <a:xfrm>
             <a:off x="5222160" y="1221120"/>
-            <a:ext cx="1802160" cy="1751400"/>
+            <a:ext cx="1801800" cy="1751040"/>
           </a:xfrm>
           <a:prstGeom prst="rect">
             <a:avLst/>
@@ -2407,7 +2872,7 @@
 </file>
 
 <file path=ppt/theme/theme1.xml><?xml version="1.0" encoding="utf-8"?>
-<a:theme xmlns:a="http://schemas.openxmlformats.org/drawingml/2006/main" name="Office Theme">
+<a:theme xmlns:a="http://schemas.openxmlformats.org/drawingml/2006/main" xmlns:r="http://schemas.openxmlformats.org/officeDocument/2006/relationships" name="Office Theme">
   <a:themeElements>
     <a:clrScheme name="Office">
       <a:dk1>
@@ -2449,90 +2914,74 @@
     </a:clrScheme>
     <a:fontScheme name="Office">
       <a:majorFont>
-        <a:latin typeface="Arial"/>
-        <a:ea typeface="DejaVu Sans"/>
-        <a:cs typeface="DejaVu Sans"/>
+        <a:latin typeface="Arial" pitchFamily="0" charset="1"/>
+        <a:ea typeface="DejaVu Sans" pitchFamily="0" charset="1"/>
+        <a:cs typeface="DejaVu Sans" pitchFamily="0" charset="1"/>
       </a:majorFont>
       <a:minorFont>
-        <a:latin typeface="Arial"/>
-        <a:ea typeface="DejaVu Sans"/>
-        <a:cs typeface="DejaVu Sans"/>
+        <a:latin typeface="Arial" pitchFamily="0" charset="1"/>
+        <a:ea typeface="DejaVu Sans" pitchFamily="0" charset="1"/>
+        <a:cs typeface="DejaVu Sans" pitchFamily="0" charset="1"/>
       </a:minorFont>
     </a:fontScheme>
-    <a:fmtScheme name="Office">
+    <a:fmtScheme>
       <a:fillStyleLst>
         <a:solidFill>
           <a:schemeClr val="phClr"/>
         </a:solidFill>
-        <a:gradFill rotWithShape="1">
+        <a:gradFill>
           <a:gsLst>
             <a:gs pos="0">
               <a:schemeClr val="phClr">
                 <a:tint val="50000"/>
-                <a:satMod val="300000"/>
               </a:schemeClr>
             </a:gs>
             <a:gs pos="35000">
               <a:schemeClr val="phClr">
                 <a:tint val="37000"/>
-                <a:satMod val="300000"/>
               </a:schemeClr>
             </a:gs>
             <a:gs pos="100000">
               <a:schemeClr val="phClr">
                 <a:tint val="15000"/>
-                <a:satMod val="350000"/>
               </a:schemeClr>
             </a:gs>
           </a:gsLst>
           <a:lin ang="16200000" scaled="1"/>
+          <a:tileRect l="0" t="0" r="0" b="0"/>
         </a:gradFill>
-        <a:gradFill rotWithShape="1">
+        <a:gradFill>
           <a:gsLst>
             <a:gs pos="0">
               <a:schemeClr val="phClr">
                 <a:shade val="51000"/>
-                <a:satMod val="130000"/>
               </a:schemeClr>
             </a:gs>
             <a:gs pos="80000">
               <a:schemeClr val="phClr">
                 <a:shade val="93000"/>
-                <a:satMod val="130000"/>
               </a:schemeClr>
             </a:gs>
             <a:gs pos="100000">
               <a:schemeClr val="phClr">
                 <a:shade val="94000"/>
-                <a:satMod val="135000"/>
               </a:schemeClr>
             </a:gs>
           </a:gsLst>
           <a:lin ang="16200000" scaled="0"/>
+          <a:tileRect l="0" t="0" r="0" b="0"/>
         </a:gradFill>
       </a:fillStyleLst>
       <a:lnStyleLst>
         <a:ln w="6350" cap="flat" cmpd="sng" algn="ctr">
-          <a:solidFill>
-            <a:schemeClr val="phClr">
-              <a:shade val="95000"/>
-              <a:satMod val="105000"/>
-            </a:schemeClr>
-          </a:solidFill>
           <a:prstDash val="solid"/>
           <a:miter/>
         </a:ln>
         <a:ln w="12700" cap="flat" cmpd="sng" algn="ctr">
-          <a:solidFill>
-            <a:schemeClr val="phClr"/>
-          </a:solidFill>
           <a:prstDash val="solid"/>
           <a:miter/>
         </a:ln>
         <a:ln w="19050" cap="flat" cmpd="sng" algn="ctr">
-          <a:solidFill>
-            <a:schemeClr val="phClr"/>
-          </a:solidFill>
           <a:prstDash val="solid"/>
           <a:miter/>
         </a:ln>
@@ -2545,74 +2994,54 @@
           <a:effectLst/>
         </a:effectStyle>
         <a:effectStyle>
-          <a:effectLst>
-            <a:outerShdw blurRad="40000" dist="23000" dir="5400000" rotWithShape="0">
-              <a:srgbClr val="000000">
-                <a:alpha val="35000"/>
-              </a:srgbClr>
-            </a:outerShdw>
-          </a:effectLst>
-          <a:scene3d>
-            <a:camera prst="orthographicFront">
-              <a:rot lat="0" lon="0" rev="0"/>
-            </a:camera>
-            <a:lightRig rig="threePt" dir="t">
-              <a:rot lat="0" lon="0" rev="1200000"/>
-            </a:lightRig>
-          </a:scene3d>
-          <a:sp3d>
-            <a:bevelT w="63500" h="25400"/>
-          </a:sp3d>
+          <a:effectLst/>
         </a:effectStyle>
       </a:effectStyleLst>
       <a:bgFillStyleLst>
         <a:solidFill>
           <a:schemeClr val="phClr"/>
         </a:solidFill>
-        <a:gradFill rotWithShape="1">
+        <a:gradFill>
           <a:gsLst>
             <a:gs pos="0">
               <a:schemeClr val="phClr">
                 <a:tint val="40000"/>
-                <a:satMod val="350000"/>
               </a:schemeClr>
             </a:gs>
             <a:gs pos="40000">
               <a:schemeClr val="phClr">
                 <a:tint val="45000"/>
                 <a:shade val="99000"/>
-                <a:satMod val="350000"/>
               </a:schemeClr>
             </a:gs>
             <a:gs pos="100000">
               <a:schemeClr val="phClr">
                 <a:shade val="20000"/>
-                <a:satMod val="255000"/>
               </a:schemeClr>
             </a:gs>
           </a:gsLst>
           <a:path path="circle">
             <a:fillToRect l="50000" t="-80000" r="50000" b="180000"/>
           </a:path>
+          <a:tileRect l="0" t="0" r="0" b="0"/>
         </a:gradFill>
-        <a:gradFill rotWithShape="1">
+        <a:gradFill>
           <a:gsLst>
             <a:gs pos="0">
               <a:schemeClr val="phClr">
                 <a:tint val="80000"/>
-                <a:satMod val="300000"/>
               </a:schemeClr>
             </a:gs>
             <a:gs pos="100000">
               <a:schemeClr val="phClr">
                 <a:shade val="30000"/>
-                <a:satMod val="200000"/>
               </a:schemeClr>
             </a:gs>
           </a:gsLst>
           <a:path path="circle">
             <a:fillToRect l="50000" t="50000" r="50000" b="50000"/>
           </a:path>
+          <a:tileRect l="0" t="0" r="0" b="0"/>
         </a:gradFill>
       </a:bgFillStyleLst>
     </a:fmtScheme>

</xml_diff>